<commit_message>
Most Recent R File changes
</commit_message>
<xml_diff>
--- a/Final_Group_Project_Project 1.pptx
+++ b/Final_Group_Project_Project 1.pptx
@@ -21,6 +21,9 @@
     <p:sldId id="276" r:id="rId18"/>
     <p:sldId id="273" r:id="rId19"/>
     <p:sldId id="269" r:id="rId20"/>
+    <p:sldId id="277" r:id="rId21"/>
+    <p:sldId id="279" r:id="rId22"/>
+    <p:sldId id="278" r:id="rId23"/>
   </p:sldIdLst>
   <p:sldSz cx="12192000" cy="6858000"/>
   <p:notesSz cx="6858000" cy="9144000"/>
@@ -6511,7 +6514,7 @@
           <a:p>
             <a:fld id="{5E7AA473-D82F-4EFF-9DF7-AE6D83C51288}" type="datetime1">
               <a:rPr lang="en-US" smtClean="0"/>
-              <a:t>3/7/2024</a:t>
+              <a:t>3/10/2024</a:t>
             </a:fld>
             <a:endParaRPr lang="en-US"/>
           </a:p>
@@ -6764,7 +6767,7 @@
           <a:p>
             <a:fld id="{1E12F1F0-FE2D-4C1C-B320-8CB9BE735F0F}" type="datetime1">
               <a:rPr lang="en-US" smtClean="0"/>
-              <a:t>3/7/2024</a:t>
+              <a:t>3/10/2024</a:t>
             </a:fld>
             <a:endParaRPr lang="en-US"/>
           </a:p>
@@ -7030,7 +7033,7 @@
           <a:p>
             <a:fld id="{2CF1B96C-10FD-4EBC-9029-9652B7535D02}" type="datetime1">
               <a:rPr lang="en-US" smtClean="0"/>
-              <a:t>3/7/2024</a:t>
+              <a:t>3/10/2024</a:t>
             </a:fld>
             <a:endParaRPr lang="en-US"/>
           </a:p>
@@ -7283,7 +7286,7 @@
           <a:p>
             <a:fld id="{14878474-CC00-4A95-9D50-A41C12D1EEC4}" type="datetime1">
               <a:rPr lang="en-US" smtClean="0"/>
-              <a:t>3/7/2024</a:t>
+              <a:t>3/10/2024</a:t>
             </a:fld>
             <a:endParaRPr lang="en-US"/>
           </a:p>
@@ -7560,7 +7563,7 @@
           <a:p>
             <a:fld id="{7F38C8B4-7FBB-408F-BDB9-F0496874AFB2}" type="datetime1">
               <a:rPr lang="en-US" smtClean="0"/>
-              <a:t>3/7/2024</a:t>
+              <a:t>3/10/2024</a:t>
             </a:fld>
             <a:endParaRPr lang="en-US"/>
           </a:p>
@@ -7830,7 +7833,7 @@
           <a:p>
             <a:fld id="{2BB8EE20-A5E2-47D3-8F6D-A2BA7AB2E093}" type="datetime1">
               <a:rPr lang="en-US" smtClean="0"/>
-              <a:t>3/7/2024</a:t>
+              <a:t>3/10/2024</a:t>
             </a:fld>
             <a:endParaRPr lang="en-US"/>
           </a:p>
@@ -8385,7 +8388,7 @@
           <a:p>
             <a:fld id="{3382CF99-132F-413F-B7EF-71A5C33F2ED6}" type="datetime1">
               <a:rPr lang="en-US" smtClean="0"/>
-              <a:t>3/7/2024</a:t>
+              <a:t>3/10/2024</a:t>
             </a:fld>
             <a:endParaRPr lang="en-US"/>
           </a:p>
@@ -8526,7 +8529,7 @@
           <a:p>
             <a:fld id="{1F17AE06-98E0-4D9F-A059-92C3548821BB}" type="datetime1">
               <a:rPr lang="en-US" smtClean="0"/>
-              <a:t>3/7/2024</a:t>
+              <a:t>3/10/2024</a:t>
             </a:fld>
             <a:endParaRPr lang="en-US"/>
           </a:p>
@@ -8639,7 +8642,7 @@
           <a:p>
             <a:fld id="{FFBA00CA-3DDC-4705-B840-978EF5EA0707}" type="datetime1">
               <a:rPr lang="en-US" smtClean="0"/>
-              <a:t>3/7/2024</a:t>
+              <a:t>3/10/2024</a:t>
             </a:fld>
             <a:endParaRPr lang="en-US"/>
           </a:p>
@@ -8956,7 +8959,7 @@
           <a:p>
             <a:fld id="{FC366D49-0BBA-4C5A-AD96-6448CA63451A}" type="datetime1">
               <a:rPr lang="en-US" smtClean="0"/>
-              <a:t>3/7/2024</a:t>
+              <a:t>3/10/2024</a:t>
             </a:fld>
             <a:endParaRPr lang="en-US"/>
           </a:p>
@@ -9251,7 +9254,7 @@
           <a:p>
             <a:fld id="{4F4EB293-A316-472D-A8B4-6947CF1A12B7}" type="datetime1">
               <a:rPr lang="en-US" smtClean="0"/>
-              <a:t>3/7/2024</a:t>
+              <a:t>3/10/2024</a:t>
             </a:fld>
             <a:endParaRPr lang="en-US"/>
           </a:p>
@@ -9528,7 +9531,7 @@
           <a:p>
             <a:fld id="{734BCCD4-CEB1-405B-A443-DD9CBCBEA552}" type="datetime1">
               <a:rPr lang="en-US" smtClean="0"/>
-              <a:t>3/7/2024</a:t>
+              <a:t>3/10/2024</a:t>
             </a:fld>
             <a:endParaRPr lang="en-US"/>
           </a:p>
@@ -13000,6 +13003,910 @@
     <p:extLst>
       <p:ext uri="{BB962C8B-B14F-4D97-AF65-F5344CB8AC3E}">
         <p14:creationId xmlns:p14="http://schemas.microsoft.com/office/powerpoint/2010/main" val="3481441085"/>
+      </p:ext>
+    </p:extLst>
+  </p:cSld>
+  <p:clrMapOvr>
+    <a:masterClrMapping/>
+  </p:clrMapOvr>
+</p:sld>
+</file>
+
+<file path=ppt/slides/slide17.xml><?xml version="1.0" encoding="utf-8"?>
+<p:sld xmlns:a="http://schemas.openxmlformats.org/drawingml/2006/main" xmlns:r="http://schemas.openxmlformats.org/officeDocument/2006/relationships" xmlns:p="http://schemas.openxmlformats.org/presentationml/2006/main">
+  <p:cSld>
+    <p:spTree>
+      <p:nvGrpSpPr>
+        <p:cNvPr id="1" name="">
+          <a:extLst>
+            <a:ext uri="{FF2B5EF4-FFF2-40B4-BE49-F238E27FC236}">
+              <a16:creationId xmlns:a16="http://schemas.microsoft.com/office/drawing/2014/main" id="{5B25DB3D-1704-BC3E-48D2-68121F8EB476}"/>
+            </a:ext>
+          </a:extLst>
+        </p:cNvPr>
+        <p:cNvGrpSpPr/>
+        <p:nvPr/>
+      </p:nvGrpSpPr>
+      <p:grpSpPr>
+        <a:xfrm>
+          <a:off x="0" y="0"/>
+          <a:ext cx="0" cy="0"/>
+          <a:chOff x="0" y="0"/>
+          <a:chExt cx="0" cy="0"/>
+        </a:xfrm>
+      </p:grpSpPr>
+      <p:sp>
+        <p:nvSpPr>
+          <p:cNvPr id="2" name="Title 1">
+            <a:extLst>
+              <a:ext uri="{FF2B5EF4-FFF2-40B4-BE49-F238E27FC236}">
+                <a16:creationId xmlns:a16="http://schemas.microsoft.com/office/drawing/2014/main" id="{11E989E4-C03A-AFBD-BB91-ED4262763214}"/>
+              </a:ext>
+            </a:extLst>
+          </p:cNvPr>
+          <p:cNvSpPr>
+            <a:spLocks noGrp="1"/>
+          </p:cNvSpPr>
+          <p:nvPr>
+            <p:ph type="ctrTitle"/>
+          </p:nvPr>
+        </p:nvSpPr>
+        <p:spPr>
+          <a:xfrm>
+            <a:off x="517870" y="978408"/>
+            <a:ext cx="5021182" cy="1709890"/>
+          </a:xfrm>
+        </p:spPr>
+        <p:txBody>
+          <a:bodyPr anchor="t">
+            <a:normAutofit/>
+          </a:bodyPr>
+          <a:lstStyle/>
+          <a:p>
+            <a:r>
+              <a:rPr lang="en-US" dirty="0">
+                <a:solidFill>
+                  <a:schemeClr val="tx2"/>
+                </a:solidFill>
+              </a:rPr>
+              <a:t>Update 3</a:t>
+            </a:r>
+            <a:endParaRPr lang="en-US" b="0" dirty="0">
+              <a:solidFill>
+                <a:schemeClr val="tx2"/>
+              </a:solidFill>
+            </a:endParaRPr>
+          </a:p>
+        </p:txBody>
+      </p:sp>
+      <p:sp>
+        <p:nvSpPr>
+          <p:cNvPr id="3" name="Subtitle 2">
+            <a:extLst>
+              <a:ext uri="{FF2B5EF4-FFF2-40B4-BE49-F238E27FC236}">
+                <a16:creationId xmlns:a16="http://schemas.microsoft.com/office/drawing/2014/main" id="{447DBBBD-A93A-699E-9423-0639CE5D8F10}"/>
+              </a:ext>
+            </a:extLst>
+          </p:cNvPr>
+          <p:cNvSpPr>
+            <a:spLocks noGrp="1"/>
+          </p:cNvSpPr>
+          <p:nvPr>
+            <p:ph type="subTitle" idx="1"/>
+          </p:nvPr>
+        </p:nvSpPr>
+        <p:spPr>
+          <a:xfrm>
+            <a:off x="6652366" y="971398"/>
+            <a:ext cx="5040785" cy="1709890"/>
+          </a:xfrm>
+        </p:spPr>
+        <p:txBody>
+          <a:bodyPr anchor="t">
+            <a:normAutofit/>
+          </a:bodyPr>
+          <a:lstStyle/>
+          <a:p>
+            <a:pPr>
+              <a:lnSpc>
+                <a:spcPct val="90000"/>
+              </a:lnSpc>
+            </a:pPr>
+            <a:r>
+              <a:rPr lang="en-US" dirty="0"/>
+              <a:t>Frank Williams</a:t>
+            </a:r>
+          </a:p>
+          <a:p>
+            <a:pPr>
+              <a:lnSpc>
+                <a:spcPct val="90000"/>
+              </a:lnSpc>
+            </a:pPr>
+            <a:r>
+              <a:rPr lang="en-US" dirty="0"/>
+              <a:t>Adrian Torres</a:t>
+            </a:r>
+          </a:p>
+          <a:p>
+            <a:pPr>
+              <a:lnSpc>
+                <a:spcPct val="90000"/>
+              </a:lnSpc>
+            </a:pPr>
+            <a:r>
+              <a:rPr lang="en-US" dirty="0"/>
+              <a:t>Paige Madison</a:t>
+            </a:r>
+          </a:p>
+        </p:txBody>
+      </p:sp>
+      <p:pic>
+        <p:nvPicPr>
+          <p:cNvPr id="4" name="Picture 3" descr="A picture of an electromagnetic radiation">
+            <a:extLst>
+              <a:ext uri="{FF2B5EF4-FFF2-40B4-BE49-F238E27FC236}">
+                <a16:creationId xmlns:a16="http://schemas.microsoft.com/office/drawing/2014/main" id="{9DD5DA8A-ED90-8CE2-79AA-CCCE1BDCF2BB}"/>
+              </a:ext>
+            </a:extLst>
+          </p:cNvPr>
+          <p:cNvPicPr>
+            <a:picLocks noChangeAspect="1"/>
+          </p:cNvPicPr>
+          <p:nvPr/>
+        </p:nvPicPr>
+        <p:blipFill rotWithShape="1">
+          <a:blip r:embed="rId2"/>
+          <a:srcRect t="9753" b="6292"/>
+          <a:stretch/>
+        </p:blipFill>
+        <p:spPr>
+          <a:xfrm>
+            <a:off x="3044164" y="2916602"/>
+            <a:ext cx="6103672" cy="3433308"/>
+          </a:xfrm>
+          <a:prstGeom prst="rect">
+            <a:avLst/>
+          </a:prstGeom>
+        </p:spPr>
+      </p:pic>
+    </p:spTree>
+    <p:extLst>
+      <p:ext uri="{BB962C8B-B14F-4D97-AF65-F5344CB8AC3E}">
+        <p14:creationId xmlns:p14="http://schemas.microsoft.com/office/powerpoint/2010/main" val="4043696484"/>
+      </p:ext>
+    </p:extLst>
+  </p:cSld>
+  <p:clrMapOvr>
+    <a:masterClrMapping/>
+  </p:clrMapOvr>
+  <p:timing>
+    <p:tnLst>
+      <p:par>
+        <p:cTn id="1" dur="indefinite" restart="never" nodeType="tmRoot">
+          <p:childTnLst>
+            <p:seq concurrent="1" nextAc="seek">
+              <p:cTn id="2" dur="indefinite" nodeType="mainSeq">
+                <p:childTnLst>
+                  <p:par>
+                    <p:cTn id="3" fill="hold">
+                      <p:stCondLst>
+                        <p:cond delay="indefinite"/>
+                        <p:cond evt="onBegin" delay="0">
+                          <p:tn val="2"/>
+                        </p:cond>
+                      </p:stCondLst>
+                      <p:childTnLst>
+                        <p:par>
+                          <p:cTn id="4" fill="hold">
+                            <p:stCondLst>
+                              <p:cond delay="0"/>
+                            </p:stCondLst>
+                            <p:childTnLst>
+                              <p:par>
+                                <p:cTn id="5" presetID="10" presetClass="entr" presetSubtype="0" fill="hold" grpId="0" nodeType="withEffect">
+                                  <p:stCondLst>
+                                    <p:cond delay="1000"/>
+                                  </p:stCondLst>
+                                  <p:iterate type="lt">
+                                    <p:tmPct val="10000"/>
+                                  </p:iterate>
+                                  <p:childTnLst>
+                                    <p:set>
+                                      <p:cBhvr>
+                                        <p:cTn id="6" dur="1" fill="hold">
+                                          <p:stCondLst>
+                                            <p:cond delay="0"/>
+                                          </p:stCondLst>
+                                        </p:cTn>
+                                        <p:tgtEl>
+                                          <p:spTgt spid="2"/>
+                                        </p:tgtEl>
+                                        <p:attrNameLst>
+                                          <p:attrName>style.visibility</p:attrName>
+                                        </p:attrNameLst>
+                                      </p:cBhvr>
+                                      <p:to>
+                                        <p:strVal val="visible"/>
+                                      </p:to>
+                                    </p:set>
+                                    <p:animEffect transition="in" filter="fade">
+                                      <p:cBhvr>
+                                        <p:cTn id="7" dur="400"/>
+                                        <p:tgtEl>
+                                          <p:spTgt spid="2"/>
+                                        </p:tgtEl>
+                                      </p:cBhvr>
+                                    </p:animEffect>
+                                  </p:childTnLst>
+                                </p:cTn>
+                              </p:par>
+                            </p:childTnLst>
+                          </p:cTn>
+                        </p:par>
+                      </p:childTnLst>
+                    </p:cTn>
+                  </p:par>
+                </p:childTnLst>
+              </p:cTn>
+              <p:prevCondLst>
+                <p:cond evt="onPrev" delay="0">
+                  <p:tgtEl>
+                    <p:sldTgt/>
+                  </p:tgtEl>
+                </p:cond>
+              </p:prevCondLst>
+              <p:nextCondLst>
+                <p:cond evt="onNext" delay="0">
+                  <p:tgtEl>
+                    <p:sldTgt/>
+                  </p:tgtEl>
+                </p:cond>
+              </p:nextCondLst>
+            </p:seq>
+          </p:childTnLst>
+        </p:cTn>
+      </p:par>
+    </p:tnLst>
+    <p:bldLst>
+      <p:bldP spid="2" grpId="0"/>
+    </p:bldLst>
+  </p:timing>
+</p:sld>
+</file>
+
+<file path=ppt/slides/slide18.xml><?xml version="1.0" encoding="utf-8"?>
+<p:sld xmlns:a="http://schemas.openxmlformats.org/drawingml/2006/main" xmlns:r="http://schemas.openxmlformats.org/officeDocument/2006/relationships" xmlns:p="http://schemas.openxmlformats.org/presentationml/2006/main">
+  <p:cSld>
+    <p:spTree>
+      <p:nvGrpSpPr>
+        <p:cNvPr id="1" name=""/>
+        <p:cNvGrpSpPr/>
+        <p:nvPr/>
+      </p:nvGrpSpPr>
+      <p:grpSpPr>
+        <a:xfrm>
+          <a:off x="0" y="0"/>
+          <a:ext cx="0" cy="0"/>
+          <a:chOff x="0" y="0"/>
+          <a:chExt cx="0" cy="0"/>
+        </a:xfrm>
+      </p:grpSpPr>
+      <p:sp>
+        <p:nvSpPr>
+          <p:cNvPr id="2" name="Title 1">
+            <a:extLst>
+              <a:ext uri="{FF2B5EF4-FFF2-40B4-BE49-F238E27FC236}">
+                <a16:creationId xmlns:a16="http://schemas.microsoft.com/office/drawing/2014/main" id="{92FBF0EB-0901-2DD2-489D-525E570E7E54}"/>
+              </a:ext>
+            </a:extLst>
+          </p:cNvPr>
+          <p:cNvSpPr>
+            <a:spLocks noGrp="1"/>
+          </p:cNvSpPr>
+          <p:nvPr>
+            <p:ph type="title"/>
+          </p:nvPr>
+        </p:nvSpPr>
+        <p:spPr>
+          <a:xfrm>
+            <a:off x="517869" y="978408"/>
+            <a:ext cx="7734977" cy="2270641"/>
+          </a:xfrm>
+        </p:spPr>
+        <p:txBody>
+          <a:bodyPr/>
+          <a:lstStyle/>
+          <a:p>
+            <a:r>
+              <a:rPr lang="en-US" dirty="0"/>
+              <a:t>Main Questions After Exploratory Analysis</a:t>
+            </a:r>
+          </a:p>
+        </p:txBody>
+      </p:sp>
+      <p:sp>
+        <p:nvSpPr>
+          <p:cNvPr id="4" name="Text Placeholder 3">
+            <a:extLst>
+              <a:ext uri="{FF2B5EF4-FFF2-40B4-BE49-F238E27FC236}">
+                <a16:creationId xmlns:a16="http://schemas.microsoft.com/office/drawing/2014/main" id="{766FB7B2-3B0F-F3C3-0F97-4E911279C764}"/>
+              </a:ext>
+            </a:extLst>
+          </p:cNvPr>
+          <p:cNvSpPr>
+            <a:spLocks noGrp="1"/>
+          </p:cNvSpPr>
+          <p:nvPr>
+            <p:ph type="body" sz="half" idx="2"/>
+          </p:nvPr>
+        </p:nvSpPr>
+        <p:spPr>
+          <a:xfrm>
+            <a:off x="517870" y="2903838"/>
+            <a:ext cx="10479644" cy="3513895"/>
+          </a:xfrm>
+        </p:spPr>
+        <p:txBody>
+          <a:bodyPr>
+            <a:noAutofit/>
+          </a:bodyPr>
+          <a:lstStyle/>
+          <a:p>
+            <a:pPr lvl="1"/>
+            <a:r>
+              <a:rPr lang="en-US" sz="1800" dirty="0"/>
+              <a:t>Can we predict heart attacks?</a:t>
+            </a:r>
+          </a:p>
+          <a:p>
+            <a:pPr lvl="1"/>
+            <a:r>
+              <a:rPr lang="en-US" sz="1800" dirty="0"/>
+              <a:t>Which variables are the most important for predicting heart attacks?</a:t>
+            </a:r>
+          </a:p>
+          <a:p>
+            <a:pPr lvl="1"/>
+            <a:r>
+              <a:rPr lang="en-US" sz="1800" dirty="0"/>
+              <a:t>Are non-biological ailments like depression capable?</a:t>
+            </a:r>
+          </a:p>
+        </p:txBody>
+      </p:sp>
+    </p:spTree>
+    <p:extLst>
+      <p:ext uri="{BB962C8B-B14F-4D97-AF65-F5344CB8AC3E}">
+        <p14:creationId xmlns:p14="http://schemas.microsoft.com/office/powerpoint/2010/main" val="3988249590"/>
+      </p:ext>
+    </p:extLst>
+  </p:cSld>
+  <p:clrMapOvr>
+    <a:masterClrMapping/>
+  </p:clrMapOvr>
+</p:sld>
+</file>
+
+<file path=ppt/slides/slide19.xml><?xml version="1.0" encoding="utf-8"?>
+<p:sld xmlns:a="http://schemas.openxmlformats.org/drawingml/2006/main" xmlns:r="http://schemas.openxmlformats.org/officeDocument/2006/relationships" xmlns:p="http://schemas.openxmlformats.org/presentationml/2006/main">
+  <p:cSld>
+    <p:spTree>
+      <p:nvGrpSpPr>
+        <p:cNvPr id="1" name="">
+          <a:extLst>
+            <a:ext uri="{FF2B5EF4-FFF2-40B4-BE49-F238E27FC236}">
+              <a16:creationId xmlns:a16="http://schemas.microsoft.com/office/drawing/2014/main" id="{79C28D01-33D0-DF0E-952C-9E4BEE992F98}"/>
+            </a:ext>
+          </a:extLst>
+        </p:cNvPr>
+        <p:cNvGrpSpPr/>
+        <p:nvPr/>
+      </p:nvGrpSpPr>
+      <p:grpSpPr>
+        <a:xfrm>
+          <a:off x="0" y="0"/>
+          <a:ext cx="0" cy="0"/>
+          <a:chOff x="0" y="0"/>
+          <a:chExt cx="0" cy="0"/>
+        </a:xfrm>
+      </p:grpSpPr>
+      <p:sp>
+        <p:nvSpPr>
+          <p:cNvPr id="2" name="Title 1">
+            <a:extLst>
+              <a:ext uri="{FF2B5EF4-FFF2-40B4-BE49-F238E27FC236}">
+                <a16:creationId xmlns:a16="http://schemas.microsoft.com/office/drawing/2014/main" id="{A81D103A-A96E-2FC9-CF5D-D200E602C1E8}"/>
+              </a:ext>
+            </a:extLst>
+          </p:cNvPr>
+          <p:cNvSpPr>
+            <a:spLocks noGrp="1"/>
+          </p:cNvSpPr>
+          <p:nvPr>
+            <p:ph type="title"/>
+          </p:nvPr>
+        </p:nvSpPr>
+        <p:spPr>
+          <a:xfrm>
+            <a:off x="517869" y="987423"/>
+            <a:ext cx="10154363" cy="676277"/>
+          </a:xfrm>
+        </p:spPr>
+        <p:txBody>
+          <a:bodyPr/>
+          <a:lstStyle/>
+          <a:p>
+            <a:r>
+              <a:rPr lang="en-US" dirty="0"/>
+              <a:t>Attendance Records</a:t>
+            </a:r>
+          </a:p>
+        </p:txBody>
+      </p:sp>
+      <p:sp>
+        <p:nvSpPr>
+          <p:cNvPr id="6" name="Text Placeholder 3">
+            <a:extLst>
+              <a:ext uri="{FF2B5EF4-FFF2-40B4-BE49-F238E27FC236}">
+                <a16:creationId xmlns:a16="http://schemas.microsoft.com/office/drawing/2014/main" id="{4A0F0699-C7D3-FF1E-ECEF-664EAD9A5E9E}"/>
+              </a:ext>
+            </a:extLst>
+          </p:cNvPr>
+          <p:cNvSpPr txBox="1">
+            <a:spLocks/>
+          </p:cNvSpPr>
+          <p:nvPr/>
+        </p:nvSpPr>
+        <p:spPr>
+          <a:xfrm>
+            <a:off x="517869" y="2739578"/>
+            <a:ext cx="7427526" cy="1394595"/>
+          </a:xfrm>
+          <a:prstGeom prst="rect">
+            <a:avLst/>
+          </a:prstGeom>
+        </p:spPr>
+        <p:txBody>
+          <a:bodyPr vert="horz" lIns="91440" tIns="45720" rIns="91440" bIns="45720" rtlCol="0" anchor="t">
+            <a:noAutofit/>
+          </a:bodyPr>
+          <a:lstStyle>
+            <a:lvl1pPr marL="0" indent="0" algn="l" defTabSz="914400" rtl="0" eaLnBrk="1" latinLnBrk="0" hangingPunct="1">
+              <a:lnSpc>
+                <a:spcPct val="110000"/>
+              </a:lnSpc>
+              <a:spcBef>
+                <a:spcPts val="1000"/>
+              </a:spcBef>
+              <a:buFont typeface="Arial" panose="020B0604020202020204" pitchFamily="34" charset="0"/>
+              <a:buNone/>
+              <a:defRPr sz="2400" b="0" i="1" kern="1200">
+                <a:solidFill>
+                  <a:schemeClr val="tx1"/>
+                </a:solidFill>
+                <a:latin typeface="+mn-lt"/>
+                <a:ea typeface="+mn-ea"/>
+                <a:cs typeface="+mn-cs"/>
+              </a:defRPr>
+            </a:lvl1pPr>
+            <a:lvl2pPr marL="457200" indent="0" algn="l" defTabSz="914400" rtl="0" eaLnBrk="1" latinLnBrk="0" hangingPunct="1">
+              <a:lnSpc>
+                <a:spcPct val="110000"/>
+              </a:lnSpc>
+              <a:spcBef>
+                <a:spcPts val="500"/>
+              </a:spcBef>
+              <a:buFont typeface="Arial" panose="020B0604020202020204" pitchFamily="34" charset="0"/>
+              <a:buNone/>
+              <a:defRPr sz="1400" kern="1200">
+                <a:solidFill>
+                  <a:schemeClr val="tx1"/>
+                </a:solidFill>
+                <a:latin typeface="+mn-lt"/>
+                <a:ea typeface="+mn-ea"/>
+                <a:cs typeface="+mn-cs"/>
+              </a:defRPr>
+            </a:lvl2pPr>
+            <a:lvl3pPr marL="914400" indent="0" algn="l" defTabSz="914400" rtl="0" eaLnBrk="1" latinLnBrk="0" hangingPunct="1">
+              <a:lnSpc>
+                <a:spcPct val="110000"/>
+              </a:lnSpc>
+              <a:spcBef>
+                <a:spcPts val="500"/>
+              </a:spcBef>
+              <a:buFont typeface="Arial" panose="020B0604020202020204" pitchFamily="34" charset="0"/>
+              <a:buNone/>
+              <a:defRPr sz="1200" kern="1200">
+                <a:solidFill>
+                  <a:schemeClr val="tx1"/>
+                </a:solidFill>
+                <a:latin typeface="+mn-lt"/>
+                <a:ea typeface="+mn-ea"/>
+                <a:cs typeface="+mn-cs"/>
+              </a:defRPr>
+            </a:lvl3pPr>
+            <a:lvl4pPr marL="1371600" indent="0" algn="l" defTabSz="914400" rtl="0" eaLnBrk="1" latinLnBrk="0" hangingPunct="1">
+              <a:lnSpc>
+                <a:spcPct val="110000"/>
+              </a:lnSpc>
+              <a:spcBef>
+                <a:spcPts val="500"/>
+              </a:spcBef>
+              <a:buFont typeface="Arial" panose="020B0604020202020204" pitchFamily="34" charset="0"/>
+              <a:buNone/>
+              <a:defRPr sz="1000" kern="1200">
+                <a:solidFill>
+                  <a:schemeClr val="tx1"/>
+                </a:solidFill>
+                <a:latin typeface="+mn-lt"/>
+                <a:ea typeface="+mn-ea"/>
+                <a:cs typeface="+mn-cs"/>
+              </a:defRPr>
+            </a:lvl4pPr>
+            <a:lvl5pPr marL="1828800" indent="0" algn="l" defTabSz="914400" rtl="0" eaLnBrk="1" latinLnBrk="0" hangingPunct="1">
+              <a:lnSpc>
+                <a:spcPct val="110000"/>
+              </a:lnSpc>
+              <a:spcBef>
+                <a:spcPts val="500"/>
+              </a:spcBef>
+              <a:buFont typeface="Arial" panose="020B0604020202020204" pitchFamily="34" charset="0"/>
+              <a:buNone/>
+              <a:defRPr sz="1000" kern="1200">
+                <a:solidFill>
+                  <a:schemeClr val="tx1"/>
+                </a:solidFill>
+                <a:latin typeface="+mn-lt"/>
+                <a:ea typeface="+mn-ea"/>
+                <a:cs typeface="+mn-cs"/>
+              </a:defRPr>
+            </a:lvl5pPr>
+            <a:lvl6pPr marL="2286000" indent="0" algn="l" defTabSz="914400" rtl="0" eaLnBrk="1" latinLnBrk="0" hangingPunct="1">
+              <a:lnSpc>
+                <a:spcPct val="90000"/>
+              </a:lnSpc>
+              <a:spcBef>
+                <a:spcPts val="500"/>
+              </a:spcBef>
+              <a:buFont typeface="Arial" panose="020B0604020202020204" pitchFamily="34" charset="0"/>
+              <a:buNone/>
+              <a:defRPr sz="1000" kern="1200">
+                <a:solidFill>
+                  <a:schemeClr val="tx1"/>
+                </a:solidFill>
+                <a:latin typeface="+mn-lt"/>
+                <a:ea typeface="+mn-ea"/>
+                <a:cs typeface="+mn-cs"/>
+              </a:defRPr>
+            </a:lvl6pPr>
+            <a:lvl7pPr marL="2743200" indent="0" algn="l" defTabSz="914400" rtl="0" eaLnBrk="1" latinLnBrk="0" hangingPunct="1">
+              <a:lnSpc>
+                <a:spcPct val="90000"/>
+              </a:lnSpc>
+              <a:spcBef>
+                <a:spcPts val="500"/>
+              </a:spcBef>
+              <a:buFont typeface="Arial" panose="020B0604020202020204" pitchFamily="34" charset="0"/>
+              <a:buNone/>
+              <a:defRPr sz="1000" kern="1200">
+                <a:solidFill>
+                  <a:schemeClr val="tx1"/>
+                </a:solidFill>
+                <a:latin typeface="+mn-lt"/>
+                <a:ea typeface="+mn-ea"/>
+                <a:cs typeface="+mn-cs"/>
+              </a:defRPr>
+            </a:lvl7pPr>
+            <a:lvl8pPr marL="3200400" indent="0" algn="l" defTabSz="914400" rtl="0" eaLnBrk="1" latinLnBrk="0" hangingPunct="1">
+              <a:lnSpc>
+                <a:spcPct val="90000"/>
+              </a:lnSpc>
+              <a:spcBef>
+                <a:spcPts val="500"/>
+              </a:spcBef>
+              <a:buFont typeface="Arial" panose="020B0604020202020204" pitchFamily="34" charset="0"/>
+              <a:buNone/>
+              <a:defRPr sz="1000" kern="1200">
+                <a:solidFill>
+                  <a:schemeClr val="tx1"/>
+                </a:solidFill>
+                <a:latin typeface="+mn-lt"/>
+                <a:ea typeface="+mn-ea"/>
+                <a:cs typeface="+mn-cs"/>
+              </a:defRPr>
+            </a:lvl8pPr>
+            <a:lvl9pPr marL="3657600" indent="0" algn="l" defTabSz="914400" rtl="0" eaLnBrk="1" latinLnBrk="0" hangingPunct="1">
+              <a:lnSpc>
+                <a:spcPct val="90000"/>
+              </a:lnSpc>
+              <a:spcBef>
+                <a:spcPts val="500"/>
+              </a:spcBef>
+              <a:buFont typeface="Arial" panose="020B0604020202020204" pitchFamily="34" charset="0"/>
+              <a:buNone/>
+              <a:defRPr sz="1000" kern="1200">
+                <a:solidFill>
+                  <a:schemeClr val="tx1"/>
+                </a:solidFill>
+                <a:latin typeface="+mn-lt"/>
+                <a:ea typeface="+mn-ea"/>
+                <a:cs typeface="+mn-cs"/>
+              </a:defRPr>
+            </a:lvl9pPr>
+          </a:lstStyle>
+          <a:p>
+            <a:r>
+              <a:rPr lang="en-US" sz="1400" b="1" dirty="0"/>
+              <a:t>Attendance for all meetings:</a:t>
+            </a:r>
+          </a:p>
+          <a:p>
+            <a:pPr>
+              <a:lnSpc>
+                <a:spcPct val="90000"/>
+              </a:lnSpc>
+            </a:pPr>
+            <a:r>
+              <a:rPr lang="en-US" sz="1400" dirty="0"/>
+              <a:t>Frank Williams</a:t>
+            </a:r>
+          </a:p>
+          <a:p>
+            <a:pPr>
+              <a:lnSpc>
+                <a:spcPct val="90000"/>
+              </a:lnSpc>
+            </a:pPr>
+            <a:r>
+              <a:rPr lang="en-US" sz="1400" dirty="0"/>
+              <a:t>Adrian Torres</a:t>
+            </a:r>
+          </a:p>
+          <a:p>
+            <a:pPr>
+              <a:lnSpc>
+                <a:spcPct val="90000"/>
+              </a:lnSpc>
+            </a:pPr>
+            <a:r>
+              <a:rPr lang="en-US" sz="1400" dirty="0"/>
+              <a:t>Paige Madison</a:t>
+            </a:r>
+          </a:p>
+          <a:p>
+            <a:endParaRPr lang="en-US" sz="1400" dirty="0"/>
+          </a:p>
+        </p:txBody>
+      </p:sp>
+      <p:sp>
+        <p:nvSpPr>
+          <p:cNvPr id="7" name="Text Placeholder 3">
+            <a:extLst>
+              <a:ext uri="{FF2B5EF4-FFF2-40B4-BE49-F238E27FC236}">
+                <a16:creationId xmlns:a16="http://schemas.microsoft.com/office/drawing/2014/main" id="{AB32C3E6-2ACE-6934-CE52-BFC67554B91D}"/>
+              </a:ext>
+            </a:extLst>
+          </p:cNvPr>
+          <p:cNvSpPr txBox="1">
+            <a:spLocks/>
+          </p:cNvSpPr>
+          <p:nvPr/>
+        </p:nvSpPr>
+        <p:spPr>
+          <a:xfrm>
+            <a:off x="517869" y="4183323"/>
+            <a:ext cx="6684968" cy="2039246"/>
+          </a:xfrm>
+          <a:prstGeom prst="rect">
+            <a:avLst/>
+          </a:prstGeom>
+        </p:spPr>
+        <p:txBody>
+          <a:bodyPr vert="horz" lIns="91440" tIns="45720" rIns="91440" bIns="45720" rtlCol="0" anchor="t">
+            <a:noAutofit/>
+          </a:bodyPr>
+          <a:lstStyle>
+            <a:lvl1pPr marL="0" indent="0" algn="l" defTabSz="914400" rtl="0" eaLnBrk="1" latinLnBrk="0" hangingPunct="1">
+              <a:lnSpc>
+                <a:spcPct val="110000"/>
+              </a:lnSpc>
+              <a:spcBef>
+                <a:spcPts val="1000"/>
+              </a:spcBef>
+              <a:buFont typeface="Arial" panose="020B0604020202020204" pitchFamily="34" charset="0"/>
+              <a:buNone/>
+              <a:defRPr sz="2400" b="0" i="1" kern="1200">
+                <a:solidFill>
+                  <a:schemeClr val="tx1"/>
+                </a:solidFill>
+                <a:latin typeface="+mn-lt"/>
+                <a:ea typeface="+mn-ea"/>
+                <a:cs typeface="+mn-cs"/>
+              </a:defRPr>
+            </a:lvl1pPr>
+            <a:lvl2pPr marL="457200" indent="0" algn="l" defTabSz="914400" rtl="0" eaLnBrk="1" latinLnBrk="0" hangingPunct="1">
+              <a:lnSpc>
+                <a:spcPct val="110000"/>
+              </a:lnSpc>
+              <a:spcBef>
+                <a:spcPts val="500"/>
+              </a:spcBef>
+              <a:buFont typeface="Arial" panose="020B0604020202020204" pitchFamily="34" charset="0"/>
+              <a:buNone/>
+              <a:defRPr sz="1400" kern="1200">
+                <a:solidFill>
+                  <a:schemeClr val="tx1"/>
+                </a:solidFill>
+                <a:latin typeface="+mn-lt"/>
+                <a:ea typeface="+mn-ea"/>
+                <a:cs typeface="+mn-cs"/>
+              </a:defRPr>
+            </a:lvl2pPr>
+            <a:lvl3pPr marL="914400" indent="0" algn="l" defTabSz="914400" rtl="0" eaLnBrk="1" latinLnBrk="0" hangingPunct="1">
+              <a:lnSpc>
+                <a:spcPct val="110000"/>
+              </a:lnSpc>
+              <a:spcBef>
+                <a:spcPts val="500"/>
+              </a:spcBef>
+              <a:buFont typeface="Arial" panose="020B0604020202020204" pitchFamily="34" charset="0"/>
+              <a:buNone/>
+              <a:defRPr sz="1200" kern="1200">
+                <a:solidFill>
+                  <a:schemeClr val="tx1"/>
+                </a:solidFill>
+                <a:latin typeface="+mn-lt"/>
+                <a:ea typeface="+mn-ea"/>
+                <a:cs typeface="+mn-cs"/>
+              </a:defRPr>
+            </a:lvl3pPr>
+            <a:lvl4pPr marL="1371600" indent="0" algn="l" defTabSz="914400" rtl="0" eaLnBrk="1" latinLnBrk="0" hangingPunct="1">
+              <a:lnSpc>
+                <a:spcPct val="110000"/>
+              </a:lnSpc>
+              <a:spcBef>
+                <a:spcPts val="500"/>
+              </a:spcBef>
+              <a:buFont typeface="Arial" panose="020B0604020202020204" pitchFamily="34" charset="0"/>
+              <a:buNone/>
+              <a:defRPr sz="1000" kern="1200">
+                <a:solidFill>
+                  <a:schemeClr val="tx1"/>
+                </a:solidFill>
+                <a:latin typeface="+mn-lt"/>
+                <a:ea typeface="+mn-ea"/>
+                <a:cs typeface="+mn-cs"/>
+              </a:defRPr>
+            </a:lvl4pPr>
+            <a:lvl5pPr marL="1828800" indent="0" algn="l" defTabSz="914400" rtl="0" eaLnBrk="1" latinLnBrk="0" hangingPunct="1">
+              <a:lnSpc>
+                <a:spcPct val="110000"/>
+              </a:lnSpc>
+              <a:spcBef>
+                <a:spcPts val="500"/>
+              </a:spcBef>
+              <a:buFont typeface="Arial" panose="020B0604020202020204" pitchFamily="34" charset="0"/>
+              <a:buNone/>
+              <a:defRPr sz="1000" kern="1200">
+                <a:solidFill>
+                  <a:schemeClr val="tx1"/>
+                </a:solidFill>
+                <a:latin typeface="+mn-lt"/>
+                <a:ea typeface="+mn-ea"/>
+                <a:cs typeface="+mn-cs"/>
+              </a:defRPr>
+            </a:lvl5pPr>
+            <a:lvl6pPr marL="2286000" indent="0" algn="l" defTabSz="914400" rtl="0" eaLnBrk="1" latinLnBrk="0" hangingPunct="1">
+              <a:lnSpc>
+                <a:spcPct val="90000"/>
+              </a:lnSpc>
+              <a:spcBef>
+                <a:spcPts val="500"/>
+              </a:spcBef>
+              <a:buFont typeface="Arial" panose="020B0604020202020204" pitchFamily="34" charset="0"/>
+              <a:buNone/>
+              <a:defRPr sz="1000" kern="1200">
+                <a:solidFill>
+                  <a:schemeClr val="tx1"/>
+                </a:solidFill>
+                <a:latin typeface="+mn-lt"/>
+                <a:ea typeface="+mn-ea"/>
+                <a:cs typeface="+mn-cs"/>
+              </a:defRPr>
+            </a:lvl6pPr>
+            <a:lvl7pPr marL="2743200" indent="0" algn="l" defTabSz="914400" rtl="0" eaLnBrk="1" latinLnBrk="0" hangingPunct="1">
+              <a:lnSpc>
+                <a:spcPct val="90000"/>
+              </a:lnSpc>
+              <a:spcBef>
+                <a:spcPts val="500"/>
+              </a:spcBef>
+              <a:buFont typeface="Arial" panose="020B0604020202020204" pitchFamily="34" charset="0"/>
+              <a:buNone/>
+              <a:defRPr sz="1000" kern="1200">
+                <a:solidFill>
+                  <a:schemeClr val="tx1"/>
+                </a:solidFill>
+                <a:latin typeface="+mn-lt"/>
+                <a:ea typeface="+mn-ea"/>
+                <a:cs typeface="+mn-cs"/>
+              </a:defRPr>
+            </a:lvl7pPr>
+            <a:lvl8pPr marL="3200400" indent="0" algn="l" defTabSz="914400" rtl="0" eaLnBrk="1" latinLnBrk="0" hangingPunct="1">
+              <a:lnSpc>
+                <a:spcPct val="90000"/>
+              </a:lnSpc>
+              <a:spcBef>
+                <a:spcPts val="500"/>
+              </a:spcBef>
+              <a:buFont typeface="Arial" panose="020B0604020202020204" pitchFamily="34" charset="0"/>
+              <a:buNone/>
+              <a:defRPr sz="1000" kern="1200">
+                <a:solidFill>
+                  <a:schemeClr val="tx1"/>
+                </a:solidFill>
+                <a:latin typeface="+mn-lt"/>
+                <a:ea typeface="+mn-ea"/>
+                <a:cs typeface="+mn-cs"/>
+              </a:defRPr>
+            </a:lvl8pPr>
+            <a:lvl9pPr marL="3657600" indent="0" algn="l" defTabSz="914400" rtl="0" eaLnBrk="1" latinLnBrk="0" hangingPunct="1">
+              <a:lnSpc>
+                <a:spcPct val="90000"/>
+              </a:lnSpc>
+              <a:spcBef>
+                <a:spcPts val="500"/>
+              </a:spcBef>
+              <a:buFont typeface="Arial" panose="020B0604020202020204" pitchFamily="34" charset="0"/>
+              <a:buNone/>
+              <a:defRPr sz="1000" kern="1200">
+                <a:solidFill>
+                  <a:schemeClr val="tx1"/>
+                </a:solidFill>
+                <a:latin typeface="+mn-lt"/>
+                <a:ea typeface="+mn-ea"/>
+                <a:cs typeface="+mn-cs"/>
+              </a:defRPr>
+            </a:lvl9pPr>
+          </a:lstStyle>
+          <a:p>
+            <a:r>
+              <a:rPr lang="en-US" sz="1400" b="1" dirty="0"/>
+              <a:t>On 03/10/2024(Duration: 1hr)-</a:t>
+            </a:r>
+            <a:br>
+              <a:rPr lang="en-US" sz="1400" b="1" dirty="0"/>
+            </a:br>
+            <a:r>
+              <a:rPr lang="en-US" sz="1400" b="1" dirty="0"/>
+              <a:t>Narrowed down paper breakdown and the three main questions we have evidence for.</a:t>
+            </a:r>
+          </a:p>
+          <a:p>
+            <a:endParaRPr lang="en-US" sz="1400" b="1" dirty="0"/>
+          </a:p>
+          <a:p>
+            <a:endParaRPr lang="en-US" sz="1400" dirty="0"/>
+          </a:p>
+          <a:p>
+            <a:endParaRPr lang="en-US" sz="1400" dirty="0"/>
+          </a:p>
+          <a:p>
+            <a:endParaRPr lang="en-US" sz="1400" dirty="0"/>
+          </a:p>
+          <a:p>
+            <a:endParaRPr lang="en-US" sz="1400" dirty="0"/>
+          </a:p>
+          <a:p>
+            <a:endParaRPr lang="en-US" sz="1400" dirty="0"/>
+          </a:p>
+        </p:txBody>
+      </p:sp>
+    </p:spTree>
+    <p:extLst>
+      <p:ext uri="{BB962C8B-B14F-4D97-AF65-F5344CB8AC3E}">
+        <p14:creationId xmlns:p14="http://schemas.microsoft.com/office/powerpoint/2010/main" val="3885621555"/>
       </p:ext>
     </p:extLst>
   </p:cSld>
@@ -18342,6 +19249,23 @@
 </file>
 
 <file path=customXml/item1.xml><?xml version="1.0" encoding="utf-8"?>
+<p:properties xmlns:p="http://schemas.microsoft.com/office/2006/metadata/properties" xmlns:xsi="http://www.w3.org/2001/XMLSchema-instance" xmlns:pc="http://schemas.microsoft.com/office/infopath/2007/PartnerControls">
+  <documentManagement>
+    <_activity xmlns="1bb7031c-a8b4-4cbe-98f2-525d179cfc77" xsi:nil="true"/>
+  </documentManagement>
+</p:properties>
+</file>
+
+<file path=customXml/item2.xml><?xml version="1.0" encoding="utf-8"?>
+<?mso-contentType ?>
+<FormTemplates xmlns="http://schemas.microsoft.com/sharepoint/v3/contenttype/forms">
+  <Display>DocumentLibraryForm</Display>
+  <Edit>DocumentLibraryForm</Edit>
+  <New>DocumentLibraryForm</New>
+</FormTemplates>
+</file>
+
+<file path=customXml/item3.xml><?xml version="1.0" encoding="utf-8"?>
 <ct:contentTypeSchema xmlns:ct="http://schemas.microsoft.com/office/2006/metadata/contentType" xmlns:ma="http://schemas.microsoft.com/office/2006/metadata/properties/metaAttributes" ct:_="" ma:_="" ma:contentTypeName="Document" ma:contentTypeID="0x01010025C3CCE2691F374E8A682604DBAFCEB8" ma:contentTypeVersion="8" ma:contentTypeDescription="Create a new document." ma:contentTypeScope="" ma:versionID="e44a2bde4a21e5fc7f073e5891c1620c">
   <xsd:schema xmlns:xsd="http://www.w3.org/2001/XMLSchema" xmlns:xs="http://www.w3.org/2001/XMLSchema" xmlns:p="http://schemas.microsoft.com/office/2006/metadata/properties" xmlns:ns3="1bb7031c-a8b4-4cbe-98f2-525d179cfc77" xmlns:ns4="c1f6d79c-77e4-4aca-9148-98b3b94f6507" targetNamespace="http://schemas.microsoft.com/office/2006/metadata/properties" ma:root="true" ma:fieldsID="50d934612a8cb0ade44dfd10f47000e8" ns3:_="" ns4:_="">
     <xsd:import namespace="1bb7031c-a8b4-4cbe-98f2-525d179cfc77"/>
@@ -18530,24 +19454,32 @@
 </ct:contentTypeSchema>
 </file>
 
-<file path=customXml/item2.xml><?xml version="1.0" encoding="utf-8"?>
-<?mso-contentType ?>
-<FormTemplates xmlns="http://schemas.microsoft.com/sharepoint/v3/contenttype/forms">
-  <Display>DocumentLibraryForm</Display>
-  <Edit>DocumentLibraryForm</Edit>
-  <New>DocumentLibraryForm</New>
-</FormTemplates>
+<file path=customXml/itemProps1.xml><?xml version="1.0" encoding="utf-8"?>
+<ds:datastoreItem xmlns:ds="http://schemas.openxmlformats.org/officeDocument/2006/customXml" ds:itemID="{A6CFE1F4-DC23-4922-8914-581F71D27CC2}">
+  <ds:schemaRefs>
+    <ds:schemaRef ds:uri="http://www.w3.org/XML/1998/namespace"/>
+    <ds:schemaRef ds:uri="c1f6d79c-77e4-4aca-9148-98b3b94f6507"/>
+    <ds:schemaRef ds:uri="http://purl.org/dc/dcmitype/"/>
+    <ds:schemaRef ds:uri="http://schemas.microsoft.com/office/2006/metadata/properties"/>
+    <ds:schemaRef ds:uri="http://schemas.microsoft.com/office/2006/documentManagement/types"/>
+    <ds:schemaRef ds:uri="1bb7031c-a8b4-4cbe-98f2-525d179cfc77"/>
+    <ds:schemaRef ds:uri="http://purl.org/dc/terms/"/>
+    <ds:schemaRef ds:uri="http://schemas.microsoft.com/office/infopath/2007/PartnerControls"/>
+    <ds:schemaRef ds:uri="http://schemas.openxmlformats.org/package/2006/metadata/core-properties"/>
+    <ds:schemaRef ds:uri="http://purl.org/dc/elements/1.1/"/>
+  </ds:schemaRefs>
+</ds:datastoreItem>
 </file>
 
-<file path=customXml/item3.xml><?xml version="1.0" encoding="utf-8"?>
-<p:properties xmlns:p="http://schemas.microsoft.com/office/2006/metadata/properties" xmlns:xsi="http://www.w3.org/2001/XMLSchema-instance" xmlns:pc="http://schemas.microsoft.com/office/infopath/2007/PartnerControls">
-  <documentManagement>
-    <_activity xmlns="1bb7031c-a8b4-4cbe-98f2-525d179cfc77" xsi:nil="true"/>
-  </documentManagement>
-</p:properties>
+<file path=customXml/itemProps2.xml><?xml version="1.0" encoding="utf-8"?>
+<ds:datastoreItem xmlns:ds="http://schemas.openxmlformats.org/officeDocument/2006/customXml" ds:itemID="{144358F8-A1A2-4C12-9300-834AC979E5E3}">
+  <ds:schemaRefs>
+    <ds:schemaRef ds:uri="http://schemas.microsoft.com/sharepoint/v3/contenttype/forms"/>
+  </ds:schemaRefs>
+</ds:datastoreItem>
 </file>
 
-<file path=customXml/itemProps1.xml><?xml version="1.0" encoding="utf-8"?>
+<file path=customXml/itemProps3.xml><?xml version="1.0" encoding="utf-8"?>
 <ds:datastoreItem xmlns:ds="http://schemas.openxmlformats.org/officeDocument/2006/customXml" ds:itemID="{E501FBCF-1E08-43BD-A885-0DEB57D7635A}">
   <ds:schemaRefs>
     <ds:schemaRef ds:uri="1bb7031c-a8b4-4cbe-98f2-525d179cfc77"/>
@@ -18564,29 +19496,4 @@
     <ds:schemaRef ds:uri="http://www.w3.org/2001/XMLSchema"/>
   </ds:schemaRefs>
 </ds:datastoreItem>
-</file>
-
-<file path=customXml/itemProps2.xml><?xml version="1.0" encoding="utf-8"?>
-<ds:datastoreItem xmlns:ds="http://schemas.openxmlformats.org/officeDocument/2006/customXml" ds:itemID="{144358F8-A1A2-4C12-9300-834AC979E5E3}">
-  <ds:schemaRefs>
-    <ds:schemaRef ds:uri="http://schemas.microsoft.com/sharepoint/v3/contenttype/forms"/>
-  </ds:schemaRefs>
-</ds:datastoreItem>
-</file>
-
-<file path=customXml/itemProps3.xml><?xml version="1.0" encoding="utf-8"?>
-<ds:datastoreItem xmlns:ds="http://schemas.openxmlformats.org/officeDocument/2006/customXml" ds:itemID="{A6CFE1F4-DC23-4922-8914-581F71D27CC2}">
-  <ds:schemaRefs>
-    <ds:schemaRef ds:uri="http://www.w3.org/XML/1998/namespace"/>
-    <ds:schemaRef ds:uri="c1f6d79c-77e4-4aca-9148-98b3b94f6507"/>
-    <ds:schemaRef ds:uri="http://purl.org/dc/dcmitype/"/>
-    <ds:schemaRef ds:uri="http://schemas.microsoft.com/office/2006/metadata/properties"/>
-    <ds:schemaRef ds:uri="http://schemas.microsoft.com/office/2006/documentManagement/types"/>
-    <ds:schemaRef ds:uri="1bb7031c-a8b4-4cbe-98f2-525d179cfc77"/>
-    <ds:schemaRef ds:uri="http://purl.org/dc/terms/"/>
-    <ds:schemaRef ds:uri="http://schemas.microsoft.com/office/infopath/2007/PartnerControls"/>
-    <ds:schemaRef ds:uri="http://schemas.openxmlformats.org/package/2006/metadata/core-properties"/>
-    <ds:schemaRef ds:uri="http://purl.org/dc/elements/1.1/"/>
-  </ds:schemaRefs>
-</ds:datastoreItem>
 </file>
</xml_diff>

<commit_message>
All recent changes for Update 3
</commit_message>
<xml_diff>
--- a/Final_Group_Project_Project 1.pptx
+++ b/Final_Group_Project_Project 1.pptx
@@ -22,8 +22,10 @@
     <p:sldId id="273" r:id="rId19"/>
     <p:sldId id="269" r:id="rId20"/>
     <p:sldId id="277" r:id="rId21"/>
-    <p:sldId id="279" r:id="rId22"/>
-    <p:sldId id="278" r:id="rId23"/>
+    <p:sldId id="280" r:id="rId22"/>
+    <p:sldId id="279" r:id="rId23"/>
+    <p:sldId id="281" r:id="rId24"/>
+    <p:sldId id="278" r:id="rId25"/>
   </p:sldIdLst>
   <p:sldSz cx="12192000" cy="6858000"/>
   <p:notesSz cx="6858000" cy="9144000"/>
@@ -13297,6 +13299,703 @@
           <p:cNvPr id="2" name="Title 1">
             <a:extLst>
               <a:ext uri="{FF2B5EF4-FFF2-40B4-BE49-F238E27FC236}">
+                <a16:creationId xmlns:a16="http://schemas.microsoft.com/office/drawing/2014/main" id="{CEFEA5CF-0A0D-3E22-51AB-F0BF3ADAD90A}"/>
+              </a:ext>
+            </a:extLst>
+          </p:cNvPr>
+          <p:cNvSpPr>
+            <a:spLocks noGrp="1"/>
+          </p:cNvSpPr>
+          <p:nvPr>
+            <p:ph type="title"/>
+          </p:nvPr>
+        </p:nvSpPr>
+        <p:spPr>
+          <a:xfrm>
+            <a:off x="517870" y="978408"/>
+            <a:ext cx="5021182" cy="1709890"/>
+          </a:xfrm>
+        </p:spPr>
+        <p:txBody>
+          <a:bodyPr vert="horz" lIns="91440" tIns="45720" rIns="91440" bIns="45720" rtlCol="0" anchor="t">
+            <a:normAutofit/>
+          </a:bodyPr>
+          <a:lstStyle/>
+          <a:p>
+            <a:pPr>
+              <a:lnSpc>
+                <a:spcPct val="90000"/>
+              </a:lnSpc>
+            </a:pPr>
+            <a:r>
+              <a:rPr lang="en-US" sz="4600" dirty="0">
+                <a:solidFill>
+                  <a:schemeClr val="tx2"/>
+                </a:solidFill>
+              </a:rPr>
+              <a:t>Project Summary</a:t>
+            </a:r>
+          </a:p>
+        </p:txBody>
+      </p:sp>
+      <p:sp>
+        <p:nvSpPr>
+          <p:cNvPr id="5" name="Text Placeholder 3">
+            <a:extLst>
+              <a:ext uri="{FF2B5EF4-FFF2-40B4-BE49-F238E27FC236}">
+                <a16:creationId xmlns:a16="http://schemas.microsoft.com/office/drawing/2014/main" id="{8E5CAF51-111F-C188-E90F-3B37CB3509BC}"/>
+              </a:ext>
+            </a:extLst>
+          </p:cNvPr>
+          <p:cNvSpPr txBox="1">
+            <a:spLocks/>
+          </p:cNvSpPr>
+          <p:nvPr/>
+        </p:nvSpPr>
+        <p:spPr>
+          <a:xfrm>
+            <a:off x="517869" y="4413422"/>
+            <a:ext cx="9697049" cy="2022389"/>
+          </a:xfrm>
+          <a:prstGeom prst="rect">
+            <a:avLst/>
+          </a:prstGeom>
+        </p:spPr>
+        <p:txBody>
+          <a:bodyPr vert="horz" lIns="91440" tIns="45720" rIns="91440" bIns="45720" rtlCol="0">
+            <a:normAutofit/>
+          </a:bodyPr>
+          <a:lstStyle>
+            <a:lvl1pPr marL="0" indent="0" algn="l" defTabSz="914400" rtl="0" eaLnBrk="1" latinLnBrk="0" hangingPunct="1">
+              <a:lnSpc>
+                <a:spcPct val="110000"/>
+              </a:lnSpc>
+              <a:spcBef>
+                <a:spcPts val="1000"/>
+              </a:spcBef>
+              <a:buFont typeface="Arial" panose="020B0604020202020204" pitchFamily="34" charset="0"/>
+              <a:buNone/>
+              <a:defRPr sz="2400" b="0" i="1" kern="1200">
+                <a:solidFill>
+                  <a:schemeClr val="tx1"/>
+                </a:solidFill>
+                <a:latin typeface="+mn-lt"/>
+                <a:ea typeface="+mn-ea"/>
+                <a:cs typeface="+mn-cs"/>
+              </a:defRPr>
+            </a:lvl1pPr>
+            <a:lvl2pPr marL="457200" indent="0" algn="l" defTabSz="914400" rtl="0" eaLnBrk="1" latinLnBrk="0" hangingPunct="1">
+              <a:lnSpc>
+                <a:spcPct val="110000"/>
+              </a:lnSpc>
+              <a:spcBef>
+                <a:spcPts val="500"/>
+              </a:spcBef>
+              <a:buFont typeface="Arial" panose="020B0604020202020204" pitchFamily="34" charset="0"/>
+              <a:buNone/>
+              <a:defRPr sz="1400" kern="1200">
+                <a:solidFill>
+                  <a:schemeClr val="tx1"/>
+                </a:solidFill>
+                <a:latin typeface="+mn-lt"/>
+                <a:ea typeface="+mn-ea"/>
+                <a:cs typeface="+mn-cs"/>
+              </a:defRPr>
+            </a:lvl2pPr>
+            <a:lvl3pPr marL="914400" indent="0" algn="l" defTabSz="914400" rtl="0" eaLnBrk="1" latinLnBrk="0" hangingPunct="1">
+              <a:lnSpc>
+                <a:spcPct val="110000"/>
+              </a:lnSpc>
+              <a:spcBef>
+                <a:spcPts val="500"/>
+              </a:spcBef>
+              <a:buFont typeface="Arial" panose="020B0604020202020204" pitchFamily="34" charset="0"/>
+              <a:buNone/>
+              <a:defRPr sz="1200" kern="1200">
+                <a:solidFill>
+                  <a:schemeClr val="tx1"/>
+                </a:solidFill>
+                <a:latin typeface="+mn-lt"/>
+                <a:ea typeface="+mn-ea"/>
+                <a:cs typeface="+mn-cs"/>
+              </a:defRPr>
+            </a:lvl3pPr>
+            <a:lvl4pPr marL="1371600" indent="0" algn="l" defTabSz="914400" rtl="0" eaLnBrk="1" latinLnBrk="0" hangingPunct="1">
+              <a:lnSpc>
+                <a:spcPct val="110000"/>
+              </a:lnSpc>
+              <a:spcBef>
+                <a:spcPts val="500"/>
+              </a:spcBef>
+              <a:buFont typeface="Arial" panose="020B0604020202020204" pitchFamily="34" charset="0"/>
+              <a:buNone/>
+              <a:defRPr sz="1000" kern="1200">
+                <a:solidFill>
+                  <a:schemeClr val="tx1"/>
+                </a:solidFill>
+                <a:latin typeface="+mn-lt"/>
+                <a:ea typeface="+mn-ea"/>
+                <a:cs typeface="+mn-cs"/>
+              </a:defRPr>
+            </a:lvl4pPr>
+            <a:lvl5pPr marL="1828800" indent="0" algn="l" defTabSz="914400" rtl="0" eaLnBrk="1" latinLnBrk="0" hangingPunct="1">
+              <a:lnSpc>
+                <a:spcPct val="110000"/>
+              </a:lnSpc>
+              <a:spcBef>
+                <a:spcPts val="500"/>
+              </a:spcBef>
+              <a:buFont typeface="Arial" panose="020B0604020202020204" pitchFamily="34" charset="0"/>
+              <a:buNone/>
+              <a:defRPr sz="1000" kern="1200">
+                <a:solidFill>
+                  <a:schemeClr val="tx1"/>
+                </a:solidFill>
+                <a:latin typeface="+mn-lt"/>
+                <a:ea typeface="+mn-ea"/>
+                <a:cs typeface="+mn-cs"/>
+              </a:defRPr>
+            </a:lvl5pPr>
+            <a:lvl6pPr marL="2286000" indent="0" algn="l" defTabSz="914400" rtl="0" eaLnBrk="1" latinLnBrk="0" hangingPunct="1">
+              <a:lnSpc>
+                <a:spcPct val="90000"/>
+              </a:lnSpc>
+              <a:spcBef>
+                <a:spcPts val="500"/>
+              </a:spcBef>
+              <a:buFont typeface="Arial" panose="020B0604020202020204" pitchFamily="34" charset="0"/>
+              <a:buNone/>
+              <a:defRPr sz="1000" kern="1200">
+                <a:solidFill>
+                  <a:schemeClr val="tx1"/>
+                </a:solidFill>
+                <a:latin typeface="+mn-lt"/>
+                <a:ea typeface="+mn-ea"/>
+                <a:cs typeface="+mn-cs"/>
+              </a:defRPr>
+            </a:lvl6pPr>
+            <a:lvl7pPr marL="2743200" indent="0" algn="l" defTabSz="914400" rtl="0" eaLnBrk="1" latinLnBrk="0" hangingPunct="1">
+              <a:lnSpc>
+                <a:spcPct val="90000"/>
+              </a:lnSpc>
+              <a:spcBef>
+                <a:spcPts val="500"/>
+              </a:spcBef>
+              <a:buFont typeface="Arial" panose="020B0604020202020204" pitchFamily="34" charset="0"/>
+              <a:buNone/>
+              <a:defRPr sz="1000" kern="1200">
+                <a:solidFill>
+                  <a:schemeClr val="tx1"/>
+                </a:solidFill>
+                <a:latin typeface="+mn-lt"/>
+                <a:ea typeface="+mn-ea"/>
+                <a:cs typeface="+mn-cs"/>
+              </a:defRPr>
+            </a:lvl7pPr>
+            <a:lvl8pPr marL="3200400" indent="0" algn="l" defTabSz="914400" rtl="0" eaLnBrk="1" latinLnBrk="0" hangingPunct="1">
+              <a:lnSpc>
+                <a:spcPct val="90000"/>
+              </a:lnSpc>
+              <a:spcBef>
+                <a:spcPts val="500"/>
+              </a:spcBef>
+              <a:buFont typeface="Arial" panose="020B0604020202020204" pitchFamily="34" charset="0"/>
+              <a:buNone/>
+              <a:defRPr sz="1000" kern="1200">
+                <a:solidFill>
+                  <a:schemeClr val="tx1"/>
+                </a:solidFill>
+                <a:latin typeface="+mn-lt"/>
+                <a:ea typeface="+mn-ea"/>
+                <a:cs typeface="+mn-cs"/>
+              </a:defRPr>
+            </a:lvl8pPr>
+            <a:lvl9pPr marL="3657600" indent="0" algn="l" defTabSz="914400" rtl="0" eaLnBrk="1" latinLnBrk="0" hangingPunct="1">
+              <a:lnSpc>
+                <a:spcPct val="90000"/>
+              </a:lnSpc>
+              <a:spcBef>
+                <a:spcPts val="500"/>
+              </a:spcBef>
+              <a:buFont typeface="Arial" panose="020B0604020202020204" pitchFamily="34" charset="0"/>
+              <a:buNone/>
+              <a:defRPr sz="1000" kern="1200">
+                <a:solidFill>
+                  <a:schemeClr val="tx1"/>
+                </a:solidFill>
+                <a:latin typeface="+mn-lt"/>
+                <a:ea typeface="+mn-ea"/>
+                <a:cs typeface="+mn-cs"/>
+              </a:defRPr>
+            </a:lvl9pPr>
+          </a:lstStyle>
+          <a:p>
+            <a:pPr marL="342900" indent="-342900">
+              <a:buFont typeface="Arial" panose="020B0604020202020204" pitchFamily="34" charset="0"/>
+              <a:buChar char="•"/>
+            </a:pPr>
+            <a:endParaRPr lang="en-US"/>
+          </a:p>
+        </p:txBody>
+      </p:sp>
+      <p:graphicFrame>
+        <p:nvGraphicFramePr>
+          <p:cNvPr id="3" name="Table 2">
+            <a:extLst>
+              <a:ext uri="{FF2B5EF4-FFF2-40B4-BE49-F238E27FC236}">
+                <a16:creationId xmlns:a16="http://schemas.microsoft.com/office/drawing/2014/main" id="{FE1EA464-0CE9-B022-5088-98F7D98E5946}"/>
+              </a:ext>
+            </a:extLst>
+          </p:cNvPr>
+          <p:cNvGraphicFramePr>
+            <a:graphicFrameLocks noGrp="1"/>
+          </p:cNvGraphicFramePr>
+          <p:nvPr>
+            <p:extLst>
+              <p:ext uri="{D42A27DB-BD31-4B8C-83A1-F6EECF244321}">
+                <p14:modId xmlns:p14="http://schemas.microsoft.com/office/powerpoint/2010/main" val="2612507587"/>
+              </p:ext>
+            </p:extLst>
+          </p:nvPr>
+        </p:nvGraphicFramePr>
+        <p:xfrm>
+          <a:off x="508649" y="2340244"/>
+          <a:ext cx="11156262" cy="4170301"/>
+        </p:xfrm>
+        <a:graphic>
+          <a:graphicData uri="http://schemas.openxmlformats.org/drawingml/2006/table">
+            <a:tbl>
+              <a:tblPr firstRow="1" bandRow="1">
+                <a:tableStyleId>{073A0DAA-6AF3-43AB-8588-CEC1D06C72B9}</a:tableStyleId>
+              </a:tblPr>
+              <a:tblGrid>
+                <a:gridCol w="5633028">
+                  <a:extLst>
+                    <a:ext uri="{9D8B030D-6E8A-4147-A177-3AD203B41FA5}">
+                      <a16:colId xmlns:a16="http://schemas.microsoft.com/office/drawing/2014/main" val="647396063"/>
+                    </a:ext>
+                  </a:extLst>
+                </a:gridCol>
+                <a:gridCol w="5523234">
+                  <a:extLst>
+                    <a:ext uri="{9D8B030D-6E8A-4147-A177-3AD203B41FA5}">
+                      <a16:colId xmlns:a16="http://schemas.microsoft.com/office/drawing/2014/main" val="2985703884"/>
+                    </a:ext>
+                  </a:extLst>
+                </a:gridCol>
+              </a:tblGrid>
+              <a:tr h="2533991">
+                <a:tc>
+                  <a:txBody>
+                    <a:bodyPr/>
+                    <a:lstStyle/>
+                    <a:p>
+                      <a:r>
+                        <a:rPr lang="en-US" sz="1700" b="1" dirty="0">
+                          <a:solidFill>
+                            <a:schemeClr val="bg1"/>
+                          </a:solidFill>
+                        </a:rPr>
+                        <a:t>Accomplishments(i.e., Completed Tasks):</a:t>
+                      </a:r>
+                    </a:p>
+                    <a:p>
+                      <a:pPr marL="0" indent="0">
+                        <a:buFont typeface="Arial" panose="020B0604020202020204" pitchFamily="34" charset="0"/>
+                        <a:buNone/>
+                      </a:pPr>
+                      <a:r>
+                        <a:rPr lang="en-US" sz="1700" b="1" dirty="0">
+                          <a:solidFill>
+                            <a:schemeClr val="bg1"/>
+                          </a:solidFill>
+                        </a:rPr>
+                        <a:t>Developed 3 main questions</a:t>
+                      </a:r>
+                    </a:p>
+                    <a:p>
+                      <a:pPr marL="0" indent="0">
+                        <a:buFont typeface="Arial" panose="020B0604020202020204" pitchFamily="34" charset="0"/>
+                        <a:buNone/>
+                      </a:pPr>
+                      <a:r>
+                        <a:rPr lang="en-US" sz="1700" b="1" dirty="0">
+                          <a:solidFill>
+                            <a:schemeClr val="bg1"/>
+                          </a:solidFill>
+                        </a:rPr>
+                        <a:t>Tested two models to predict heart attacks</a:t>
+                      </a:r>
+                    </a:p>
+                    <a:p>
+                      <a:pPr marL="0" indent="0">
+                        <a:buFont typeface="Arial" panose="020B0604020202020204" pitchFamily="34" charset="0"/>
+                        <a:buNone/>
+                      </a:pPr>
+                      <a:r>
+                        <a:rPr lang="en-US" sz="1700" b="1" dirty="0">
+                          <a:solidFill>
+                            <a:schemeClr val="bg1"/>
+                          </a:solidFill>
+                        </a:rPr>
+                        <a:t>Refined the appearance of all graphs</a:t>
+                      </a:r>
+                    </a:p>
+                    <a:p>
+                      <a:pPr marL="0" indent="0">
+                        <a:buFont typeface="Arial" panose="020B0604020202020204" pitchFamily="34" charset="0"/>
+                        <a:buNone/>
+                      </a:pPr>
+                      <a:r>
+                        <a:rPr lang="en-US" sz="1700" b="1" dirty="0">
+                          <a:solidFill>
+                            <a:schemeClr val="bg1"/>
+                          </a:solidFill>
+                        </a:rPr>
+                        <a:t>Organized and cleaned up code</a:t>
+                      </a:r>
+                    </a:p>
+                    <a:p>
+                      <a:pPr marL="0" indent="0">
+                        <a:buFont typeface="Arial" panose="020B0604020202020204" pitchFamily="34" charset="0"/>
+                        <a:buNone/>
+                      </a:pPr>
+                      <a:endParaRPr lang="en-US" sz="1700" b="1" dirty="0">
+                        <a:solidFill>
+                          <a:schemeClr val="bg1"/>
+                        </a:solidFill>
+                      </a:endParaRPr>
+                    </a:p>
+                    <a:p>
+                      <a:endParaRPr lang="en-US" sz="1700" b="1" dirty="0">
+                        <a:solidFill>
+                          <a:schemeClr val="tx1">
+                            <a:lumMod val="75000"/>
+                            <a:lumOff val="25000"/>
+                          </a:schemeClr>
+                        </a:solidFill>
+                      </a:endParaRPr>
+                    </a:p>
+                  </a:txBody>
+                  <a:tcPr marL="173269" marR="129952" marT="86635" marB="86635"/>
+                </a:tc>
+                <a:tc>
+                  <a:txBody>
+                    <a:bodyPr/>
+                    <a:lstStyle/>
+                    <a:p>
+                      <a:pPr marL="0" lvl="0" indent="0" rtl="0">
+                        <a:lnSpc>
+                          <a:spcPct val="100000"/>
+                        </a:lnSpc>
+                        <a:spcBef>
+                          <a:spcPts val="0"/>
+                        </a:spcBef>
+                        <a:spcAft>
+                          <a:spcPts val="0"/>
+                        </a:spcAft>
+                        <a:buClr>
+                          <a:schemeClr val="dk1"/>
+                        </a:buClr>
+                        <a:buSzPts val="1100"/>
+                        <a:buFont typeface="Arial"/>
+                        <a:buNone/>
+                      </a:pPr>
+                      <a:r>
+                        <a:rPr lang="en-US" sz="1700" b="1" dirty="0">
+                          <a:solidFill>
+                            <a:schemeClr val="bg1"/>
+                          </a:solidFill>
+                        </a:rPr>
+                        <a:t>Plans for next update: </a:t>
+                      </a:r>
+                    </a:p>
+                    <a:p>
+                      <a:pPr marL="0" lvl="0" indent="0" rtl="0">
+                        <a:lnSpc>
+                          <a:spcPct val="100000"/>
+                        </a:lnSpc>
+                        <a:spcBef>
+                          <a:spcPts val="0"/>
+                        </a:spcBef>
+                        <a:spcAft>
+                          <a:spcPts val="0"/>
+                        </a:spcAft>
+                        <a:buClr>
+                          <a:schemeClr val="dk1"/>
+                        </a:buClr>
+                        <a:buSzPts val="1100"/>
+                        <a:buFont typeface="Arial" panose="020B0604020202020204" pitchFamily="34" charset="0"/>
+                        <a:buNone/>
+                      </a:pPr>
+                      <a:r>
+                        <a:rPr lang="en-US" sz="1700" b="1" dirty="0">
+                          <a:solidFill>
+                            <a:schemeClr val="bg1"/>
+                          </a:solidFill>
+                        </a:rPr>
+                        <a:t>Finish the paper and final PowerPoint</a:t>
+                      </a:r>
+                    </a:p>
+                    <a:p>
+                      <a:pPr marL="0" lvl="0" indent="0" rtl="0">
+                        <a:lnSpc>
+                          <a:spcPct val="100000"/>
+                        </a:lnSpc>
+                        <a:spcBef>
+                          <a:spcPts val="0"/>
+                        </a:spcBef>
+                        <a:spcAft>
+                          <a:spcPts val="0"/>
+                        </a:spcAft>
+                        <a:buClr>
+                          <a:schemeClr val="dk1"/>
+                        </a:buClr>
+                        <a:buSzPts val="1100"/>
+                        <a:buFont typeface="Arial"/>
+                        <a:buNone/>
+                      </a:pPr>
+                      <a:endParaRPr lang="en-US" sz="1700" b="1" dirty="0">
+                        <a:solidFill>
+                          <a:schemeClr val="bg1"/>
+                        </a:solidFill>
+                      </a:endParaRPr>
+                    </a:p>
+                    <a:p>
+                      <a:endParaRPr lang="en-US" sz="1700" b="1" dirty="0">
+                        <a:solidFill>
+                          <a:schemeClr val="tx1">
+                            <a:lumMod val="75000"/>
+                            <a:lumOff val="25000"/>
+                          </a:schemeClr>
+                        </a:solidFill>
+                      </a:endParaRPr>
+                    </a:p>
+                  </a:txBody>
+                  <a:tcPr marL="173269" marR="129952" marT="86635" marB="86635"/>
+                </a:tc>
+                <a:extLst>
+                  <a:ext uri="{0D108BD9-81ED-4DB2-BD59-A6C34878D82A}">
+                    <a16:rowId xmlns:a16="http://schemas.microsoft.com/office/drawing/2014/main" val="2667866840"/>
+                  </a:ext>
+                </a:extLst>
+              </a:tr>
+              <a:tr h="1433041">
+                <a:tc>
+                  <a:txBody>
+                    <a:bodyPr/>
+                    <a:lstStyle/>
+                    <a:p>
+                      <a:r>
+                        <a:rPr lang="en-US" sz="1200" dirty="0">
+                          <a:solidFill>
+                            <a:schemeClr val="tx1">
+                              <a:lumMod val="75000"/>
+                              <a:lumOff val="25000"/>
+                            </a:schemeClr>
+                          </a:solidFill>
+                        </a:rPr>
+                        <a:t>Working Well: </a:t>
+                      </a:r>
+                    </a:p>
+                    <a:p>
+                      <a:pPr marL="0" indent="0">
+                        <a:buFont typeface="Arial" panose="020B0604020202020204" pitchFamily="34" charset="0"/>
+                        <a:buNone/>
+                      </a:pPr>
+                      <a:r>
+                        <a:rPr lang="en-US" sz="1200" dirty="0">
+                          <a:solidFill>
+                            <a:schemeClr val="tx1">
+                              <a:lumMod val="75000"/>
+                              <a:lumOff val="25000"/>
+                            </a:schemeClr>
+                          </a:solidFill>
+                        </a:rPr>
+                        <a:t>Running the code</a:t>
+                      </a:r>
+                    </a:p>
+                    <a:p>
+                      <a:pPr marL="0" indent="0">
+                        <a:buFont typeface="Arial" panose="020B0604020202020204" pitchFamily="34" charset="0"/>
+                        <a:buNone/>
+                      </a:pPr>
+                      <a:r>
+                        <a:rPr lang="en-US" sz="1200" dirty="0">
+                          <a:solidFill>
+                            <a:schemeClr val="tx1">
+                              <a:lumMod val="75000"/>
+                              <a:lumOff val="25000"/>
+                            </a:schemeClr>
+                          </a:solidFill>
+                        </a:rPr>
+                        <a:t>Pulling from GitHub</a:t>
+                      </a:r>
+                    </a:p>
+                    <a:p>
+                      <a:pPr marL="0" indent="0">
+                        <a:buFont typeface="Arial" panose="020B0604020202020204" pitchFamily="34" charset="0"/>
+                        <a:buNone/>
+                      </a:pPr>
+                      <a:r>
+                        <a:rPr lang="en-US" sz="1200" dirty="0">
+                          <a:solidFill>
+                            <a:schemeClr val="tx1">
+                              <a:lumMod val="75000"/>
+                              <a:lumOff val="25000"/>
+                            </a:schemeClr>
+                          </a:solidFill>
+                        </a:rPr>
+                        <a:t>Using Trello</a:t>
+                      </a:r>
+                    </a:p>
+                    <a:p>
+                      <a:pPr marL="342900" indent="-342900">
+                        <a:buFont typeface="Arial" panose="020B0604020202020204" pitchFamily="34" charset="0"/>
+                        <a:buChar char="•"/>
+                      </a:pPr>
+                      <a:endParaRPr lang="en-US" sz="1200" dirty="0">
+                        <a:solidFill>
+                          <a:schemeClr val="tx1">
+                            <a:lumMod val="75000"/>
+                            <a:lumOff val="25000"/>
+                          </a:schemeClr>
+                        </a:solidFill>
+                      </a:endParaRPr>
+                    </a:p>
+                    <a:p>
+                      <a:pPr marL="342900" indent="-342900">
+                        <a:buFont typeface="Arial" panose="020B0604020202020204" pitchFamily="34" charset="0"/>
+                        <a:buChar char="•"/>
+                      </a:pPr>
+                      <a:endParaRPr lang="en-US" sz="1200" dirty="0">
+                        <a:solidFill>
+                          <a:schemeClr val="tx1">
+                            <a:lumMod val="75000"/>
+                            <a:lumOff val="25000"/>
+                          </a:schemeClr>
+                        </a:solidFill>
+                      </a:endParaRPr>
+                    </a:p>
+                    <a:p>
+                      <a:pPr marL="0" indent="0">
+                        <a:buFont typeface="Arial" panose="020B0604020202020204" pitchFamily="34" charset="0"/>
+                        <a:buNone/>
+                      </a:pPr>
+                      <a:endParaRPr lang="en-US" sz="1200" dirty="0">
+                        <a:solidFill>
+                          <a:schemeClr val="tx1">
+                            <a:lumMod val="75000"/>
+                            <a:lumOff val="25000"/>
+                          </a:schemeClr>
+                        </a:solidFill>
+                      </a:endParaRPr>
+                    </a:p>
+                    <a:p>
+                      <a:endParaRPr lang="en-US" sz="1200" dirty="0">
+                        <a:solidFill>
+                          <a:schemeClr val="tx1">
+                            <a:lumMod val="75000"/>
+                            <a:lumOff val="25000"/>
+                          </a:schemeClr>
+                        </a:solidFill>
+                      </a:endParaRPr>
+                    </a:p>
+                  </a:txBody>
+                  <a:tcPr marL="173269" marR="129952" marT="86635" marB="86635"/>
+                </a:tc>
+                <a:tc>
+                  <a:txBody>
+                    <a:bodyPr/>
+                    <a:lstStyle/>
+                    <a:p>
+                      <a:r>
+                        <a:rPr lang="en-US" sz="1200" dirty="0">
+                          <a:solidFill>
+                            <a:schemeClr val="tx1">
+                              <a:lumMod val="75000"/>
+                              <a:lumOff val="25000"/>
+                            </a:schemeClr>
+                          </a:solidFill>
+                        </a:rPr>
+                        <a:t>Issues: </a:t>
+                      </a:r>
+                    </a:p>
+                    <a:p>
+                      <a:pPr marL="0" indent="0">
+                        <a:buFont typeface="Arial" panose="020B0604020202020204" pitchFamily="34" charset="0"/>
+                        <a:buNone/>
+                      </a:pPr>
+                      <a:r>
+                        <a:rPr lang="en-US" sz="1200" dirty="0">
+                          <a:solidFill>
+                            <a:schemeClr val="tx1">
+                              <a:lumMod val="75000"/>
+                              <a:lumOff val="25000"/>
+                            </a:schemeClr>
+                          </a:solidFill>
+                        </a:rPr>
+                        <a:t>No issues</a:t>
+                      </a:r>
+                    </a:p>
+                    <a:p>
+                      <a:endParaRPr lang="en-US" sz="1200" dirty="0">
+                        <a:solidFill>
+                          <a:schemeClr val="tx1">
+                            <a:lumMod val="75000"/>
+                            <a:lumOff val="25000"/>
+                          </a:schemeClr>
+                        </a:solidFill>
+                      </a:endParaRPr>
+                    </a:p>
+                  </a:txBody>
+                  <a:tcPr marL="173269" marR="129952" marT="86635" marB="86635"/>
+                </a:tc>
+                <a:extLst>
+                  <a:ext uri="{0D108BD9-81ED-4DB2-BD59-A6C34878D82A}">
+                    <a16:rowId xmlns:a16="http://schemas.microsoft.com/office/drawing/2014/main" val="408362335"/>
+                  </a:ext>
+                </a:extLst>
+              </a:tr>
+            </a:tbl>
+          </a:graphicData>
+        </a:graphic>
+      </p:graphicFrame>
+    </p:spTree>
+    <p:extLst>
+      <p:ext uri="{BB962C8B-B14F-4D97-AF65-F5344CB8AC3E}">
+        <p14:creationId xmlns:p14="http://schemas.microsoft.com/office/powerpoint/2010/main" val="3915517750"/>
+      </p:ext>
+    </p:extLst>
+  </p:cSld>
+  <p:clrMapOvr>
+    <a:masterClrMapping/>
+  </p:clrMapOvr>
+</p:sld>
+</file>
+
+<file path=ppt/slides/slide19.xml><?xml version="1.0" encoding="utf-8"?>
+<p:sld xmlns:a="http://schemas.openxmlformats.org/drawingml/2006/main" xmlns:r="http://schemas.openxmlformats.org/officeDocument/2006/relationships" xmlns:p="http://schemas.openxmlformats.org/presentationml/2006/main">
+  <p:cSld>
+    <p:spTree>
+      <p:nvGrpSpPr>
+        <p:cNvPr id="1" name=""/>
+        <p:cNvGrpSpPr/>
+        <p:nvPr/>
+      </p:nvGrpSpPr>
+      <p:grpSpPr>
+        <a:xfrm>
+          <a:off x="0" y="0"/>
+          <a:ext cx="0" cy="0"/>
+          <a:chOff x="0" y="0"/>
+          <a:chExt cx="0" cy="0"/>
+        </a:xfrm>
+      </p:grpSpPr>
+      <p:sp>
+        <p:nvSpPr>
+          <p:cNvPr id="2" name="Title 1">
+            <a:extLst>
+              <a:ext uri="{FF2B5EF4-FFF2-40B4-BE49-F238E27FC236}">
                 <a16:creationId xmlns:a16="http://schemas.microsoft.com/office/drawing/2014/main" id="{92FBF0EB-0901-2DD2-489D-525E570E7E54}"/>
               </a:ext>
             </a:extLst>
@@ -13370,7 +14069,7 @@
             <a:pPr lvl="1"/>
             <a:r>
               <a:rPr lang="en-US" sz="1800" dirty="0"/>
-              <a:t>Are non-biological ailments like depression capable?</a:t>
+              <a:t>Are non-biological ailments like depression important for predicting heart attacks?</a:t>
             </a:r>
           </a:p>
         </p:txBody>
@@ -13388,7 +14087,857 @@
 </p:sld>
 </file>
 
-<file path=ppt/slides/slide19.xml><?xml version="1.0" encoding="utf-8"?>
+<file path=ppt/slides/slide2.xml><?xml version="1.0" encoding="utf-8"?>
+<p:sld xmlns:a="http://schemas.openxmlformats.org/drawingml/2006/main" xmlns:r="http://schemas.openxmlformats.org/officeDocument/2006/relationships" xmlns:p="http://schemas.openxmlformats.org/presentationml/2006/main">
+  <p:cSld>
+    <p:bg>
+      <p:bgPr>
+        <a:solidFill>
+          <a:schemeClr val="bg2"/>
+        </a:solidFill>
+        <a:effectLst/>
+      </p:bgPr>
+    </p:bg>
+    <p:spTree>
+      <p:nvGrpSpPr>
+        <p:cNvPr id="1" name="">
+          <a:extLst>
+            <a:ext uri="{FF2B5EF4-FFF2-40B4-BE49-F238E27FC236}">
+              <a16:creationId xmlns:a16="http://schemas.microsoft.com/office/drawing/2014/main" id="{4A4D9D6F-CDAF-A802-A4F8-48BDA4DA1C6B}"/>
+            </a:ext>
+          </a:extLst>
+        </p:cNvPr>
+        <p:cNvGrpSpPr/>
+        <p:nvPr/>
+      </p:nvGrpSpPr>
+      <p:grpSpPr>
+        <a:xfrm>
+          <a:off x="0" y="0"/>
+          <a:ext cx="0" cy="0"/>
+          <a:chOff x="0" y="0"/>
+          <a:chExt cx="0" cy="0"/>
+        </a:xfrm>
+      </p:grpSpPr>
+      <p:sp>
+        <p:nvSpPr>
+          <p:cNvPr id="18" name="Rectangle 17">
+            <a:extLst>
+              <a:ext uri="{FF2B5EF4-FFF2-40B4-BE49-F238E27FC236}">
+                <a16:creationId xmlns:a16="http://schemas.microsoft.com/office/drawing/2014/main" id="{ADE57300-C7FF-4578-99A0-42B0295B123C}"/>
+              </a:ext>
+              <a:ext uri="{C183D7F6-B498-43B3-948B-1728B52AA6E4}">
+                <adec:decorative xmlns:adec="http://schemas.microsoft.com/office/drawing/2017/decorative" val="1"/>
+              </a:ext>
+            </a:extLst>
+          </p:cNvPr>
+          <p:cNvSpPr>
+            <a:spLocks noGrp="1" noRot="1" noChangeAspect="1" noMove="1" noResize="1" noEditPoints="1" noAdjustHandles="1" noChangeArrowheads="1" noChangeShapeType="1" noTextEdit="1"/>
+          </p:cNvSpPr>
+          <p:nvPr>
+            <p:extLst>
+              <p:ext uri="{386F3935-93C4-4BCD-93E2-E3B085C9AB24}">
+                <p16:designElem xmlns:p16="http://schemas.microsoft.com/office/powerpoint/2015/main" val="1"/>
+              </p:ext>
+            </p:extLst>
+          </p:nvPr>
+        </p:nvSpPr>
+        <p:spPr>
+          <a:xfrm>
+            <a:off x="517870" y="508090"/>
+            <a:ext cx="5021183" cy="149279"/>
+          </a:xfrm>
+          <a:prstGeom prst="rect">
+            <a:avLst/>
+          </a:prstGeom>
+          <a:solidFill>
+            <a:schemeClr val="tx1"/>
+          </a:solidFill>
+          <a:ln>
+            <a:noFill/>
+          </a:ln>
+        </p:spPr>
+        <p:style>
+          <a:lnRef idx="2">
+            <a:schemeClr val="accent1">
+              <a:shade val="50000"/>
+            </a:schemeClr>
+          </a:lnRef>
+          <a:fillRef idx="1">
+            <a:schemeClr val="accent1"/>
+          </a:fillRef>
+          <a:effectRef idx="0">
+            <a:schemeClr val="accent1"/>
+          </a:effectRef>
+          <a:fontRef idx="minor">
+            <a:schemeClr val="lt1"/>
+          </a:fontRef>
+        </p:style>
+        <p:txBody>
+          <a:bodyPr rtlCol="0" anchor="ctr"/>
+          <a:lstStyle/>
+          <a:p>
+            <a:pPr algn="ctr"/>
+            <a:endParaRPr lang="en-US"/>
+          </a:p>
+        </p:txBody>
+      </p:sp>
+      <p:sp useBgFill="1">
+        <p:nvSpPr>
+          <p:cNvPr id="20" name="Rectangle 19">
+            <a:extLst>
+              <a:ext uri="{FF2B5EF4-FFF2-40B4-BE49-F238E27FC236}">
+                <a16:creationId xmlns:a16="http://schemas.microsoft.com/office/drawing/2014/main" id="{A082E5AA-6E5F-4FCC-8C41-11E32F833BFC}"/>
+              </a:ext>
+              <a:ext uri="{C183D7F6-B498-43B3-948B-1728B52AA6E4}">
+                <adec:decorative xmlns:adec="http://schemas.microsoft.com/office/drawing/2017/decorative" val="1"/>
+              </a:ext>
+            </a:extLst>
+          </p:cNvPr>
+          <p:cNvSpPr>
+            <a:spLocks noGrp="1" noRot="1" noChangeAspect="1" noMove="1" noResize="1" noEditPoints="1" noAdjustHandles="1" noChangeArrowheads="1" noChangeShapeType="1" noTextEdit="1"/>
+          </p:cNvSpPr>
+          <p:nvPr>
+            <p:extLst>
+              <p:ext uri="{386F3935-93C4-4BCD-93E2-E3B085C9AB24}">
+                <p16:designElem xmlns:p16="http://schemas.microsoft.com/office/powerpoint/2015/main" val="1"/>
+              </p:ext>
+            </p:extLst>
+          </p:nvPr>
+        </p:nvSpPr>
+        <p:spPr>
+          <a:xfrm>
+            <a:off x="0" y="0"/>
+            <a:ext cx="12188952" cy="6857995"/>
+          </a:xfrm>
+          <a:prstGeom prst="rect">
+            <a:avLst/>
+          </a:prstGeom>
+          <a:ln>
+            <a:noFill/>
+          </a:ln>
+        </p:spPr>
+        <p:style>
+          <a:lnRef idx="2">
+            <a:schemeClr val="accent1">
+              <a:shade val="50000"/>
+            </a:schemeClr>
+          </a:lnRef>
+          <a:fillRef idx="1">
+            <a:schemeClr val="accent1"/>
+          </a:fillRef>
+          <a:effectRef idx="0">
+            <a:schemeClr val="accent1"/>
+          </a:effectRef>
+          <a:fontRef idx="minor">
+            <a:schemeClr val="lt1"/>
+          </a:fontRef>
+        </p:style>
+        <p:txBody>
+          <a:bodyPr rtlCol="0" anchor="ctr"/>
+          <a:lstStyle/>
+          <a:p>
+            <a:pPr algn="ctr"/>
+            <a:endParaRPr lang="en-US" dirty="0"/>
+          </a:p>
+        </p:txBody>
+      </p:sp>
+      <p:sp>
+        <p:nvSpPr>
+          <p:cNvPr id="22" name="Rectangle 21">
+            <a:extLst>
+              <a:ext uri="{FF2B5EF4-FFF2-40B4-BE49-F238E27FC236}">
+                <a16:creationId xmlns:a16="http://schemas.microsoft.com/office/drawing/2014/main" id="{EDC872B6-524A-4445-9AD6-FA0326B5D6EA}"/>
+              </a:ext>
+              <a:ext uri="{C183D7F6-B498-43B3-948B-1728B52AA6E4}">
+                <adec:decorative xmlns:adec="http://schemas.microsoft.com/office/drawing/2017/decorative" val="1"/>
+              </a:ext>
+            </a:extLst>
+          </p:cNvPr>
+          <p:cNvSpPr>
+            <a:spLocks noGrp="1" noRot="1" noChangeAspect="1" noMove="1" noResize="1" noEditPoints="1" noAdjustHandles="1" noChangeArrowheads="1" noChangeShapeType="1" noTextEdit="1"/>
+          </p:cNvSpPr>
+          <p:nvPr>
+            <p:extLst>
+              <p:ext uri="{386F3935-93C4-4BCD-93E2-E3B085C9AB24}">
+                <p16:designElem xmlns:p16="http://schemas.microsoft.com/office/powerpoint/2015/main" val="1"/>
+              </p:ext>
+            </p:extLst>
+          </p:nvPr>
+        </p:nvSpPr>
+        <p:spPr>
+          <a:xfrm>
+            <a:off x="0" y="0"/>
+            <a:ext cx="12188952" cy="6857995"/>
+          </a:xfrm>
+          <a:prstGeom prst="rect">
+            <a:avLst/>
+          </a:prstGeom>
+          <a:solidFill>
+            <a:schemeClr val="bg2">
+              <a:lumMod val="90000"/>
+              <a:alpha val="40000"/>
+            </a:schemeClr>
+          </a:solidFill>
+          <a:ln>
+            <a:noFill/>
+          </a:ln>
+        </p:spPr>
+        <p:style>
+          <a:lnRef idx="2">
+            <a:schemeClr val="accent1">
+              <a:shade val="50000"/>
+            </a:schemeClr>
+          </a:lnRef>
+          <a:fillRef idx="1">
+            <a:schemeClr val="accent1"/>
+          </a:fillRef>
+          <a:effectRef idx="0">
+            <a:schemeClr val="accent1"/>
+          </a:effectRef>
+          <a:fontRef idx="minor">
+            <a:schemeClr val="lt1"/>
+          </a:fontRef>
+        </p:style>
+        <p:txBody>
+          <a:bodyPr rtlCol="0" anchor="ctr"/>
+          <a:lstStyle/>
+          <a:p>
+            <a:pPr algn="ctr"/>
+            <a:endParaRPr lang="en-US" dirty="0"/>
+          </a:p>
+        </p:txBody>
+      </p:sp>
+      <p:sp>
+        <p:nvSpPr>
+          <p:cNvPr id="2" name="Title 1">
+            <a:extLst>
+              <a:ext uri="{FF2B5EF4-FFF2-40B4-BE49-F238E27FC236}">
+                <a16:creationId xmlns:a16="http://schemas.microsoft.com/office/drawing/2014/main" id="{3EC6F871-B05D-F6EA-A100-8BD3910A0EEC}"/>
+              </a:ext>
+            </a:extLst>
+          </p:cNvPr>
+          <p:cNvSpPr>
+            <a:spLocks noGrp="1"/>
+          </p:cNvSpPr>
+          <p:nvPr>
+            <p:ph type="ctrTitle"/>
+          </p:nvPr>
+        </p:nvSpPr>
+        <p:spPr>
+          <a:xfrm>
+            <a:off x="517870" y="978408"/>
+            <a:ext cx="5021182" cy="1752681"/>
+          </a:xfrm>
+        </p:spPr>
+        <p:txBody>
+          <a:bodyPr vert="horz" lIns="91440" tIns="45720" rIns="91440" bIns="45720" rtlCol="0" anchor="t">
+            <a:normAutofit/>
+          </a:bodyPr>
+          <a:lstStyle/>
+          <a:p>
+            <a:r>
+              <a:rPr lang="en-US" dirty="0"/>
+              <a:t>Update 1</a:t>
+            </a:r>
+          </a:p>
+        </p:txBody>
+      </p:sp>
+      <p:sp>
+        <p:nvSpPr>
+          <p:cNvPr id="24" name="Rectangle 23">
+            <a:extLst>
+              <a:ext uri="{FF2B5EF4-FFF2-40B4-BE49-F238E27FC236}">
+                <a16:creationId xmlns:a16="http://schemas.microsoft.com/office/drawing/2014/main" id="{92BE0106-0C20-465B-A1BE-0BAC2737B1AD}"/>
+              </a:ext>
+              <a:ext uri="{C183D7F6-B498-43B3-948B-1728B52AA6E4}">
+                <adec:decorative xmlns:adec="http://schemas.microsoft.com/office/drawing/2017/decorative" val="1"/>
+              </a:ext>
+            </a:extLst>
+          </p:cNvPr>
+          <p:cNvSpPr>
+            <a:spLocks noGrp="1" noRot="1" noChangeAspect="1" noMove="1" noResize="1" noEditPoints="1" noAdjustHandles="1" noChangeArrowheads="1" noChangeShapeType="1" noTextEdit="1"/>
+          </p:cNvSpPr>
+          <p:nvPr>
+            <p:extLst>
+              <p:ext uri="{386F3935-93C4-4BCD-93E2-E3B085C9AB24}">
+                <p16:designElem xmlns:p16="http://schemas.microsoft.com/office/powerpoint/2015/main" val="1"/>
+              </p:ext>
+            </p:extLst>
+          </p:nvPr>
+        </p:nvSpPr>
+        <p:spPr>
+          <a:xfrm>
+            <a:off x="517870" y="508090"/>
+            <a:ext cx="5021183" cy="149279"/>
+          </a:xfrm>
+          <a:prstGeom prst="rect">
+            <a:avLst/>
+          </a:prstGeom>
+          <a:solidFill>
+            <a:schemeClr val="tx1"/>
+          </a:solidFill>
+          <a:ln>
+            <a:noFill/>
+          </a:ln>
+        </p:spPr>
+        <p:style>
+          <a:lnRef idx="2">
+            <a:schemeClr val="accent1">
+              <a:shade val="50000"/>
+            </a:schemeClr>
+          </a:lnRef>
+          <a:fillRef idx="1">
+            <a:schemeClr val="accent1"/>
+          </a:fillRef>
+          <a:effectRef idx="0">
+            <a:schemeClr val="accent1"/>
+          </a:effectRef>
+          <a:fontRef idx="minor">
+            <a:schemeClr val="lt1"/>
+          </a:fontRef>
+        </p:style>
+        <p:txBody>
+          <a:bodyPr rtlCol="0" anchor="ctr"/>
+          <a:lstStyle/>
+          <a:p>
+            <a:pPr algn="ctr"/>
+            <a:endParaRPr lang="en-US"/>
+          </a:p>
+        </p:txBody>
+      </p:sp>
+      <p:sp>
+        <p:nvSpPr>
+          <p:cNvPr id="26" name="Rectangle 25">
+            <a:extLst>
+              <a:ext uri="{FF2B5EF4-FFF2-40B4-BE49-F238E27FC236}">
+                <a16:creationId xmlns:a16="http://schemas.microsoft.com/office/drawing/2014/main" id="{4A3D569D-D3A6-49CA-A483-291E95DACA14}"/>
+              </a:ext>
+              <a:ext uri="{C183D7F6-B498-43B3-948B-1728B52AA6E4}">
+                <adec:decorative xmlns:adec="http://schemas.microsoft.com/office/drawing/2017/decorative" val="1"/>
+              </a:ext>
+            </a:extLst>
+          </p:cNvPr>
+          <p:cNvSpPr>
+            <a:spLocks noGrp="1" noRot="1" noChangeAspect="1" noMove="1" noResize="1" noEditPoints="1" noAdjustHandles="1" noChangeArrowheads="1" noChangeShapeType="1" noTextEdit="1"/>
+          </p:cNvSpPr>
+          <p:nvPr>
+            <p:extLst>
+              <p:ext uri="{386F3935-93C4-4BCD-93E2-E3B085C9AB24}">
+                <p16:designElem xmlns:p16="http://schemas.microsoft.com/office/powerpoint/2015/main" val="1"/>
+              </p:ext>
+            </p:extLst>
+          </p:nvPr>
+        </p:nvSpPr>
+        <p:spPr>
+          <a:xfrm>
+            <a:off x="6662168" y="611650"/>
+            <a:ext cx="5021183" cy="45719"/>
+          </a:xfrm>
+          <a:prstGeom prst="rect">
+            <a:avLst/>
+          </a:prstGeom>
+          <a:solidFill>
+            <a:schemeClr val="tx1"/>
+          </a:solidFill>
+          <a:ln>
+            <a:noFill/>
+          </a:ln>
+        </p:spPr>
+        <p:style>
+          <a:lnRef idx="2">
+            <a:schemeClr val="accent1">
+              <a:shade val="50000"/>
+            </a:schemeClr>
+          </a:lnRef>
+          <a:fillRef idx="1">
+            <a:schemeClr val="accent1"/>
+          </a:fillRef>
+          <a:effectRef idx="0">
+            <a:schemeClr val="accent1"/>
+          </a:effectRef>
+          <a:fontRef idx="minor">
+            <a:schemeClr val="lt1"/>
+          </a:fontRef>
+        </p:style>
+        <p:txBody>
+          <a:bodyPr rtlCol="0" anchor="ctr"/>
+          <a:lstStyle/>
+          <a:p>
+            <a:pPr algn="ctr"/>
+            <a:endParaRPr lang="en-US"/>
+          </a:p>
+        </p:txBody>
+      </p:sp>
+      <p:sp>
+        <p:nvSpPr>
+          <p:cNvPr id="3" name="Subtitle 2">
+            <a:extLst>
+              <a:ext uri="{FF2B5EF4-FFF2-40B4-BE49-F238E27FC236}">
+                <a16:creationId xmlns:a16="http://schemas.microsoft.com/office/drawing/2014/main" id="{A87C903E-D9EE-7FAE-D1C5-9C477785B62D}"/>
+              </a:ext>
+            </a:extLst>
+          </p:cNvPr>
+          <p:cNvSpPr>
+            <a:spLocks noGrp="1"/>
+          </p:cNvSpPr>
+          <p:nvPr>
+            <p:ph type="subTitle" idx="1"/>
+          </p:nvPr>
+        </p:nvSpPr>
+        <p:spPr>
+          <a:xfrm>
+            <a:off x="6662168" y="969265"/>
+            <a:ext cx="5021182" cy="1752682"/>
+          </a:xfrm>
+        </p:spPr>
+        <p:txBody>
+          <a:bodyPr vert="horz" lIns="91440" tIns="45720" rIns="91440" bIns="45720" rtlCol="0">
+            <a:normAutofit/>
+          </a:bodyPr>
+          <a:lstStyle/>
+          <a:p>
+            <a:r>
+              <a:rPr lang="en-US" sz="2000" dirty="0"/>
+              <a:t>Frank Williams</a:t>
+            </a:r>
+          </a:p>
+          <a:p>
+            <a:r>
+              <a:rPr lang="en-US" sz="2000" dirty="0"/>
+              <a:t>Adrian Torres</a:t>
+            </a:r>
+          </a:p>
+          <a:p>
+            <a:r>
+              <a:rPr lang="en-US" sz="2000" dirty="0"/>
+              <a:t>Paige Madison</a:t>
+            </a:r>
+          </a:p>
+        </p:txBody>
+      </p:sp>
+      <p:pic>
+        <p:nvPicPr>
+          <p:cNvPr id="4" name="Picture 3" descr="A picture of an electromagnetic radiation">
+            <a:extLst>
+              <a:ext uri="{FF2B5EF4-FFF2-40B4-BE49-F238E27FC236}">
+                <a16:creationId xmlns:a16="http://schemas.microsoft.com/office/drawing/2014/main" id="{88DAC6A5-6E57-C47D-BC13-B5B37C7F874C}"/>
+              </a:ext>
+            </a:extLst>
+          </p:cNvPr>
+          <p:cNvPicPr>
+            <a:picLocks noChangeAspect="1"/>
+          </p:cNvPicPr>
+          <p:nvPr/>
+        </p:nvPicPr>
+        <p:blipFill rotWithShape="1">
+          <a:blip r:embed="rId2"/>
+          <a:srcRect t="29899" r="1" b="26769"/>
+          <a:stretch/>
+        </p:blipFill>
+        <p:spPr>
+          <a:xfrm>
+            <a:off x="517871" y="3004841"/>
+            <a:ext cx="11165136" cy="3241510"/>
+          </a:xfrm>
+          <a:prstGeom prst="rect">
+            <a:avLst/>
+          </a:prstGeom>
+        </p:spPr>
+      </p:pic>
+    </p:spTree>
+    <p:extLst>
+      <p:ext uri="{BB962C8B-B14F-4D97-AF65-F5344CB8AC3E}">
+        <p14:creationId xmlns:p14="http://schemas.microsoft.com/office/powerpoint/2010/main" val="2950926834"/>
+      </p:ext>
+    </p:extLst>
+  </p:cSld>
+  <p:clrMapOvr>
+    <a:masterClrMapping/>
+  </p:clrMapOvr>
+  <p:timing>
+    <p:tnLst>
+      <p:par>
+        <p:cTn id="1" dur="indefinite" restart="never" nodeType="tmRoot">
+          <p:childTnLst>
+            <p:seq concurrent="1" nextAc="seek">
+              <p:cTn id="2" dur="indefinite" nodeType="mainSeq">
+                <p:childTnLst>
+                  <p:par>
+                    <p:cTn id="3" fill="hold">
+                      <p:stCondLst>
+                        <p:cond delay="indefinite"/>
+                        <p:cond evt="onBegin" delay="0">
+                          <p:tn val="2"/>
+                        </p:cond>
+                      </p:stCondLst>
+                      <p:childTnLst>
+                        <p:par>
+                          <p:cTn id="4" fill="hold">
+                            <p:stCondLst>
+                              <p:cond delay="0"/>
+                            </p:stCondLst>
+                            <p:childTnLst>
+                              <p:par>
+                                <p:cTn id="5" presetID="10" presetClass="entr" presetSubtype="0" fill="hold" grpId="0" nodeType="withEffect">
+                                  <p:stCondLst>
+                                    <p:cond delay="1000"/>
+                                  </p:stCondLst>
+                                  <p:iterate type="lt">
+                                    <p:tmPct val="10000"/>
+                                  </p:iterate>
+                                  <p:childTnLst>
+                                    <p:set>
+                                      <p:cBhvr>
+                                        <p:cTn id="6" dur="1" fill="hold">
+                                          <p:stCondLst>
+                                            <p:cond delay="0"/>
+                                          </p:stCondLst>
+                                        </p:cTn>
+                                        <p:tgtEl>
+                                          <p:spTgt spid="2"/>
+                                        </p:tgtEl>
+                                        <p:attrNameLst>
+                                          <p:attrName>style.visibility</p:attrName>
+                                        </p:attrNameLst>
+                                      </p:cBhvr>
+                                      <p:to>
+                                        <p:strVal val="visible"/>
+                                      </p:to>
+                                    </p:set>
+                                    <p:animEffect transition="in" filter="fade">
+                                      <p:cBhvr>
+                                        <p:cTn id="7" dur="400"/>
+                                        <p:tgtEl>
+                                          <p:spTgt spid="2"/>
+                                        </p:tgtEl>
+                                      </p:cBhvr>
+                                    </p:animEffect>
+                                  </p:childTnLst>
+                                </p:cTn>
+                              </p:par>
+                            </p:childTnLst>
+                          </p:cTn>
+                        </p:par>
+                      </p:childTnLst>
+                    </p:cTn>
+                  </p:par>
+                </p:childTnLst>
+              </p:cTn>
+              <p:prevCondLst>
+                <p:cond evt="onPrev" delay="0">
+                  <p:tgtEl>
+                    <p:sldTgt/>
+                  </p:tgtEl>
+                </p:cond>
+              </p:prevCondLst>
+              <p:nextCondLst>
+                <p:cond evt="onNext" delay="0">
+                  <p:tgtEl>
+                    <p:sldTgt/>
+                  </p:tgtEl>
+                </p:cond>
+              </p:nextCondLst>
+            </p:seq>
+          </p:childTnLst>
+        </p:cTn>
+      </p:par>
+    </p:tnLst>
+    <p:bldLst>
+      <p:bldP spid="2" grpId="0"/>
+    </p:bldLst>
+  </p:timing>
+</p:sld>
+</file>
+
+<file path=ppt/slides/slide20.xml><?xml version="1.0" encoding="utf-8"?>
+<p:sld xmlns:a="http://schemas.openxmlformats.org/drawingml/2006/main" xmlns:r="http://schemas.openxmlformats.org/officeDocument/2006/relationships" xmlns:p="http://schemas.openxmlformats.org/presentationml/2006/main">
+  <p:cSld>
+    <p:spTree>
+      <p:nvGrpSpPr>
+        <p:cNvPr id="1" name=""/>
+        <p:cNvGrpSpPr/>
+        <p:nvPr/>
+      </p:nvGrpSpPr>
+      <p:grpSpPr>
+        <a:xfrm>
+          <a:off x="0" y="0"/>
+          <a:ext cx="0" cy="0"/>
+          <a:chOff x="0" y="0"/>
+          <a:chExt cx="0" cy="0"/>
+        </a:xfrm>
+      </p:grpSpPr>
+      <p:sp>
+        <p:nvSpPr>
+          <p:cNvPr id="2" name="Title 1">
+            <a:extLst>
+              <a:ext uri="{FF2B5EF4-FFF2-40B4-BE49-F238E27FC236}">
+                <a16:creationId xmlns:a16="http://schemas.microsoft.com/office/drawing/2014/main" id="{92FBF0EB-0901-2DD2-489D-525E570E7E54}"/>
+              </a:ext>
+            </a:extLst>
+          </p:cNvPr>
+          <p:cNvSpPr>
+            <a:spLocks noGrp="1"/>
+          </p:cNvSpPr>
+          <p:nvPr>
+            <p:ph type="title"/>
+          </p:nvPr>
+        </p:nvSpPr>
+        <p:spPr>
+          <a:xfrm>
+            <a:off x="517870" y="989014"/>
+            <a:ext cx="7734977" cy="1154944"/>
+          </a:xfrm>
+        </p:spPr>
+        <p:txBody>
+          <a:bodyPr/>
+          <a:lstStyle/>
+          <a:p>
+            <a:r>
+              <a:rPr lang="en-US" dirty="0"/>
+              <a:t>Refined Graphs</a:t>
+            </a:r>
+          </a:p>
+        </p:txBody>
+      </p:sp>
+      <p:sp>
+        <p:nvSpPr>
+          <p:cNvPr id="6" name="AutoShape 2">
+            <a:extLst>
+              <a:ext uri="{FF2B5EF4-FFF2-40B4-BE49-F238E27FC236}">
+                <a16:creationId xmlns:a16="http://schemas.microsoft.com/office/drawing/2014/main" id="{DC84F6B5-DB1A-1C4D-83EC-736C63F2BB76}"/>
+              </a:ext>
+            </a:extLst>
+          </p:cNvPr>
+          <p:cNvSpPr>
+            <a:spLocks noChangeAspect="1" noChangeArrowheads="1"/>
+          </p:cNvSpPr>
+          <p:nvPr/>
+        </p:nvSpPr>
+        <p:spPr bwMode="auto">
+          <a:xfrm>
+            <a:off x="5943600" y="3276600"/>
+            <a:ext cx="304800" cy="304800"/>
+          </a:xfrm>
+          <a:prstGeom prst="rect">
+            <a:avLst/>
+          </a:prstGeom>
+          <a:noFill/>
+          <a:extLst>
+            <a:ext uri="{909E8E84-426E-40DD-AFC4-6F175D3DCCD1}">
+              <a14:hiddenFill xmlns:a14="http://schemas.microsoft.com/office/drawing/2010/main">
+                <a:solidFill>
+                  <a:srgbClr val="FFFFFF"/>
+                </a:solidFill>
+              </a14:hiddenFill>
+            </a:ext>
+          </a:extLst>
+        </p:spPr>
+        <p:txBody>
+          <a:bodyPr vert="horz" wrap="square" lIns="91440" tIns="45720" rIns="91440" bIns="45720" numCol="1" anchor="t" anchorCtr="0" compatLnSpc="1">
+            <a:prstTxWarp prst="textNoShape">
+              <a:avLst/>
+            </a:prstTxWarp>
+          </a:bodyPr>
+          <a:lstStyle/>
+          <a:p>
+            <a:endParaRPr lang="en-US"/>
+          </a:p>
+        </p:txBody>
+      </p:sp>
+      <p:sp>
+        <p:nvSpPr>
+          <p:cNvPr id="7" name="AutoShape 4">
+            <a:extLst>
+              <a:ext uri="{FF2B5EF4-FFF2-40B4-BE49-F238E27FC236}">
+                <a16:creationId xmlns:a16="http://schemas.microsoft.com/office/drawing/2014/main" id="{2E9B0795-8BBE-E898-76C4-9D1FF84FF865}"/>
+              </a:ext>
+            </a:extLst>
+          </p:cNvPr>
+          <p:cNvSpPr>
+            <a:spLocks noChangeAspect="1" noChangeArrowheads="1"/>
+          </p:cNvSpPr>
+          <p:nvPr/>
+        </p:nvSpPr>
+        <p:spPr bwMode="auto">
+          <a:xfrm>
+            <a:off x="6096000" y="3429000"/>
+            <a:ext cx="304800" cy="304800"/>
+          </a:xfrm>
+          <a:prstGeom prst="rect">
+            <a:avLst/>
+          </a:prstGeom>
+          <a:noFill/>
+          <a:extLst>
+            <a:ext uri="{909E8E84-426E-40DD-AFC4-6F175D3DCCD1}">
+              <a14:hiddenFill xmlns:a14="http://schemas.microsoft.com/office/drawing/2010/main">
+                <a:solidFill>
+                  <a:srgbClr val="FFFFFF"/>
+                </a:solidFill>
+              </a14:hiddenFill>
+            </a:ext>
+          </a:extLst>
+        </p:spPr>
+        <p:txBody>
+          <a:bodyPr vert="horz" wrap="square" lIns="91440" tIns="45720" rIns="91440" bIns="45720" numCol="1" anchor="t" anchorCtr="0" compatLnSpc="1">
+            <a:prstTxWarp prst="textNoShape">
+              <a:avLst/>
+            </a:prstTxWarp>
+          </a:bodyPr>
+          <a:lstStyle/>
+          <a:p>
+            <a:endParaRPr lang="en-US"/>
+          </a:p>
+        </p:txBody>
+      </p:sp>
+      <p:pic>
+        <p:nvPicPr>
+          <p:cNvPr id="8" name="Picture 7">
+            <a:extLst>
+              <a:ext uri="{FF2B5EF4-FFF2-40B4-BE49-F238E27FC236}">
+                <a16:creationId xmlns:a16="http://schemas.microsoft.com/office/drawing/2014/main" id="{4EB071C5-FF4D-6D15-C544-4DAB0DD0DA99}"/>
+              </a:ext>
+            </a:extLst>
+          </p:cNvPr>
+          <p:cNvPicPr>
+            <a:picLocks noChangeAspect="1"/>
+          </p:cNvPicPr>
+          <p:nvPr/>
+        </p:nvPicPr>
+        <p:blipFill>
+          <a:blip r:embed="rId2"/>
+          <a:stretch>
+            <a:fillRect/>
+          </a:stretch>
+        </p:blipFill>
+        <p:spPr>
+          <a:xfrm>
+            <a:off x="6096000" y="2537764"/>
+            <a:ext cx="5155710" cy="3186113"/>
+          </a:xfrm>
+          <a:prstGeom prst="rect">
+            <a:avLst/>
+          </a:prstGeom>
+        </p:spPr>
+      </p:pic>
+      <p:pic>
+        <p:nvPicPr>
+          <p:cNvPr id="12" name="Picture 11">
+            <a:extLst>
+              <a:ext uri="{FF2B5EF4-FFF2-40B4-BE49-F238E27FC236}">
+                <a16:creationId xmlns:a16="http://schemas.microsoft.com/office/drawing/2014/main" id="{80256D6D-2436-30E1-D298-005ACF3D3D60}"/>
+              </a:ext>
+            </a:extLst>
+          </p:cNvPr>
+          <p:cNvPicPr>
+            <a:picLocks noChangeAspect="1"/>
+          </p:cNvPicPr>
+          <p:nvPr/>
+        </p:nvPicPr>
+        <p:blipFill>
+          <a:blip r:embed="rId3"/>
+          <a:stretch>
+            <a:fillRect/>
+          </a:stretch>
+        </p:blipFill>
+        <p:spPr>
+          <a:xfrm>
+            <a:off x="671774" y="2058204"/>
+            <a:ext cx="2652613" cy="1698697"/>
+          </a:xfrm>
+          <a:prstGeom prst="rect">
+            <a:avLst/>
+          </a:prstGeom>
+        </p:spPr>
+      </p:pic>
+      <p:sp>
+        <p:nvSpPr>
+          <p:cNvPr id="14" name="AutoShape 14">
+            <a:extLst>
+              <a:ext uri="{FF2B5EF4-FFF2-40B4-BE49-F238E27FC236}">
+                <a16:creationId xmlns:a16="http://schemas.microsoft.com/office/drawing/2014/main" id="{A3297FFA-46A0-3506-0EB7-D40FA486554A}"/>
+              </a:ext>
+            </a:extLst>
+          </p:cNvPr>
+          <p:cNvSpPr>
+            <a:spLocks noChangeAspect="1" noChangeArrowheads="1"/>
+          </p:cNvSpPr>
+          <p:nvPr/>
+        </p:nvSpPr>
+        <p:spPr bwMode="auto">
+          <a:xfrm>
+            <a:off x="6248400" y="3581400"/>
+            <a:ext cx="304800" cy="304800"/>
+          </a:xfrm>
+          <a:prstGeom prst="rect">
+            <a:avLst/>
+          </a:prstGeom>
+          <a:noFill/>
+          <a:extLst>
+            <a:ext uri="{909E8E84-426E-40DD-AFC4-6F175D3DCCD1}">
+              <a14:hiddenFill xmlns:a14="http://schemas.microsoft.com/office/drawing/2010/main">
+                <a:solidFill>
+                  <a:srgbClr val="FFFFFF"/>
+                </a:solidFill>
+              </a14:hiddenFill>
+            </a:ext>
+          </a:extLst>
+        </p:spPr>
+        <p:txBody>
+          <a:bodyPr vert="horz" wrap="square" lIns="91440" tIns="45720" rIns="91440" bIns="45720" numCol="1" anchor="t" anchorCtr="0" compatLnSpc="1">
+            <a:prstTxWarp prst="textNoShape">
+              <a:avLst/>
+            </a:prstTxWarp>
+          </a:bodyPr>
+          <a:lstStyle/>
+          <a:p>
+            <a:endParaRPr lang="en-US"/>
+          </a:p>
+        </p:txBody>
+      </p:sp>
+      <p:pic>
+        <p:nvPicPr>
+          <p:cNvPr id="15" name="Picture 14">
+            <a:extLst>
+              <a:ext uri="{FF2B5EF4-FFF2-40B4-BE49-F238E27FC236}">
+                <a16:creationId xmlns:a16="http://schemas.microsoft.com/office/drawing/2014/main" id="{F10B8331-7047-C91D-F70D-03CED052F59C}"/>
+              </a:ext>
+            </a:extLst>
+          </p:cNvPr>
+          <p:cNvPicPr>
+            <a:picLocks noChangeAspect="1"/>
+          </p:cNvPicPr>
+          <p:nvPr/>
+        </p:nvPicPr>
+        <p:blipFill>
+          <a:blip r:embed="rId4"/>
+          <a:stretch>
+            <a:fillRect/>
+          </a:stretch>
+        </p:blipFill>
+        <p:spPr>
+          <a:xfrm>
+            <a:off x="671774" y="3804590"/>
+            <a:ext cx="5119687" cy="1919287"/>
+          </a:xfrm>
+          <a:prstGeom prst="rect">
+            <a:avLst/>
+          </a:prstGeom>
+        </p:spPr>
+      </p:pic>
+    </p:spTree>
+    <p:extLst>
+      <p:ext uri="{BB962C8B-B14F-4D97-AF65-F5344CB8AC3E}">
+        <p14:creationId xmlns:p14="http://schemas.microsoft.com/office/powerpoint/2010/main" val="4054295758"/>
+      </p:ext>
+    </p:extLst>
+  </p:cSld>
+  <p:clrMapOvr>
+    <a:masterClrMapping/>
+  </p:clrMapOvr>
+</p:sld>
+</file>
+
+<file path=ppt/slides/slide21.xml><?xml version="1.0" encoding="utf-8"?>
 <p:sld xmlns:a="http://schemas.openxmlformats.org/drawingml/2006/main" xmlns:r="http://schemas.openxmlformats.org/officeDocument/2006/relationships" xmlns:p="http://schemas.openxmlformats.org/presentationml/2006/main">
   <p:cSld>
     <p:spTree>
@@ -13913,568 +15462,6 @@
   <p:clrMapOvr>
     <a:masterClrMapping/>
   </p:clrMapOvr>
-</p:sld>
-</file>
-
-<file path=ppt/slides/slide2.xml><?xml version="1.0" encoding="utf-8"?>
-<p:sld xmlns:a="http://schemas.openxmlformats.org/drawingml/2006/main" xmlns:r="http://schemas.openxmlformats.org/officeDocument/2006/relationships" xmlns:p="http://schemas.openxmlformats.org/presentationml/2006/main">
-  <p:cSld>
-    <p:bg>
-      <p:bgPr>
-        <a:solidFill>
-          <a:schemeClr val="bg2"/>
-        </a:solidFill>
-        <a:effectLst/>
-      </p:bgPr>
-    </p:bg>
-    <p:spTree>
-      <p:nvGrpSpPr>
-        <p:cNvPr id="1" name="">
-          <a:extLst>
-            <a:ext uri="{FF2B5EF4-FFF2-40B4-BE49-F238E27FC236}">
-              <a16:creationId xmlns:a16="http://schemas.microsoft.com/office/drawing/2014/main" id="{4A4D9D6F-CDAF-A802-A4F8-48BDA4DA1C6B}"/>
-            </a:ext>
-          </a:extLst>
-        </p:cNvPr>
-        <p:cNvGrpSpPr/>
-        <p:nvPr/>
-      </p:nvGrpSpPr>
-      <p:grpSpPr>
-        <a:xfrm>
-          <a:off x="0" y="0"/>
-          <a:ext cx="0" cy="0"/>
-          <a:chOff x="0" y="0"/>
-          <a:chExt cx="0" cy="0"/>
-        </a:xfrm>
-      </p:grpSpPr>
-      <p:sp>
-        <p:nvSpPr>
-          <p:cNvPr id="18" name="Rectangle 17">
-            <a:extLst>
-              <a:ext uri="{FF2B5EF4-FFF2-40B4-BE49-F238E27FC236}">
-                <a16:creationId xmlns:a16="http://schemas.microsoft.com/office/drawing/2014/main" id="{ADE57300-C7FF-4578-99A0-42B0295B123C}"/>
-              </a:ext>
-              <a:ext uri="{C183D7F6-B498-43B3-948B-1728B52AA6E4}">
-                <adec:decorative xmlns:adec="http://schemas.microsoft.com/office/drawing/2017/decorative" val="1"/>
-              </a:ext>
-            </a:extLst>
-          </p:cNvPr>
-          <p:cNvSpPr>
-            <a:spLocks noGrp="1" noRot="1" noChangeAspect="1" noMove="1" noResize="1" noEditPoints="1" noAdjustHandles="1" noChangeArrowheads="1" noChangeShapeType="1" noTextEdit="1"/>
-          </p:cNvSpPr>
-          <p:nvPr>
-            <p:extLst>
-              <p:ext uri="{386F3935-93C4-4BCD-93E2-E3B085C9AB24}">
-                <p16:designElem xmlns:p16="http://schemas.microsoft.com/office/powerpoint/2015/main" val="1"/>
-              </p:ext>
-            </p:extLst>
-          </p:nvPr>
-        </p:nvSpPr>
-        <p:spPr>
-          <a:xfrm>
-            <a:off x="517870" y="508090"/>
-            <a:ext cx="5021183" cy="149279"/>
-          </a:xfrm>
-          <a:prstGeom prst="rect">
-            <a:avLst/>
-          </a:prstGeom>
-          <a:solidFill>
-            <a:schemeClr val="tx1"/>
-          </a:solidFill>
-          <a:ln>
-            <a:noFill/>
-          </a:ln>
-        </p:spPr>
-        <p:style>
-          <a:lnRef idx="2">
-            <a:schemeClr val="accent1">
-              <a:shade val="50000"/>
-            </a:schemeClr>
-          </a:lnRef>
-          <a:fillRef idx="1">
-            <a:schemeClr val="accent1"/>
-          </a:fillRef>
-          <a:effectRef idx="0">
-            <a:schemeClr val="accent1"/>
-          </a:effectRef>
-          <a:fontRef idx="minor">
-            <a:schemeClr val="lt1"/>
-          </a:fontRef>
-        </p:style>
-        <p:txBody>
-          <a:bodyPr rtlCol="0" anchor="ctr"/>
-          <a:lstStyle/>
-          <a:p>
-            <a:pPr algn="ctr"/>
-            <a:endParaRPr lang="en-US"/>
-          </a:p>
-        </p:txBody>
-      </p:sp>
-      <p:sp useBgFill="1">
-        <p:nvSpPr>
-          <p:cNvPr id="20" name="Rectangle 19">
-            <a:extLst>
-              <a:ext uri="{FF2B5EF4-FFF2-40B4-BE49-F238E27FC236}">
-                <a16:creationId xmlns:a16="http://schemas.microsoft.com/office/drawing/2014/main" id="{A082E5AA-6E5F-4FCC-8C41-11E32F833BFC}"/>
-              </a:ext>
-              <a:ext uri="{C183D7F6-B498-43B3-948B-1728B52AA6E4}">
-                <adec:decorative xmlns:adec="http://schemas.microsoft.com/office/drawing/2017/decorative" val="1"/>
-              </a:ext>
-            </a:extLst>
-          </p:cNvPr>
-          <p:cNvSpPr>
-            <a:spLocks noGrp="1" noRot="1" noChangeAspect="1" noMove="1" noResize="1" noEditPoints="1" noAdjustHandles="1" noChangeArrowheads="1" noChangeShapeType="1" noTextEdit="1"/>
-          </p:cNvSpPr>
-          <p:nvPr>
-            <p:extLst>
-              <p:ext uri="{386F3935-93C4-4BCD-93E2-E3B085C9AB24}">
-                <p16:designElem xmlns:p16="http://schemas.microsoft.com/office/powerpoint/2015/main" val="1"/>
-              </p:ext>
-            </p:extLst>
-          </p:nvPr>
-        </p:nvSpPr>
-        <p:spPr>
-          <a:xfrm>
-            <a:off x="0" y="0"/>
-            <a:ext cx="12188952" cy="6857995"/>
-          </a:xfrm>
-          <a:prstGeom prst="rect">
-            <a:avLst/>
-          </a:prstGeom>
-          <a:ln>
-            <a:noFill/>
-          </a:ln>
-        </p:spPr>
-        <p:style>
-          <a:lnRef idx="2">
-            <a:schemeClr val="accent1">
-              <a:shade val="50000"/>
-            </a:schemeClr>
-          </a:lnRef>
-          <a:fillRef idx="1">
-            <a:schemeClr val="accent1"/>
-          </a:fillRef>
-          <a:effectRef idx="0">
-            <a:schemeClr val="accent1"/>
-          </a:effectRef>
-          <a:fontRef idx="minor">
-            <a:schemeClr val="lt1"/>
-          </a:fontRef>
-        </p:style>
-        <p:txBody>
-          <a:bodyPr rtlCol="0" anchor="ctr"/>
-          <a:lstStyle/>
-          <a:p>
-            <a:pPr algn="ctr"/>
-            <a:endParaRPr lang="en-US" dirty="0"/>
-          </a:p>
-        </p:txBody>
-      </p:sp>
-      <p:sp>
-        <p:nvSpPr>
-          <p:cNvPr id="22" name="Rectangle 21">
-            <a:extLst>
-              <a:ext uri="{FF2B5EF4-FFF2-40B4-BE49-F238E27FC236}">
-                <a16:creationId xmlns:a16="http://schemas.microsoft.com/office/drawing/2014/main" id="{EDC872B6-524A-4445-9AD6-FA0326B5D6EA}"/>
-              </a:ext>
-              <a:ext uri="{C183D7F6-B498-43B3-948B-1728B52AA6E4}">
-                <adec:decorative xmlns:adec="http://schemas.microsoft.com/office/drawing/2017/decorative" val="1"/>
-              </a:ext>
-            </a:extLst>
-          </p:cNvPr>
-          <p:cNvSpPr>
-            <a:spLocks noGrp="1" noRot="1" noChangeAspect="1" noMove="1" noResize="1" noEditPoints="1" noAdjustHandles="1" noChangeArrowheads="1" noChangeShapeType="1" noTextEdit="1"/>
-          </p:cNvSpPr>
-          <p:nvPr>
-            <p:extLst>
-              <p:ext uri="{386F3935-93C4-4BCD-93E2-E3B085C9AB24}">
-                <p16:designElem xmlns:p16="http://schemas.microsoft.com/office/powerpoint/2015/main" val="1"/>
-              </p:ext>
-            </p:extLst>
-          </p:nvPr>
-        </p:nvSpPr>
-        <p:spPr>
-          <a:xfrm>
-            <a:off x="0" y="0"/>
-            <a:ext cx="12188952" cy="6857995"/>
-          </a:xfrm>
-          <a:prstGeom prst="rect">
-            <a:avLst/>
-          </a:prstGeom>
-          <a:solidFill>
-            <a:schemeClr val="bg2">
-              <a:lumMod val="90000"/>
-              <a:alpha val="40000"/>
-            </a:schemeClr>
-          </a:solidFill>
-          <a:ln>
-            <a:noFill/>
-          </a:ln>
-        </p:spPr>
-        <p:style>
-          <a:lnRef idx="2">
-            <a:schemeClr val="accent1">
-              <a:shade val="50000"/>
-            </a:schemeClr>
-          </a:lnRef>
-          <a:fillRef idx="1">
-            <a:schemeClr val="accent1"/>
-          </a:fillRef>
-          <a:effectRef idx="0">
-            <a:schemeClr val="accent1"/>
-          </a:effectRef>
-          <a:fontRef idx="minor">
-            <a:schemeClr val="lt1"/>
-          </a:fontRef>
-        </p:style>
-        <p:txBody>
-          <a:bodyPr rtlCol="0" anchor="ctr"/>
-          <a:lstStyle/>
-          <a:p>
-            <a:pPr algn="ctr"/>
-            <a:endParaRPr lang="en-US" dirty="0"/>
-          </a:p>
-        </p:txBody>
-      </p:sp>
-      <p:sp>
-        <p:nvSpPr>
-          <p:cNvPr id="2" name="Title 1">
-            <a:extLst>
-              <a:ext uri="{FF2B5EF4-FFF2-40B4-BE49-F238E27FC236}">
-                <a16:creationId xmlns:a16="http://schemas.microsoft.com/office/drawing/2014/main" id="{3EC6F871-B05D-F6EA-A100-8BD3910A0EEC}"/>
-              </a:ext>
-            </a:extLst>
-          </p:cNvPr>
-          <p:cNvSpPr>
-            <a:spLocks noGrp="1"/>
-          </p:cNvSpPr>
-          <p:nvPr>
-            <p:ph type="ctrTitle"/>
-          </p:nvPr>
-        </p:nvSpPr>
-        <p:spPr>
-          <a:xfrm>
-            <a:off x="517870" y="978408"/>
-            <a:ext cx="5021182" cy="1752681"/>
-          </a:xfrm>
-        </p:spPr>
-        <p:txBody>
-          <a:bodyPr vert="horz" lIns="91440" tIns="45720" rIns="91440" bIns="45720" rtlCol="0" anchor="t">
-            <a:normAutofit/>
-          </a:bodyPr>
-          <a:lstStyle/>
-          <a:p>
-            <a:r>
-              <a:rPr lang="en-US" dirty="0"/>
-              <a:t>Update 1</a:t>
-            </a:r>
-          </a:p>
-        </p:txBody>
-      </p:sp>
-      <p:sp>
-        <p:nvSpPr>
-          <p:cNvPr id="24" name="Rectangle 23">
-            <a:extLst>
-              <a:ext uri="{FF2B5EF4-FFF2-40B4-BE49-F238E27FC236}">
-                <a16:creationId xmlns:a16="http://schemas.microsoft.com/office/drawing/2014/main" id="{92BE0106-0C20-465B-A1BE-0BAC2737B1AD}"/>
-              </a:ext>
-              <a:ext uri="{C183D7F6-B498-43B3-948B-1728B52AA6E4}">
-                <adec:decorative xmlns:adec="http://schemas.microsoft.com/office/drawing/2017/decorative" val="1"/>
-              </a:ext>
-            </a:extLst>
-          </p:cNvPr>
-          <p:cNvSpPr>
-            <a:spLocks noGrp="1" noRot="1" noChangeAspect="1" noMove="1" noResize="1" noEditPoints="1" noAdjustHandles="1" noChangeArrowheads="1" noChangeShapeType="1" noTextEdit="1"/>
-          </p:cNvSpPr>
-          <p:nvPr>
-            <p:extLst>
-              <p:ext uri="{386F3935-93C4-4BCD-93E2-E3B085C9AB24}">
-                <p16:designElem xmlns:p16="http://schemas.microsoft.com/office/powerpoint/2015/main" val="1"/>
-              </p:ext>
-            </p:extLst>
-          </p:nvPr>
-        </p:nvSpPr>
-        <p:spPr>
-          <a:xfrm>
-            <a:off x="517870" y="508090"/>
-            <a:ext cx="5021183" cy="149279"/>
-          </a:xfrm>
-          <a:prstGeom prst="rect">
-            <a:avLst/>
-          </a:prstGeom>
-          <a:solidFill>
-            <a:schemeClr val="tx1"/>
-          </a:solidFill>
-          <a:ln>
-            <a:noFill/>
-          </a:ln>
-        </p:spPr>
-        <p:style>
-          <a:lnRef idx="2">
-            <a:schemeClr val="accent1">
-              <a:shade val="50000"/>
-            </a:schemeClr>
-          </a:lnRef>
-          <a:fillRef idx="1">
-            <a:schemeClr val="accent1"/>
-          </a:fillRef>
-          <a:effectRef idx="0">
-            <a:schemeClr val="accent1"/>
-          </a:effectRef>
-          <a:fontRef idx="minor">
-            <a:schemeClr val="lt1"/>
-          </a:fontRef>
-        </p:style>
-        <p:txBody>
-          <a:bodyPr rtlCol="0" anchor="ctr"/>
-          <a:lstStyle/>
-          <a:p>
-            <a:pPr algn="ctr"/>
-            <a:endParaRPr lang="en-US"/>
-          </a:p>
-        </p:txBody>
-      </p:sp>
-      <p:sp>
-        <p:nvSpPr>
-          <p:cNvPr id="26" name="Rectangle 25">
-            <a:extLst>
-              <a:ext uri="{FF2B5EF4-FFF2-40B4-BE49-F238E27FC236}">
-                <a16:creationId xmlns:a16="http://schemas.microsoft.com/office/drawing/2014/main" id="{4A3D569D-D3A6-49CA-A483-291E95DACA14}"/>
-              </a:ext>
-              <a:ext uri="{C183D7F6-B498-43B3-948B-1728B52AA6E4}">
-                <adec:decorative xmlns:adec="http://schemas.microsoft.com/office/drawing/2017/decorative" val="1"/>
-              </a:ext>
-            </a:extLst>
-          </p:cNvPr>
-          <p:cNvSpPr>
-            <a:spLocks noGrp="1" noRot="1" noChangeAspect="1" noMove="1" noResize="1" noEditPoints="1" noAdjustHandles="1" noChangeArrowheads="1" noChangeShapeType="1" noTextEdit="1"/>
-          </p:cNvSpPr>
-          <p:nvPr>
-            <p:extLst>
-              <p:ext uri="{386F3935-93C4-4BCD-93E2-E3B085C9AB24}">
-                <p16:designElem xmlns:p16="http://schemas.microsoft.com/office/powerpoint/2015/main" val="1"/>
-              </p:ext>
-            </p:extLst>
-          </p:nvPr>
-        </p:nvSpPr>
-        <p:spPr>
-          <a:xfrm>
-            <a:off x="6662168" y="611650"/>
-            <a:ext cx="5021183" cy="45719"/>
-          </a:xfrm>
-          <a:prstGeom prst="rect">
-            <a:avLst/>
-          </a:prstGeom>
-          <a:solidFill>
-            <a:schemeClr val="tx1"/>
-          </a:solidFill>
-          <a:ln>
-            <a:noFill/>
-          </a:ln>
-        </p:spPr>
-        <p:style>
-          <a:lnRef idx="2">
-            <a:schemeClr val="accent1">
-              <a:shade val="50000"/>
-            </a:schemeClr>
-          </a:lnRef>
-          <a:fillRef idx="1">
-            <a:schemeClr val="accent1"/>
-          </a:fillRef>
-          <a:effectRef idx="0">
-            <a:schemeClr val="accent1"/>
-          </a:effectRef>
-          <a:fontRef idx="minor">
-            <a:schemeClr val="lt1"/>
-          </a:fontRef>
-        </p:style>
-        <p:txBody>
-          <a:bodyPr rtlCol="0" anchor="ctr"/>
-          <a:lstStyle/>
-          <a:p>
-            <a:pPr algn="ctr"/>
-            <a:endParaRPr lang="en-US"/>
-          </a:p>
-        </p:txBody>
-      </p:sp>
-      <p:sp>
-        <p:nvSpPr>
-          <p:cNvPr id="3" name="Subtitle 2">
-            <a:extLst>
-              <a:ext uri="{FF2B5EF4-FFF2-40B4-BE49-F238E27FC236}">
-                <a16:creationId xmlns:a16="http://schemas.microsoft.com/office/drawing/2014/main" id="{A87C903E-D9EE-7FAE-D1C5-9C477785B62D}"/>
-              </a:ext>
-            </a:extLst>
-          </p:cNvPr>
-          <p:cNvSpPr>
-            <a:spLocks noGrp="1"/>
-          </p:cNvSpPr>
-          <p:nvPr>
-            <p:ph type="subTitle" idx="1"/>
-          </p:nvPr>
-        </p:nvSpPr>
-        <p:spPr>
-          <a:xfrm>
-            <a:off x="6662168" y="969265"/>
-            <a:ext cx="5021182" cy="1752682"/>
-          </a:xfrm>
-        </p:spPr>
-        <p:txBody>
-          <a:bodyPr vert="horz" lIns="91440" tIns="45720" rIns="91440" bIns="45720" rtlCol="0">
-            <a:normAutofit/>
-          </a:bodyPr>
-          <a:lstStyle/>
-          <a:p>
-            <a:r>
-              <a:rPr lang="en-US" sz="2000" dirty="0"/>
-              <a:t>Frank Williams</a:t>
-            </a:r>
-          </a:p>
-          <a:p>
-            <a:r>
-              <a:rPr lang="en-US" sz="2000" dirty="0"/>
-              <a:t>Adrian Torres</a:t>
-            </a:r>
-          </a:p>
-          <a:p>
-            <a:r>
-              <a:rPr lang="en-US" sz="2000" dirty="0"/>
-              <a:t>Paige Madison</a:t>
-            </a:r>
-          </a:p>
-        </p:txBody>
-      </p:sp>
-      <p:pic>
-        <p:nvPicPr>
-          <p:cNvPr id="4" name="Picture 3" descr="A picture of an electromagnetic radiation">
-            <a:extLst>
-              <a:ext uri="{FF2B5EF4-FFF2-40B4-BE49-F238E27FC236}">
-                <a16:creationId xmlns:a16="http://schemas.microsoft.com/office/drawing/2014/main" id="{88DAC6A5-6E57-C47D-BC13-B5B37C7F874C}"/>
-              </a:ext>
-            </a:extLst>
-          </p:cNvPr>
-          <p:cNvPicPr>
-            <a:picLocks noChangeAspect="1"/>
-          </p:cNvPicPr>
-          <p:nvPr/>
-        </p:nvPicPr>
-        <p:blipFill rotWithShape="1">
-          <a:blip r:embed="rId2"/>
-          <a:srcRect t="29899" r="1" b="26769"/>
-          <a:stretch/>
-        </p:blipFill>
-        <p:spPr>
-          <a:xfrm>
-            <a:off x="517871" y="3004841"/>
-            <a:ext cx="11165136" cy="3241510"/>
-          </a:xfrm>
-          <a:prstGeom prst="rect">
-            <a:avLst/>
-          </a:prstGeom>
-        </p:spPr>
-      </p:pic>
-    </p:spTree>
-    <p:extLst>
-      <p:ext uri="{BB962C8B-B14F-4D97-AF65-F5344CB8AC3E}">
-        <p14:creationId xmlns:p14="http://schemas.microsoft.com/office/powerpoint/2010/main" val="2950926834"/>
-      </p:ext>
-    </p:extLst>
-  </p:cSld>
-  <p:clrMapOvr>
-    <a:masterClrMapping/>
-  </p:clrMapOvr>
-  <p:timing>
-    <p:tnLst>
-      <p:par>
-        <p:cTn id="1" dur="indefinite" restart="never" nodeType="tmRoot">
-          <p:childTnLst>
-            <p:seq concurrent="1" nextAc="seek">
-              <p:cTn id="2" dur="indefinite" nodeType="mainSeq">
-                <p:childTnLst>
-                  <p:par>
-                    <p:cTn id="3" fill="hold">
-                      <p:stCondLst>
-                        <p:cond delay="indefinite"/>
-                        <p:cond evt="onBegin" delay="0">
-                          <p:tn val="2"/>
-                        </p:cond>
-                      </p:stCondLst>
-                      <p:childTnLst>
-                        <p:par>
-                          <p:cTn id="4" fill="hold">
-                            <p:stCondLst>
-                              <p:cond delay="0"/>
-                            </p:stCondLst>
-                            <p:childTnLst>
-                              <p:par>
-                                <p:cTn id="5" presetID="10" presetClass="entr" presetSubtype="0" fill="hold" grpId="0" nodeType="withEffect">
-                                  <p:stCondLst>
-                                    <p:cond delay="1000"/>
-                                  </p:stCondLst>
-                                  <p:iterate type="lt">
-                                    <p:tmPct val="10000"/>
-                                  </p:iterate>
-                                  <p:childTnLst>
-                                    <p:set>
-                                      <p:cBhvr>
-                                        <p:cTn id="6" dur="1" fill="hold">
-                                          <p:stCondLst>
-                                            <p:cond delay="0"/>
-                                          </p:stCondLst>
-                                        </p:cTn>
-                                        <p:tgtEl>
-                                          <p:spTgt spid="2"/>
-                                        </p:tgtEl>
-                                        <p:attrNameLst>
-                                          <p:attrName>style.visibility</p:attrName>
-                                        </p:attrNameLst>
-                                      </p:cBhvr>
-                                      <p:to>
-                                        <p:strVal val="visible"/>
-                                      </p:to>
-                                    </p:set>
-                                    <p:animEffect transition="in" filter="fade">
-                                      <p:cBhvr>
-                                        <p:cTn id="7" dur="400"/>
-                                        <p:tgtEl>
-                                          <p:spTgt spid="2"/>
-                                        </p:tgtEl>
-                                      </p:cBhvr>
-                                    </p:animEffect>
-                                  </p:childTnLst>
-                                </p:cTn>
-                              </p:par>
-                            </p:childTnLst>
-                          </p:cTn>
-                        </p:par>
-                      </p:childTnLst>
-                    </p:cTn>
-                  </p:par>
-                </p:childTnLst>
-              </p:cTn>
-              <p:prevCondLst>
-                <p:cond evt="onPrev" delay="0">
-                  <p:tgtEl>
-                    <p:sldTgt/>
-                  </p:tgtEl>
-                </p:cond>
-              </p:prevCondLst>
-              <p:nextCondLst>
-                <p:cond evt="onNext" delay="0">
-                  <p:tgtEl>
-                    <p:sldTgt/>
-                  </p:tgtEl>
-                </p:cond>
-              </p:nextCondLst>
-            </p:seq>
-          </p:childTnLst>
-        </p:cTn>
-      </p:par>
-    </p:tnLst>
-    <p:bldLst>
-      <p:bldP spid="2" grpId="0"/>
-    </p:bldLst>
-  </p:timing>
 </p:sld>
 </file>
 
@@ -19249,23 +20236,6 @@
 </file>
 
 <file path=customXml/item1.xml><?xml version="1.0" encoding="utf-8"?>
-<p:properties xmlns:p="http://schemas.microsoft.com/office/2006/metadata/properties" xmlns:xsi="http://www.w3.org/2001/XMLSchema-instance" xmlns:pc="http://schemas.microsoft.com/office/infopath/2007/PartnerControls">
-  <documentManagement>
-    <_activity xmlns="1bb7031c-a8b4-4cbe-98f2-525d179cfc77" xsi:nil="true"/>
-  </documentManagement>
-</p:properties>
-</file>
-
-<file path=customXml/item2.xml><?xml version="1.0" encoding="utf-8"?>
-<?mso-contentType ?>
-<FormTemplates xmlns="http://schemas.microsoft.com/sharepoint/v3/contenttype/forms">
-  <Display>DocumentLibraryForm</Display>
-  <Edit>DocumentLibraryForm</Edit>
-  <New>DocumentLibraryForm</New>
-</FormTemplates>
-</file>
-
-<file path=customXml/item3.xml><?xml version="1.0" encoding="utf-8"?>
 <ct:contentTypeSchema xmlns:ct="http://schemas.microsoft.com/office/2006/metadata/contentType" xmlns:ma="http://schemas.microsoft.com/office/2006/metadata/properties/metaAttributes" ct:_="" ma:_="" ma:contentTypeName="Document" ma:contentTypeID="0x01010025C3CCE2691F374E8A682604DBAFCEB8" ma:contentTypeVersion="8" ma:contentTypeDescription="Create a new document." ma:contentTypeScope="" ma:versionID="e44a2bde4a21e5fc7f073e5891c1620c">
   <xsd:schema xmlns:xsd="http://www.w3.org/2001/XMLSchema" xmlns:xs="http://www.w3.org/2001/XMLSchema" xmlns:p="http://schemas.microsoft.com/office/2006/metadata/properties" xmlns:ns3="1bb7031c-a8b4-4cbe-98f2-525d179cfc77" xmlns:ns4="c1f6d79c-77e4-4aca-9148-98b3b94f6507" targetNamespace="http://schemas.microsoft.com/office/2006/metadata/properties" ma:root="true" ma:fieldsID="50d934612a8cb0ade44dfd10f47000e8" ns3:_="" ns4:_="">
     <xsd:import namespace="1bb7031c-a8b4-4cbe-98f2-525d179cfc77"/>
@@ -19454,32 +20424,24 @@
 </ct:contentTypeSchema>
 </file>
 
-<file path=customXml/itemProps1.xml><?xml version="1.0" encoding="utf-8"?>
-<ds:datastoreItem xmlns:ds="http://schemas.openxmlformats.org/officeDocument/2006/customXml" ds:itemID="{A6CFE1F4-DC23-4922-8914-581F71D27CC2}">
-  <ds:schemaRefs>
-    <ds:schemaRef ds:uri="http://www.w3.org/XML/1998/namespace"/>
-    <ds:schemaRef ds:uri="c1f6d79c-77e4-4aca-9148-98b3b94f6507"/>
-    <ds:schemaRef ds:uri="http://purl.org/dc/dcmitype/"/>
-    <ds:schemaRef ds:uri="http://schemas.microsoft.com/office/2006/metadata/properties"/>
-    <ds:schemaRef ds:uri="http://schemas.microsoft.com/office/2006/documentManagement/types"/>
-    <ds:schemaRef ds:uri="1bb7031c-a8b4-4cbe-98f2-525d179cfc77"/>
-    <ds:schemaRef ds:uri="http://purl.org/dc/terms/"/>
-    <ds:schemaRef ds:uri="http://schemas.microsoft.com/office/infopath/2007/PartnerControls"/>
-    <ds:schemaRef ds:uri="http://schemas.openxmlformats.org/package/2006/metadata/core-properties"/>
-    <ds:schemaRef ds:uri="http://purl.org/dc/elements/1.1/"/>
-  </ds:schemaRefs>
-</ds:datastoreItem>
+<file path=customXml/item2.xml><?xml version="1.0" encoding="utf-8"?>
+<?mso-contentType ?>
+<FormTemplates xmlns="http://schemas.microsoft.com/sharepoint/v3/contenttype/forms">
+  <Display>DocumentLibraryForm</Display>
+  <Edit>DocumentLibraryForm</Edit>
+  <New>DocumentLibraryForm</New>
+</FormTemplates>
 </file>
 
-<file path=customXml/itemProps2.xml><?xml version="1.0" encoding="utf-8"?>
-<ds:datastoreItem xmlns:ds="http://schemas.openxmlformats.org/officeDocument/2006/customXml" ds:itemID="{144358F8-A1A2-4C12-9300-834AC979E5E3}">
-  <ds:schemaRefs>
-    <ds:schemaRef ds:uri="http://schemas.microsoft.com/sharepoint/v3/contenttype/forms"/>
-  </ds:schemaRefs>
-</ds:datastoreItem>
+<file path=customXml/item3.xml><?xml version="1.0" encoding="utf-8"?>
+<p:properties xmlns:p="http://schemas.microsoft.com/office/2006/metadata/properties" xmlns:xsi="http://www.w3.org/2001/XMLSchema-instance" xmlns:pc="http://schemas.microsoft.com/office/infopath/2007/PartnerControls">
+  <documentManagement>
+    <_activity xmlns="1bb7031c-a8b4-4cbe-98f2-525d179cfc77" xsi:nil="true"/>
+  </documentManagement>
+</p:properties>
 </file>
 
-<file path=customXml/itemProps3.xml><?xml version="1.0" encoding="utf-8"?>
+<file path=customXml/itemProps1.xml><?xml version="1.0" encoding="utf-8"?>
 <ds:datastoreItem xmlns:ds="http://schemas.openxmlformats.org/officeDocument/2006/customXml" ds:itemID="{E501FBCF-1E08-43BD-A885-0DEB57D7635A}">
   <ds:schemaRefs>
     <ds:schemaRef ds:uri="1bb7031c-a8b4-4cbe-98f2-525d179cfc77"/>
@@ -19496,4 +20458,29 @@
     <ds:schemaRef ds:uri="http://www.w3.org/2001/XMLSchema"/>
   </ds:schemaRefs>
 </ds:datastoreItem>
+</file>
+
+<file path=customXml/itemProps2.xml><?xml version="1.0" encoding="utf-8"?>
+<ds:datastoreItem xmlns:ds="http://schemas.openxmlformats.org/officeDocument/2006/customXml" ds:itemID="{144358F8-A1A2-4C12-9300-834AC979E5E3}">
+  <ds:schemaRefs>
+    <ds:schemaRef ds:uri="http://schemas.microsoft.com/sharepoint/v3/contenttype/forms"/>
+  </ds:schemaRefs>
+</ds:datastoreItem>
+</file>
+
+<file path=customXml/itemProps3.xml><?xml version="1.0" encoding="utf-8"?>
+<ds:datastoreItem xmlns:ds="http://schemas.openxmlformats.org/officeDocument/2006/customXml" ds:itemID="{A6CFE1F4-DC23-4922-8914-581F71D27CC2}">
+  <ds:schemaRefs>
+    <ds:schemaRef ds:uri="http://www.w3.org/XML/1998/namespace"/>
+    <ds:schemaRef ds:uri="c1f6d79c-77e4-4aca-9148-98b3b94f6507"/>
+    <ds:schemaRef ds:uri="http://purl.org/dc/dcmitype/"/>
+    <ds:schemaRef ds:uri="http://schemas.microsoft.com/office/2006/metadata/properties"/>
+    <ds:schemaRef ds:uri="http://schemas.microsoft.com/office/2006/documentManagement/types"/>
+    <ds:schemaRef ds:uri="1bb7031c-a8b4-4cbe-98f2-525d179cfc77"/>
+    <ds:schemaRef ds:uri="http://purl.org/dc/terms/"/>
+    <ds:schemaRef ds:uri="http://schemas.microsoft.com/office/infopath/2007/PartnerControls"/>
+    <ds:schemaRef ds:uri="http://schemas.openxmlformats.org/package/2006/metadata/core-properties"/>
+    <ds:schemaRef ds:uri="http://purl.org/dc/elements/1.1/"/>
+  </ds:schemaRefs>
+</ds:datastoreItem>
 </file>
</xml_diff>

<commit_message>
Model Output Added to Update 3 PowerPoint
</commit_message>
<xml_diff>
--- a/Final_Group_Project_Project 1.pptx
+++ b/Final_Group_Project_Project 1.pptx
@@ -25,7 +25,8 @@
     <p:sldId id="280" r:id="rId22"/>
     <p:sldId id="279" r:id="rId23"/>
     <p:sldId id="281" r:id="rId24"/>
-    <p:sldId id="278" r:id="rId25"/>
+    <p:sldId id="282" r:id="rId25"/>
+    <p:sldId id="278" r:id="rId26"/>
   </p:sldIdLst>
   <p:sldSz cx="12192000" cy="6858000"/>
   <p:notesSz cx="6858000" cy="9144000"/>
@@ -6516,7 +6517,7 @@
           <a:p>
             <a:fld id="{5E7AA473-D82F-4EFF-9DF7-AE6D83C51288}" type="datetime1">
               <a:rPr lang="en-US" smtClean="0"/>
-              <a:t>3/10/2024</a:t>
+              <a:t>3/13/2024</a:t>
             </a:fld>
             <a:endParaRPr lang="en-US"/>
           </a:p>
@@ -6769,7 +6770,7 @@
           <a:p>
             <a:fld id="{1E12F1F0-FE2D-4C1C-B320-8CB9BE735F0F}" type="datetime1">
               <a:rPr lang="en-US" smtClean="0"/>
-              <a:t>3/10/2024</a:t>
+              <a:t>3/13/2024</a:t>
             </a:fld>
             <a:endParaRPr lang="en-US"/>
           </a:p>
@@ -7035,7 +7036,7 @@
           <a:p>
             <a:fld id="{2CF1B96C-10FD-4EBC-9029-9652B7535D02}" type="datetime1">
               <a:rPr lang="en-US" smtClean="0"/>
-              <a:t>3/10/2024</a:t>
+              <a:t>3/13/2024</a:t>
             </a:fld>
             <a:endParaRPr lang="en-US"/>
           </a:p>
@@ -7288,7 +7289,7 @@
           <a:p>
             <a:fld id="{14878474-CC00-4A95-9D50-A41C12D1EEC4}" type="datetime1">
               <a:rPr lang="en-US" smtClean="0"/>
-              <a:t>3/10/2024</a:t>
+              <a:t>3/13/2024</a:t>
             </a:fld>
             <a:endParaRPr lang="en-US"/>
           </a:p>
@@ -7565,7 +7566,7 @@
           <a:p>
             <a:fld id="{7F38C8B4-7FBB-408F-BDB9-F0496874AFB2}" type="datetime1">
               <a:rPr lang="en-US" smtClean="0"/>
-              <a:t>3/10/2024</a:t>
+              <a:t>3/13/2024</a:t>
             </a:fld>
             <a:endParaRPr lang="en-US"/>
           </a:p>
@@ -7835,7 +7836,7 @@
           <a:p>
             <a:fld id="{2BB8EE20-A5E2-47D3-8F6D-A2BA7AB2E093}" type="datetime1">
               <a:rPr lang="en-US" smtClean="0"/>
-              <a:t>3/10/2024</a:t>
+              <a:t>3/13/2024</a:t>
             </a:fld>
             <a:endParaRPr lang="en-US"/>
           </a:p>
@@ -8390,7 +8391,7 @@
           <a:p>
             <a:fld id="{3382CF99-132F-413F-B7EF-71A5C33F2ED6}" type="datetime1">
               <a:rPr lang="en-US" smtClean="0"/>
-              <a:t>3/10/2024</a:t>
+              <a:t>3/13/2024</a:t>
             </a:fld>
             <a:endParaRPr lang="en-US"/>
           </a:p>
@@ -8531,7 +8532,7 @@
           <a:p>
             <a:fld id="{1F17AE06-98E0-4D9F-A059-92C3548821BB}" type="datetime1">
               <a:rPr lang="en-US" smtClean="0"/>
-              <a:t>3/10/2024</a:t>
+              <a:t>3/13/2024</a:t>
             </a:fld>
             <a:endParaRPr lang="en-US"/>
           </a:p>
@@ -8644,7 +8645,7 @@
           <a:p>
             <a:fld id="{FFBA00CA-3DDC-4705-B840-978EF5EA0707}" type="datetime1">
               <a:rPr lang="en-US" smtClean="0"/>
-              <a:t>3/10/2024</a:t>
+              <a:t>3/13/2024</a:t>
             </a:fld>
             <a:endParaRPr lang="en-US"/>
           </a:p>
@@ -8961,7 +8962,7 @@
           <a:p>
             <a:fld id="{FC366D49-0BBA-4C5A-AD96-6448CA63451A}" type="datetime1">
               <a:rPr lang="en-US" smtClean="0"/>
-              <a:t>3/10/2024</a:t>
+              <a:t>3/13/2024</a:t>
             </a:fld>
             <a:endParaRPr lang="en-US"/>
           </a:p>
@@ -9256,7 +9257,7 @@
           <a:p>
             <a:fld id="{4F4EB293-A316-472D-A8B4-6947CF1A12B7}" type="datetime1">
               <a:rPr lang="en-US" smtClean="0"/>
-              <a:t>3/10/2024</a:t>
+              <a:t>3/13/2024</a:t>
             </a:fld>
             <a:endParaRPr lang="en-US"/>
           </a:p>
@@ -9533,7 +9534,7 @@
           <a:p>
             <a:fld id="{734BCCD4-CEB1-405B-A443-DD9CBCBEA552}" type="datetime1">
               <a:rPr lang="en-US" smtClean="0"/>
-              <a:t>3/10/2024</a:t>
+              <a:t>3/13/2024</a:t>
             </a:fld>
             <a:endParaRPr lang="en-US"/>
           </a:p>
@@ -14938,6 +14939,759 @@
 </file>
 
 <file path=ppt/slides/slide21.xml><?xml version="1.0" encoding="utf-8"?>
+<p:sld xmlns:a="http://schemas.openxmlformats.org/drawingml/2006/main" xmlns:r="http://schemas.openxmlformats.org/officeDocument/2006/relationships" xmlns:p="http://schemas.openxmlformats.org/presentationml/2006/main">
+  <p:cSld>
+    <p:bg>
+      <p:bgPr>
+        <a:solidFill>
+          <a:schemeClr val="bg1"/>
+        </a:solidFill>
+        <a:effectLst/>
+      </p:bgPr>
+    </p:bg>
+    <p:spTree>
+      <p:nvGrpSpPr>
+        <p:cNvPr id="1" name=""/>
+        <p:cNvGrpSpPr/>
+        <p:nvPr/>
+      </p:nvGrpSpPr>
+      <p:grpSpPr>
+        <a:xfrm>
+          <a:off x="0" y="0"/>
+          <a:ext cx="0" cy="0"/>
+          <a:chOff x="0" y="0"/>
+          <a:chExt cx="0" cy="0"/>
+        </a:xfrm>
+      </p:grpSpPr>
+      <p:sp>
+        <p:nvSpPr>
+          <p:cNvPr id="19" name="Rectangle 18">
+            <a:extLst>
+              <a:ext uri="{FF2B5EF4-FFF2-40B4-BE49-F238E27FC236}">
+                <a16:creationId xmlns:a16="http://schemas.microsoft.com/office/drawing/2014/main" id="{ADE57300-C7FF-4578-99A0-42B0295B123C}"/>
+              </a:ext>
+              <a:ext uri="{C183D7F6-B498-43B3-948B-1728B52AA6E4}">
+                <adec:decorative xmlns:adec="http://schemas.microsoft.com/office/drawing/2017/decorative" val="1"/>
+              </a:ext>
+            </a:extLst>
+          </p:cNvPr>
+          <p:cNvSpPr>
+            <a:spLocks noGrp="1" noRot="1" noChangeAspect="1" noMove="1" noResize="1" noEditPoints="1" noAdjustHandles="1" noChangeArrowheads="1" noChangeShapeType="1" noTextEdit="1"/>
+          </p:cNvSpPr>
+          <p:nvPr>
+            <p:extLst>
+              <p:ext uri="{386F3935-93C4-4BCD-93E2-E3B085C9AB24}">
+                <p16:designElem xmlns:p16="http://schemas.microsoft.com/office/powerpoint/2015/main" val="1"/>
+              </p:ext>
+            </p:extLst>
+          </p:nvPr>
+        </p:nvSpPr>
+        <p:spPr>
+          <a:xfrm>
+            <a:off x="517870" y="508090"/>
+            <a:ext cx="5021183" cy="149279"/>
+          </a:xfrm>
+          <a:prstGeom prst="rect">
+            <a:avLst/>
+          </a:prstGeom>
+          <a:solidFill>
+            <a:schemeClr val="tx1"/>
+          </a:solidFill>
+          <a:ln>
+            <a:noFill/>
+          </a:ln>
+        </p:spPr>
+        <p:style>
+          <a:lnRef idx="2">
+            <a:schemeClr val="accent1">
+              <a:shade val="50000"/>
+            </a:schemeClr>
+          </a:lnRef>
+          <a:fillRef idx="1">
+            <a:schemeClr val="accent1"/>
+          </a:fillRef>
+          <a:effectRef idx="0">
+            <a:schemeClr val="accent1"/>
+          </a:effectRef>
+          <a:fontRef idx="minor">
+            <a:schemeClr val="lt1"/>
+          </a:fontRef>
+        </p:style>
+        <p:txBody>
+          <a:bodyPr rtlCol="0" anchor="ctr"/>
+          <a:lstStyle/>
+          <a:p>
+            <a:pPr algn="ctr"/>
+            <a:endParaRPr lang="en-US"/>
+          </a:p>
+        </p:txBody>
+      </p:sp>
+      <p:sp>
+        <p:nvSpPr>
+          <p:cNvPr id="21" name="Rectangle 20">
+            <a:extLst>
+              <a:ext uri="{FF2B5EF4-FFF2-40B4-BE49-F238E27FC236}">
+                <a16:creationId xmlns:a16="http://schemas.microsoft.com/office/drawing/2014/main" id="{DB8F8250-7A81-4A19-87AD-FFB2CE4E39A5}"/>
+              </a:ext>
+              <a:ext uri="{C183D7F6-B498-43B3-948B-1728B52AA6E4}">
+                <adec:decorative xmlns:adec="http://schemas.microsoft.com/office/drawing/2017/decorative" val="1"/>
+              </a:ext>
+            </a:extLst>
+          </p:cNvPr>
+          <p:cNvSpPr>
+            <a:spLocks noGrp="1" noRot="1" noChangeAspect="1" noMove="1" noResize="1" noEditPoints="1" noAdjustHandles="1" noChangeArrowheads="1" noChangeShapeType="1" noTextEdit="1"/>
+          </p:cNvSpPr>
+          <p:nvPr>
+            <p:extLst>
+              <p:ext uri="{386F3935-93C4-4BCD-93E2-E3B085C9AB24}">
+                <p16:designElem xmlns:p16="http://schemas.microsoft.com/office/powerpoint/2015/main" val="1"/>
+              </p:ext>
+            </p:extLst>
+          </p:nvPr>
+        </p:nvSpPr>
+        <p:spPr>
+          <a:xfrm>
+            <a:off x="517870" y="508090"/>
+            <a:ext cx="5021183" cy="149279"/>
+          </a:xfrm>
+          <a:prstGeom prst="rect">
+            <a:avLst/>
+          </a:prstGeom>
+          <a:solidFill>
+            <a:schemeClr val="tx1"/>
+          </a:solidFill>
+          <a:ln>
+            <a:noFill/>
+          </a:ln>
+        </p:spPr>
+        <p:style>
+          <a:lnRef idx="2">
+            <a:schemeClr val="accent1">
+              <a:shade val="50000"/>
+            </a:schemeClr>
+          </a:lnRef>
+          <a:fillRef idx="1">
+            <a:schemeClr val="accent1"/>
+          </a:fillRef>
+          <a:effectRef idx="0">
+            <a:schemeClr val="accent1"/>
+          </a:effectRef>
+          <a:fontRef idx="minor">
+            <a:schemeClr val="lt1"/>
+          </a:fontRef>
+        </p:style>
+        <p:txBody>
+          <a:bodyPr rtlCol="0" anchor="ctr"/>
+          <a:lstStyle/>
+          <a:p>
+            <a:pPr algn="ctr"/>
+            <a:endParaRPr lang="en-US"/>
+          </a:p>
+        </p:txBody>
+      </p:sp>
+      <p:sp>
+        <p:nvSpPr>
+          <p:cNvPr id="23" name="Rectangle 22">
+            <a:extLst>
+              <a:ext uri="{FF2B5EF4-FFF2-40B4-BE49-F238E27FC236}">
+                <a16:creationId xmlns:a16="http://schemas.microsoft.com/office/drawing/2014/main" id="{F3FF94B3-6D3E-44FE-BB02-A9027C0003C7}"/>
+              </a:ext>
+              <a:ext uri="{C183D7F6-B498-43B3-948B-1728B52AA6E4}">
+                <adec:decorative xmlns:adec="http://schemas.microsoft.com/office/drawing/2017/decorative" val="1"/>
+              </a:ext>
+            </a:extLst>
+          </p:cNvPr>
+          <p:cNvSpPr>
+            <a:spLocks noGrp="1" noRot="1" noChangeAspect="1" noMove="1" noResize="1" noEditPoints="1" noAdjustHandles="1" noChangeArrowheads="1" noChangeShapeType="1" noTextEdit="1"/>
+          </p:cNvSpPr>
+          <p:nvPr>
+            <p:extLst>
+              <p:ext uri="{386F3935-93C4-4BCD-93E2-E3B085C9AB24}">
+                <p16:designElem xmlns:p16="http://schemas.microsoft.com/office/powerpoint/2015/main" val="1"/>
+              </p:ext>
+            </p:extLst>
+          </p:nvPr>
+        </p:nvSpPr>
+        <p:spPr>
+          <a:xfrm>
+            <a:off x="6662168" y="6209925"/>
+            <a:ext cx="5021183" cy="45719"/>
+          </a:xfrm>
+          <a:prstGeom prst="rect">
+            <a:avLst/>
+          </a:prstGeom>
+          <a:solidFill>
+            <a:schemeClr val="tx1"/>
+          </a:solidFill>
+          <a:ln>
+            <a:noFill/>
+          </a:ln>
+        </p:spPr>
+        <p:style>
+          <a:lnRef idx="2">
+            <a:schemeClr val="accent1">
+              <a:shade val="50000"/>
+            </a:schemeClr>
+          </a:lnRef>
+          <a:fillRef idx="1">
+            <a:schemeClr val="accent1"/>
+          </a:fillRef>
+          <a:effectRef idx="0">
+            <a:schemeClr val="accent1"/>
+          </a:effectRef>
+          <a:fontRef idx="minor">
+            <a:schemeClr val="lt1"/>
+          </a:fontRef>
+        </p:style>
+        <p:txBody>
+          <a:bodyPr rtlCol="0" anchor="ctr"/>
+          <a:lstStyle/>
+          <a:p>
+            <a:pPr algn="ctr"/>
+            <a:endParaRPr lang="en-US"/>
+          </a:p>
+        </p:txBody>
+      </p:sp>
+      <p:sp useBgFill="1">
+        <p:nvSpPr>
+          <p:cNvPr id="25" name="Rectangle 24">
+            <a:extLst>
+              <a:ext uri="{FF2B5EF4-FFF2-40B4-BE49-F238E27FC236}">
+                <a16:creationId xmlns:a16="http://schemas.microsoft.com/office/drawing/2014/main" id="{FAF3766F-DEF3-4802-BB0D-7A18EDD9704F}"/>
+              </a:ext>
+              <a:ext uri="{C183D7F6-B498-43B3-948B-1728B52AA6E4}">
+                <adec:decorative xmlns:adec="http://schemas.microsoft.com/office/drawing/2017/decorative" val="1"/>
+              </a:ext>
+            </a:extLst>
+          </p:cNvPr>
+          <p:cNvSpPr>
+            <a:spLocks noGrp="1" noRot="1" noChangeAspect="1" noMove="1" noResize="1" noEditPoints="1" noAdjustHandles="1" noChangeArrowheads="1" noChangeShapeType="1" noTextEdit="1"/>
+          </p:cNvSpPr>
+          <p:nvPr>
+            <p:extLst>
+              <p:ext uri="{386F3935-93C4-4BCD-93E2-E3B085C9AB24}">
+                <p16:designElem xmlns:p16="http://schemas.microsoft.com/office/powerpoint/2015/main" val="1"/>
+              </p:ext>
+            </p:extLst>
+          </p:nvPr>
+        </p:nvSpPr>
+        <p:spPr>
+          <a:xfrm>
+            <a:off x="0" y="0"/>
+            <a:ext cx="12188952" cy="6857995"/>
+          </a:xfrm>
+          <a:prstGeom prst="rect">
+            <a:avLst/>
+          </a:prstGeom>
+          <a:ln>
+            <a:noFill/>
+          </a:ln>
+        </p:spPr>
+        <p:style>
+          <a:lnRef idx="2">
+            <a:schemeClr val="accent1">
+              <a:shade val="50000"/>
+            </a:schemeClr>
+          </a:lnRef>
+          <a:fillRef idx="1">
+            <a:schemeClr val="accent1"/>
+          </a:fillRef>
+          <a:effectRef idx="0">
+            <a:schemeClr val="accent1"/>
+          </a:effectRef>
+          <a:fontRef idx="minor">
+            <a:schemeClr val="lt1"/>
+          </a:fontRef>
+        </p:style>
+        <p:txBody>
+          <a:bodyPr rtlCol="0" anchor="ctr"/>
+          <a:lstStyle/>
+          <a:p>
+            <a:pPr algn="ctr"/>
+            <a:endParaRPr lang="en-US" dirty="0"/>
+          </a:p>
+        </p:txBody>
+      </p:sp>
+      <p:sp>
+        <p:nvSpPr>
+          <p:cNvPr id="2" name="Title 1">
+            <a:extLst>
+              <a:ext uri="{FF2B5EF4-FFF2-40B4-BE49-F238E27FC236}">
+                <a16:creationId xmlns:a16="http://schemas.microsoft.com/office/drawing/2014/main" id="{92FBF0EB-0901-2DD2-489D-525E570E7E54}"/>
+              </a:ext>
+            </a:extLst>
+          </p:cNvPr>
+          <p:cNvSpPr>
+            <a:spLocks noGrp="1"/>
+          </p:cNvSpPr>
+          <p:nvPr>
+            <p:ph type="title"/>
+          </p:nvPr>
+        </p:nvSpPr>
+        <p:spPr>
+          <a:xfrm>
+            <a:off x="521208" y="-22763"/>
+            <a:ext cx="7726680" cy="1062061"/>
+          </a:xfrm>
+        </p:spPr>
+        <p:txBody>
+          <a:bodyPr vert="horz" lIns="91440" tIns="45720" rIns="91440" bIns="45720" rtlCol="0" anchor="t">
+            <a:normAutofit/>
+          </a:bodyPr>
+          <a:lstStyle/>
+          <a:p>
+            <a:r>
+              <a:rPr lang="en-US" sz="4000" dirty="0"/>
+              <a:t>Model Outputs</a:t>
+            </a:r>
+          </a:p>
+        </p:txBody>
+      </p:sp>
+      <p:sp>
+        <p:nvSpPr>
+          <p:cNvPr id="27" name="Freeform: Shape 26">
+            <a:extLst>
+              <a:ext uri="{FF2B5EF4-FFF2-40B4-BE49-F238E27FC236}">
+                <a16:creationId xmlns:a16="http://schemas.microsoft.com/office/drawing/2014/main" id="{DCC11005-BC53-5976-9587-FB0B62EF64BB}"/>
+              </a:ext>
+              <a:ext uri="{C183D7F6-B498-43B3-948B-1728B52AA6E4}">
+                <adec:decorative xmlns:adec="http://schemas.microsoft.com/office/drawing/2017/decorative" val="1"/>
+              </a:ext>
+            </a:extLst>
+          </p:cNvPr>
+          <p:cNvSpPr>
+            <a:spLocks noGrp="1" noRot="1" noChangeAspect="1" noMove="1" noResize="1" noEditPoints="1" noAdjustHandles="1" noChangeArrowheads="1" noChangeShapeType="1" noTextEdit="1"/>
+          </p:cNvSpPr>
+          <p:nvPr>
+            <p:extLst>
+              <p:ext uri="{386F3935-93C4-4BCD-93E2-E3B085C9AB24}">
+                <p16:designElem xmlns:p16="http://schemas.microsoft.com/office/powerpoint/2015/main" val="1"/>
+              </p:ext>
+            </p:extLst>
+          </p:nvPr>
+        </p:nvSpPr>
+        <p:spPr>
+          <a:xfrm>
+            <a:off x="517869" y="508090"/>
+            <a:ext cx="11153214" cy="149279"/>
+          </a:xfrm>
+          <a:custGeom>
+            <a:avLst/>
+            <a:gdLst>
+              <a:gd name="connsiteX0" fmla="*/ 0 w 8085002"/>
+              <a:gd name="connsiteY0" fmla="*/ 0 h 149279"/>
+              <a:gd name="connsiteX1" fmla="*/ 8085002 w 8085002"/>
+              <a:gd name="connsiteY1" fmla="*/ 0 h 149279"/>
+              <a:gd name="connsiteX2" fmla="*/ 8085002 w 8085002"/>
+              <a:gd name="connsiteY2" fmla="*/ 149279 h 149279"/>
+              <a:gd name="connsiteX3" fmla="*/ 0 w 8085002"/>
+              <a:gd name="connsiteY3" fmla="*/ 149279 h 149279"/>
+            </a:gdLst>
+            <a:ahLst/>
+            <a:cxnLst>
+              <a:cxn ang="0">
+                <a:pos x="connsiteX0" y="connsiteY0"/>
+              </a:cxn>
+              <a:cxn ang="0">
+                <a:pos x="connsiteX1" y="connsiteY1"/>
+              </a:cxn>
+              <a:cxn ang="0">
+                <a:pos x="connsiteX2" y="connsiteY2"/>
+              </a:cxn>
+              <a:cxn ang="0">
+                <a:pos x="connsiteX3" y="connsiteY3"/>
+              </a:cxn>
+            </a:cxnLst>
+            <a:rect l="l" t="t" r="r" b="b"/>
+            <a:pathLst>
+              <a:path w="8085002" h="149279">
+                <a:moveTo>
+                  <a:pt x="0" y="0"/>
+                </a:moveTo>
+                <a:lnTo>
+                  <a:pt x="8085002" y="0"/>
+                </a:lnTo>
+                <a:lnTo>
+                  <a:pt x="8085002" y="149279"/>
+                </a:lnTo>
+                <a:lnTo>
+                  <a:pt x="0" y="149279"/>
+                </a:lnTo>
+                <a:close/>
+              </a:path>
+            </a:pathLst>
+          </a:custGeom>
+          <a:solidFill>
+            <a:schemeClr val="tx1"/>
+          </a:solidFill>
+          <a:ln>
+            <a:noFill/>
+          </a:ln>
+        </p:spPr>
+        <p:style>
+          <a:lnRef idx="2">
+            <a:schemeClr val="accent1">
+              <a:shade val="50000"/>
+            </a:schemeClr>
+          </a:lnRef>
+          <a:fillRef idx="1">
+            <a:schemeClr val="accent1"/>
+          </a:fillRef>
+          <a:effectRef idx="0">
+            <a:schemeClr val="accent1"/>
+          </a:effectRef>
+          <a:fontRef idx="minor">
+            <a:schemeClr val="lt1"/>
+          </a:fontRef>
+        </p:style>
+        <p:txBody>
+          <a:bodyPr wrap="square" rtlCol="0" anchor="ctr">
+            <a:noAutofit/>
+          </a:bodyPr>
+          <a:lstStyle/>
+          <a:p>
+            <a:pPr algn="ctr"/>
+            <a:endParaRPr lang="en-US"/>
+          </a:p>
+        </p:txBody>
+      </p:sp>
+      <p:pic>
+        <p:nvPicPr>
+          <p:cNvPr id="4" name="Picture 3" descr="K-Fold Logistic Regression Model&#10;">
+            <a:extLst>
+              <a:ext uri="{FF2B5EF4-FFF2-40B4-BE49-F238E27FC236}">
+                <a16:creationId xmlns:a16="http://schemas.microsoft.com/office/drawing/2014/main" id="{9647C2DA-ACE2-4726-E112-041CAAF755BB}"/>
+              </a:ext>
+            </a:extLst>
+          </p:cNvPr>
+          <p:cNvPicPr>
+            <a:picLocks noChangeAspect="1"/>
+          </p:cNvPicPr>
+          <p:nvPr/>
+        </p:nvPicPr>
+        <p:blipFill>
+          <a:blip r:embed="rId2">
+            <a:extLst>
+              <a:ext uri="{28A0092B-C50C-407E-A947-70E740481C1C}">
+                <a14:useLocalDpi xmlns:a14="http://schemas.microsoft.com/office/drawing/2010/main" val="0"/>
+              </a:ext>
+            </a:extLst>
+          </a:blip>
+          <a:stretch>
+            <a:fillRect/>
+          </a:stretch>
+        </p:blipFill>
+        <p:spPr>
+          <a:xfrm>
+            <a:off x="5368266" y="1271180"/>
+            <a:ext cx="1958890" cy="2660222"/>
+          </a:xfrm>
+          <a:prstGeom prst="rect">
+            <a:avLst/>
+          </a:prstGeom>
+        </p:spPr>
+      </p:pic>
+      <p:pic>
+        <p:nvPicPr>
+          <p:cNvPr id="5" name="Content Placeholder 18" descr="Logistic Regression Model">
+            <a:extLst>
+              <a:ext uri="{FF2B5EF4-FFF2-40B4-BE49-F238E27FC236}">
+                <a16:creationId xmlns:a16="http://schemas.microsoft.com/office/drawing/2014/main" id="{C413D080-EE2F-4FA8-76C0-8E9C1BB17800}"/>
+              </a:ext>
+              <a:ext uri="{C183D7F6-B498-43B3-948B-1728B52AA6E4}">
+                <adec:decorative xmlns:adec="http://schemas.microsoft.com/office/drawing/2017/decorative" val="0"/>
+              </a:ext>
+            </a:extLst>
+          </p:cNvPr>
+          <p:cNvPicPr>
+            <a:picLocks noGrp="1" noChangeAspect="1"/>
+          </p:cNvPicPr>
+          <p:nvPr>
+            <p:ph idx="1"/>
+          </p:nvPr>
+        </p:nvPicPr>
+        <p:blipFill>
+          <a:blip r:embed="rId3">
+            <a:extLst>
+              <a:ext uri="{28A0092B-C50C-407E-A947-70E740481C1C}">
+                <a14:useLocalDpi xmlns:a14="http://schemas.microsoft.com/office/drawing/2010/main" val="0"/>
+              </a:ext>
+            </a:extLst>
+          </a:blip>
+          <a:stretch>
+            <a:fillRect/>
+          </a:stretch>
+        </p:blipFill>
+        <p:spPr>
+          <a:xfrm>
+            <a:off x="8395914" y="1206399"/>
+            <a:ext cx="2724280" cy="3078283"/>
+          </a:xfrm>
+          <a:prstGeom prst="rect">
+            <a:avLst/>
+          </a:prstGeom>
+        </p:spPr>
+      </p:pic>
+      <p:sp>
+        <p:nvSpPr>
+          <p:cNvPr id="6" name="AutoShape 2">
+            <a:extLst>
+              <a:ext uri="{FF2B5EF4-FFF2-40B4-BE49-F238E27FC236}">
+                <a16:creationId xmlns:a16="http://schemas.microsoft.com/office/drawing/2014/main" id="{DC84F6B5-DB1A-1C4D-83EC-736C63F2BB76}"/>
+              </a:ext>
+            </a:extLst>
+          </p:cNvPr>
+          <p:cNvSpPr>
+            <a:spLocks noChangeAspect="1" noChangeArrowheads="1"/>
+          </p:cNvSpPr>
+          <p:nvPr/>
+        </p:nvSpPr>
+        <p:spPr bwMode="auto">
+          <a:xfrm>
+            <a:off x="5943600" y="3276600"/>
+            <a:ext cx="304800" cy="304800"/>
+          </a:xfrm>
+          <a:prstGeom prst="rect">
+            <a:avLst/>
+          </a:prstGeom>
+          <a:noFill/>
+          <a:extLst>
+            <a:ext uri="{909E8E84-426E-40DD-AFC4-6F175D3DCCD1}">
+              <a14:hiddenFill xmlns:a14="http://schemas.microsoft.com/office/drawing/2010/main">
+                <a:solidFill>
+                  <a:srgbClr val="FFFFFF"/>
+                </a:solidFill>
+              </a14:hiddenFill>
+            </a:ext>
+          </a:extLst>
+        </p:spPr>
+        <p:txBody>
+          <a:bodyPr vert="horz" wrap="square" lIns="91440" tIns="45720" rIns="91440" bIns="45720" numCol="1" anchor="t" anchorCtr="0" compatLnSpc="1">
+            <a:prstTxWarp prst="textNoShape">
+              <a:avLst/>
+            </a:prstTxWarp>
+          </a:bodyPr>
+          <a:lstStyle/>
+          <a:p>
+            <a:endParaRPr lang="en-US"/>
+          </a:p>
+        </p:txBody>
+      </p:sp>
+      <p:sp>
+        <p:nvSpPr>
+          <p:cNvPr id="7" name="AutoShape 4">
+            <a:extLst>
+              <a:ext uri="{FF2B5EF4-FFF2-40B4-BE49-F238E27FC236}">
+                <a16:creationId xmlns:a16="http://schemas.microsoft.com/office/drawing/2014/main" id="{2E9B0795-8BBE-E898-76C4-9D1FF84FF865}"/>
+              </a:ext>
+            </a:extLst>
+          </p:cNvPr>
+          <p:cNvSpPr>
+            <a:spLocks noChangeAspect="1" noChangeArrowheads="1"/>
+          </p:cNvSpPr>
+          <p:nvPr/>
+        </p:nvSpPr>
+        <p:spPr bwMode="auto">
+          <a:xfrm>
+            <a:off x="6096000" y="3429000"/>
+            <a:ext cx="304800" cy="304800"/>
+          </a:xfrm>
+          <a:prstGeom prst="rect">
+            <a:avLst/>
+          </a:prstGeom>
+          <a:noFill/>
+          <a:extLst>
+            <a:ext uri="{909E8E84-426E-40DD-AFC4-6F175D3DCCD1}">
+              <a14:hiddenFill xmlns:a14="http://schemas.microsoft.com/office/drawing/2010/main">
+                <a:solidFill>
+                  <a:srgbClr val="FFFFFF"/>
+                </a:solidFill>
+              </a14:hiddenFill>
+            </a:ext>
+          </a:extLst>
+        </p:spPr>
+        <p:txBody>
+          <a:bodyPr vert="horz" wrap="square" lIns="91440" tIns="45720" rIns="91440" bIns="45720" numCol="1" anchor="t" anchorCtr="0" compatLnSpc="1">
+            <a:prstTxWarp prst="textNoShape">
+              <a:avLst/>
+            </a:prstTxWarp>
+          </a:bodyPr>
+          <a:lstStyle/>
+          <a:p>
+            <a:endParaRPr lang="en-US"/>
+          </a:p>
+        </p:txBody>
+      </p:sp>
+      <p:sp>
+        <p:nvSpPr>
+          <p:cNvPr id="14" name="AutoShape 14">
+            <a:extLst>
+              <a:ext uri="{FF2B5EF4-FFF2-40B4-BE49-F238E27FC236}">
+                <a16:creationId xmlns:a16="http://schemas.microsoft.com/office/drawing/2014/main" id="{A3297FFA-46A0-3506-0EB7-D40FA486554A}"/>
+              </a:ext>
+            </a:extLst>
+          </p:cNvPr>
+          <p:cNvSpPr>
+            <a:spLocks noChangeAspect="1" noChangeArrowheads="1"/>
+          </p:cNvSpPr>
+          <p:nvPr/>
+        </p:nvSpPr>
+        <p:spPr bwMode="auto">
+          <a:xfrm>
+            <a:off x="6248400" y="3581400"/>
+            <a:ext cx="304800" cy="304800"/>
+          </a:xfrm>
+          <a:prstGeom prst="rect">
+            <a:avLst/>
+          </a:prstGeom>
+          <a:noFill/>
+          <a:extLst>
+            <a:ext uri="{909E8E84-426E-40DD-AFC4-6F175D3DCCD1}">
+              <a14:hiddenFill xmlns:a14="http://schemas.microsoft.com/office/drawing/2010/main">
+                <a:solidFill>
+                  <a:srgbClr val="FFFFFF"/>
+                </a:solidFill>
+              </a14:hiddenFill>
+            </a:ext>
+          </a:extLst>
+        </p:spPr>
+        <p:txBody>
+          <a:bodyPr vert="horz" wrap="square" lIns="91440" tIns="45720" rIns="91440" bIns="45720" numCol="1" anchor="t" anchorCtr="0" compatLnSpc="1">
+            <a:prstTxWarp prst="textNoShape">
+              <a:avLst/>
+            </a:prstTxWarp>
+          </a:bodyPr>
+          <a:lstStyle/>
+          <a:p>
+            <a:endParaRPr lang="en-US"/>
+          </a:p>
+        </p:txBody>
+      </p:sp>
+      <p:sp>
+        <p:nvSpPr>
+          <p:cNvPr id="9" name="TextBox 8">
+            <a:extLst>
+              <a:ext uri="{FF2B5EF4-FFF2-40B4-BE49-F238E27FC236}">
+                <a16:creationId xmlns:a16="http://schemas.microsoft.com/office/drawing/2014/main" id="{E951FA5B-C538-356C-F99F-9CC65A48FA3C}"/>
+              </a:ext>
+            </a:extLst>
+          </p:cNvPr>
+          <p:cNvSpPr txBox="1"/>
+          <p:nvPr/>
+        </p:nvSpPr>
+        <p:spPr>
+          <a:xfrm>
+            <a:off x="4467367" y="4164421"/>
+            <a:ext cx="3562066" cy="369332"/>
+          </a:xfrm>
+          <a:prstGeom prst="rect">
+            <a:avLst/>
+          </a:prstGeom>
+          <a:solidFill>
+            <a:schemeClr val="bg1"/>
+          </a:solidFill>
+        </p:spPr>
+        <p:txBody>
+          <a:bodyPr wrap="square" rtlCol="0">
+            <a:spAutoFit/>
+          </a:bodyPr>
+          <a:lstStyle/>
+          <a:p>
+            <a:r>
+              <a:rPr lang="en-US" dirty="0"/>
+              <a:t>K-Fold Logistic Regression Model</a:t>
+            </a:r>
+          </a:p>
+        </p:txBody>
+      </p:sp>
+      <p:sp>
+        <p:nvSpPr>
+          <p:cNvPr id="10" name="TextBox 9">
+            <a:extLst>
+              <a:ext uri="{FF2B5EF4-FFF2-40B4-BE49-F238E27FC236}">
+                <a16:creationId xmlns:a16="http://schemas.microsoft.com/office/drawing/2014/main" id="{85C9C11E-E592-02B3-EEDF-A067E228CAE9}"/>
+              </a:ext>
+            </a:extLst>
+          </p:cNvPr>
+          <p:cNvSpPr txBox="1"/>
+          <p:nvPr/>
+        </p:nvSpPr>
+        <p:spPr>
+          <a:xfrm>
+            <a:off x="8247888" y="4211894"/>
+            <a:ext cx="3809470" cy="369332"/>
+          </a:xfrm>
+          <a:prstGeom prst="rect">
+            <a:avLst/>
+          </a:prstGeom>
+          <a:solidFill>
+            <a:schemeClr val="bg1"/>
+          </a:solidFill>
+        </p:spPr>
+        <p:txBody>
+          <a:bodyPr wrap="square" rtlCol="0">
+            <a:spAutoFit/>
+          </a:bodyPr>
+          <a:lstStyle/>
+          <a:p>
+            <a:r>
+              <a:rPr lang="en-US" dirty="0"/>
+              <a:t>Logistic Regression Model</a:t>
+            </a:r>
+          </a:p>
+        </p:txBody>
+      </p:sp>
+      <p:sp>
+        <p:nvSpPr>
+          <p:cNvPr id="11" name="TextBox 10">
+            <a:extLst>
+              <a:ext uri="{FF2B5EF4-FFF2-40B4-BE49-F238E27FC236}">
+                <a16:creationId xmlns:a16="http://schemas.microsoft.com/office/drawing/2014/main" id="{5A11B6AA-1DF3-ECD8-B74D-368C524CBF2E}"/>
+              </a:ext>
+            </a:extLst>
+          </p:cNvPr>
+          <p:cNvSpPr txBox="1"/>
+          <p:nvPr/>
+        </p:nvSpPr>
+        <p:spPr>
+          <a:xfrm>
+            <a:off x="635891" y="1362722"/>
+            <a:ext cx="3562066" cy="1477328"/>
+          </a:xfrm>
+          <a:prstGeom prst="rect">
+            <a:avLst/>
+          </a:prstGeom>
+          <a:solidFill>
+            <a:schemeClr val="bg1"/>
+          </a:solidFill>
+        </p:spPr>
+        <p:txBody>
+          <a:bodyPr wrap="square" rtlCol="0">
+            <a:spAutoFit/>
+          </a:bodyPr>
+          <a:lstStyle/>
+          <a:p>
+            <a:r>
+              <a:rPr lang="en-US" dirty="0"/>
+              <a:t>As can be seen in the pictures of the model outputs, the accuracy metrics are very similar, but the K-fold version of the logistic regression model is slightly better.</a:t>
+            </a:r>
+          </a:p>
+        </p:txBody>
+      </p:sp>
+    </p:spTree>
+    <p:extLst>
+      <p:ext uri="{BB962C8B-B14F-4D97-AF65-F5344CB8AC3E}">
+        <p14:creationId xmlns:p14="http://schemas.microsoft.com/office/powerpoint/2010/main" val="795394541"/>
+      </p:ext>
+    </p:extLst>
+  </p:cSld>
+  <p:clrMapOvr>
+    <a:masterClrMapping/>
+  </p:clrMapOvr>
+</p:sld>
+</file>
+
+<file path=ppt/slides/slide22.xml><?xml version="1.0" encoding="utf-8"?>
 <p:sld xmlns:a="http://schemas.openxmlformats.org/drawingml/2006/main" xmlns:r="http://schemas.openxmlformats.org/officeDocument/2006/relationships" xmlns:p="http://schemas.openxmlformats.org/presentationml/2006/main">
   <p:cSld>
     <p:spTree>
@@ -20236,6 +20990,15 @@
 </file>
 
 <file path=customXml/item1.xml><?xml version="1.0" encoding="utf-8"?>
+<?mso-contentType ?>
+<FormTemplates xmlns="http://schemas.microsoft.com/sharepoint/v3/contenttype/forms">
+  <Display>DocumentLibraryForm</Display>
+  <Edit>DocumentLibraryForm</Edit>
+  <New>DocumentLibraryForm</New>
+</FormTemplates>
+</file>
+
+<file path=customXml/item2.xml><?xml version="1.0" encoding="utf-8"?>
 <ct:contentTypeSchema xmlns:ct="http://schemas.microsoft.com/office/2006/metadata/contentType" xmlns:ma="http://schemas.microsoft.com/office/2006/metadata/properties/metaAttributes" ct:_="" ma:_="" ma:contentTypeName="Document" ma:contentTypeID="0x01010025C3CCE2691F374E8A682604DBAFCEB8" ma:contentTypeVersion="8" ma:contentTypeDescription="Create a new document." ma:contentTypeScope="" ma:versionID="e44a2bde4a21e5fc7f073e5891c1620c">
   <xsd:schema xmlns:xsd="http://www.w3.org/2001/XMLSchema" xmlns:xs="http://www.w3.org/2001/XMLSchema" xmlns:p="http://schemas.microsoft.com/office/2006/metadata/properties" xmlns:ns3="1bb7031c-a8b4-4cbe-98f2-525d179cfc77" xmlns:ns4="c1f6d79c-77e4-4aca-9148-98b3b94f6507" targetNamespace="http://schemas.microsoft.com/office/2006/metadata/properties" ma:root="true" ma:fieldsID="50d934612a8cb0ade44dfd10f47000e8" ns3:_="" ns4:_="">
     <xsd:import namespace="1bb7031c-a8b4-4cbe-98f2-525d179cfc77"/>
@@ -20424,15 +21187,6 @@
 </ct:contentTypeSchema>
 </file>
 
-<file path=customXml/item2.xml><?xml version="1.0" encoding="utf-8"?>
-<?mso-contentType ?>
-<FormTemplates xmlns="http://schemas.microsoft.com/sharepoint/v3/contenttype/forms">
-  <Display>DocumentLibraryForm</Display>
-  <Edit>DocumentLibraryForm</Edit>
-  <New>DocumentLibraryForm</New>
-</FormTemplates>
-</file>
-
 <file path=customXml/item3.xml><?xml version="1.0" encoding="utf-8"?>
 <p:properties xmlns:p="http://schemas.microsoft.com/office/2006/metadata/properties" xmlns:xsi="http://www.w3.org/2001/XMLSchema-instance" xmlns:pc="http://schemas.microsoft.com/office/infopath/2007/PartnerControls">
   <documentManagement>
@@ -20442,6 +21196,14 @@
 </file>
 
 <file path=customXml/itemProps1.xml><?xml version="1.0" encoding="utf-8"?>
+<ds:datastoreItem xmlns:ds="http://schemas.openxmlformats.org/officeDocument/2006/customXml" ds:itemID="{144358F8-A1A2-4C12-9300-834AC979E5E3}">
+  <ds:schemaRefs>
+    <ds:schemaRef ds:uri="http://schemas.microsoft.com/sharepoint/v3/contenttype/forms"/>
+  </ds:schemaRefs>
+</ds:datastoreItem>
+</file>
+
+<file path=customXml/itemProps2.xml><?xml version="1.0" encoding="utf-8"?>
 <ds:datastoreItem xmlns:ds="http://schemas.openxmlformats.org/officeDocument/2006/customXml" ds:itemID="{E501FBCF-1E08-43BD-A885-0DEB57D7635A}">
   <ds:schemaRefs>
     <ds:schemaRef ds:uri="1bb7031c-a8b4-4cbe-98f2-525d179cfc77"/>
@@ -20456,14 +21218,6 @@
     <ds:schemaRef ds:uri="http://schemas.microsoft.com/office/infopath/2007/PartnerControls"/>
     <ds:schemaRef ds:uri="http://schemas.openxmlformats.org/package/2006/metadata/core-properties"/>
     <ds:schemaRef ds:uri="http://www.w3.org/2001/XMLSchema"/>
-  </ds:schemaRefs>
-</ds:datastoreItem>
-</file>
-
-<file path=customXml/itemProps2.xml><?xml version="1.0" encoding="utf-8"?>
-<ds:datastoreItem xmlns:ds="http://schemas.openxmlformats.org/officeDocument/2006/customXml" ds:itemID="{144358F8-A1A2-4C12-9300-834AC979E5E3}">
-  <ds:schemaRefs>
-    <ds:schemaRef ds:uri="http://schemas.microsoft.com/sharepoint/v3/contenttype/forms"/>
   </ds:schemaRefs>
 </ds:datastoreItem>
 </file>

</xml_diff>

<commit_message>
Updated PowerPoint, Word Doc, and R code
All three include the version of the model that under samples the "No" response in the HadHeartAttack column
</commit_message>
<xml_diff>
--- a/Final_Group_Project_Project 1.pptx
+++ b/Final_Group_Project_Project 1.pptx
@@ -6517,7 +6517,7 @@
           <a:p>
             <a:fld id="{5E7AA473-D82F-4EFF-9DF7-AE6D83C51288}" type="datetime1">
               <a:rPr lang="en-US" smtClean="0"/>
-              <a:t>3/13/2024</a:t>
+              <a:t>3/21/2024</a:t>
             </a:fld>
             <a:endParaRPr lang="en-US"/>
           </a:p>
@@ -6770,7 +6770,7 @@
           <a:p>
             <a:fld id="{1E12F1F0-FE2D-4C1C-B320-8CB9BE735F0F}" type="datetime1">
               <a:rPr lang="en-US" smtClean="0"/>
-              <a:t>3/13/2024</a:t>
+              <a:t>3/21/2024</a:t>
             </a:fld>
             <a:endParaRPr lang="en-US"/>
           </a:p>
@@ -7036,7 +7036,7 @@
           <a:p>
             <a:fld id="{2CF1B96C-10FD-4EBC-9029-9652B7535D02}" type="datetime1">
               <a:rPr lang="en-US" smtClean="0"/>
-              <a:t>3/13/2024</a:t>
+              <a:t>3/21/2024</a:t>
             </a:fld>
             <a:endParaRPr lang="en-US"/>
           </a:p>
@@ -7289,7 +7289,7 @@
           <a:p>
             <a:fld id="{14878474-CC00-4A95-9D50-A41C12D1EEC4}" type="datetime1">
               <a:rPr lang="en-US" smtClean="0"/>
-              <a:t>3/13/2024</a:t>
+              <a:t>3/21/2024</a:t>
             </a:fld>
             <a:endParaRPr lang="en-US"/>
           </a:p>
@@ -7566,7 +7566,7 @@
           <a:p>
             <a:fld id="{7F38C8B4-7FBB-408F-BDB9-F0496874AFB2}" type="datetime1">
               <a:rPr lang="en-US" smtClean="0"/>
-              <a:t>3/13/2024</a:t>
+              <a:t>3/21/2024</a:t>
             </a:fld>
             <a:endParaRPr lang="en-US"/>
           </a:p>
@@ -7836,7 +7836,7 @@
           <a:p>
             <a:fld id="{2BB8EE20-A5E2-47D3-8F6D-A2BA7AB2E093}" type="datetime1">
               <a:rPr lang="en-US" smtClean="0"/>
-              <a:t>3/13/2024</a:t>
+              <a:t>3/21/2024</a:t>
             </a:fld>
             <a:endParaRPr lang="en-US"/>
           </a:p>
@@ -8391,7 +8391,7 @@
           <a:p>
             <a:fld id="{3382CF99-132F-413F-B7EF-71A5C33F2ED6}" type="datetime1">
               <a:rPr lang="en-US" smtClean="0"/>
-              <a:t>3/13/2024</a:t>
+              <a:t>3/21/2024</a:t>
             </a:fld>
             <a:endParaRPr lang="en-US"/>
           </a:p>
@@ -8532,7 +8532,7 @@
           <a:p>
             <a:fld id="{1F17AE06-98E0-4D9F-A059-92C3548821BB}" type="datetime1">
               <a:rPr lang="en-US" smtClean="0"/>
-              <a:t>3/13/2024</a:t>
+              <a:t>3/21/2024</a:t>
             </a:fld>
             <a:endParaRPr lang="en-US"/>
           </a:p>
@@ -8645,7 +8645,7 @@
           <a:p>
             <a:fld id="{FFBA00CA-3DDC-4705-B840-978EF5EA0707}" type="datetime1">
               <a:rPr lang="en-US" smtClean="0"/>
-              <a:t>3/13/2024</a:t>
+              <a:t>3/21/2024</a:t>
             </a:fld>
             <a:endParaRPr lang="en-US"/>
           </a:p>
@@ -8962,7 +8962,7 @@
           <a:p>
             <a:fld id="{FC366D49-0BBA-4C5A-AD96-6448CA63451A}" type="datetime1">
               <a:rPr lang="en-US" smtClean="0"/>
-              <a:t>3/13/2024</a:t>
+              <a:t>3/21/2024</a:t>
             </a:fld>
             <a:endParaRPr lang="en-US"/>
           </a:p>
@@ -9257,7 +9257,7 @@
           <a:p>
             <a:fld id="{4F4EB293-A316-472D-A8B4-6947CF1A12B7}" type="datetime1">
               <a:rPr lang="en-US" smtClean="0"/>
-              <a:t>3/13/2024</a:t>
+              <a:t>3/21/2024</a:t>
             </a:fld>
             <a:endParaRPr lang="en-US"/>
           </a:p>
@@ -9534,7 +9534,7 @@
           <a:p>
             <a:fld id="{734BCCD4-CEB1-405B-A443-DD9CBCBEA552}" type="datetime1">
               <a:rPr lang="en-US" smtClean="0"/>
-              <a:t>3/13/2024</a:t>
+              <a:t>3/21/2024</a:t>
             </a:fld>
             <a:endParaRPr lang="en-US"/>
           </a:p>
@@ -20990,12 +20990,11 @@
 </file>
 
 <file path=customXml/item1.xml><?xml version="1.0" encoding="utf-8"?>
-<?mso-contentType ?>
-<FormTemplates xmlns="http://schemas.microsoft.com/sharepoint/v3/contenttype/forms">
-  <Display>DocumentLibraryForm</Display>
-  <Edit>DocumentLibraryForm</Edit>
-  <New>DocumentLibraryForm</New>
-</FormTemplates>
+<p:properties xmlns:p="http://schemas.microsoft.com/office/2006/metadata/properties" xmlns:xsi="http://www.w3.org/2001/XMLSchema-instance" xmlns:pc="http://schemas.microsoft.com/office/infopath/2007/PartnerControls">
+  <documentManagement>
+    <_activity xmlns="1bb7031c-a8b4-4cbe-98f2-525d179cfc77" xsi:nil="true"/>
+  </documentManagement>
+</p:properties>
 </file>
 
 <file path=customXml/item2.xml><?xml version="1.0" encoding="utf-8"?>
@@ -21188,17 +21187,27 @@
 </file>
 
 <file path=customXml/item3.xml><?xml version="1.0" encoding="utf-8"?>
-<p:properties xmlns:p="http://schemas.microsoft.com/office/2006/metadata/properties" xmlns:xsi="http://www.w3.org/2001/XMLSchema-instance" xmlns:pc="http://schemas.microsoft.com/office/infopath/2007/PartnerControls">
-  <documentManagement>
-    <_activity xmlns="1bb7031c-a8b4-4cbe-98f2-525d179cfc77" xsi:nil="true"/>
-  </documentManagement>
-</p:properties>
+<?mso-contentType ?>
+<FormTemplates xmlns="http://schemas.microsoft.com/sharepoint/v3/contenttype/forms">
+  <Display>DocumentLibraryForm</Display>
+  <Edit>DocumentLibraryForm</Edit>
+  <New>DocumentLibraryForm</New>
+</FormTemplates>
 </file>
 
 <file path=customXml/itemProps1.xml><?xml version="1.0" encoding="utf-8"?>
-<ds:datastoreItem xmlns:ds="http://schemas.openxmlformats.org/officeDocument/2006/customXml" ds:itemID="{144358F8-A1A2-4C12-9300-834AC979E5E3}">
+<ds:datastoreItem xmlns:ds="http://schemas.openxmlformats.org/officeDocument/2006/customXml" ds:itemID="{A6CFE1F4-DC23-4922-8914-581F71D27CC2}">
   <ds:schemaRefs>
-    <ds:schemaRef ds:uri="http://schemas.microsoft.com/sharepoint/v3/contenttype/forms"/>
+    <ds:schemaRef ds:uri="http://www.w3.org/XML/1998/namespace"/>
+    <ds:schemaRef ds:uri="c1f6d79c-77e4-4aca-9148-98b3b94f6507"/>
+    <ds:schemaRef ds:uri="http://purl.org/dc/dcmitype/"/>
+    <ds:schemaRef ds:uri="http://schemas.microsoft.com/office/2006/metadata/properties"/>
+    <ds:schemaRef ds:uri="http://schemas.microsoft.com/office/2006/documentManagement/types"/>
+    <ds:schemaRef ds:uri="1bb7031c-a8b4-4cbe-98f2-525d179cfc77"/>
+    <ds:schemaRef ds:uri="http://purl.org/dc/terms/"/>
+    <ds:schemaRef ds:uri="http://schemas.microsoft.com/office/infopath/2007/PartnerControls"/>
+    <ds:schemaRef ds:uri="http://schemas.openxmlformats.org/package/2006/metadata/core-properties"/>
+    <ds:schemaRef ds:uri="http://purl.org/dc/elements/1.1/"/>
   </ds:schemaRefs>
 </ds:datastoreItem>
 </file>
@@ -21223,18 +21232,9 @@
 </file>
 
 <file path=customXml/itemProps3.xml><?xml version="1.0" encoding="utf-8"?>
-<ds:datastoreItem xmlns:ds="http://schemas.openxmlformats.org/officeDocument/2006/customXml" ds:itemID="{A6CFE1F4-DC23-4922-8914-581F71D27CC2}">
+<ds:datastoreItem xmlns:ds="http://schemas.openxmlformats.org/officeDocument/2006/customXml" ds:itemID="{144358F8-A1A2-4C12-9300-834AC979E5E3}">
   <ds:schemaRefs>
-    <ds:schemaRef ds:uri="http://www.w3.org/XML/1998/namespace"/>
-    <ds:schemaRef ds:uri="c1f6d79c-77e4-4aca-9148-98b3b94f6507"/>
-    <ds:schemaRef ds:uri="http://purl.org/dc/dcmitype/"/>
-    <ds:schemaRef ds:uri="http://schemas.microsoft.com/office/2006/metadata/properties"/>
-    <ds:schemaRef ds:uri="http://schemas.microsoft.com/office/2006/documentManagement/types"/>
-    <ds:schemaRef ds:uri="1bb7031c-a8b4-4cbe-98f2-525d179cfc77"/>
-    <ds:schemaRef ds:uri="http://purl.org/dc/terms/"/>
-    <ds:schemaRef ds:uri="http://schemas.microsoft.com/office/infopath/2007/PartnerControls"/>
-    <ds:schemaRef ds:uri="http://schemas.openxmlformats.org/package/2006/metadata/core-properties"/>
-    <ds:schemaRef ds:uri="http://purl.org/dc/elements/1.1/"/>
+    <ds:schemaRef ds:uri="http://schemas.microsoft.com/sharepoint/v3/contenttype/forms"/>
   </ds:schemaRefs>
 </ds:datastoreItem>
 </file>
</xml_diff>